<commit_message>
Revert "path lecture 2 90%"
This reverts commit c3c72619a5757dfd13b28142f9731296fbf6d555.
</commit_message>
<xml_diff>
--- a/dapr3_lectures/pathfa_lectures/figs/diagrams.pptx
+++ b/dapr3_lectures/pathfa_lectures/figs/diagrams.pptx
@@ -8,9 +8,6 @@
     <p:sldId id="256" r:id="rId2"/>
     <p:sldId id="257" r:id="rId3"/>
     <p:sldId id="258" r:id="rId4"/>
-    <p:sldId id="259" r:id="rId5"/>
-    <p:sldId id="260" r:id="rId6"/>
-    <p:sldId id="261" r:id="rId7"/>
   </p:sldIdLst>
   <p:sldSz cx="12192000" cy="6858000"/>
   <p:notesSz cx="6858000" cy="9144000"/>
@@ -109,358 +106,7 @@
       </a:defRPr>
     </a:lvl9pPr>
   </p:defaultTextStyle>
-  <p:extLst>
-    <p:ext uri="{EFAFB233-063F-42B5-8137-9DF3F51BA10A}">
-      <p15:sldGuideLst xmlns:p15="http://schemas.microsoft.com/office/powerpoint/2012/main"/>
-    </p:ext>
-  </p:extLst>
 </p:presentation>
-</file>
-
-<file path=ppt/revisionInfo.xml><?xml version="1.0" encoding="utf-8"?>
-<p1510:revInfo xmlns:a="http://schemas.openxmlformats.org/drawingml/2006/main" xmlns:r="http://schemas.openxmlformats.org/officeDocument/2006/relationships" xmlns:p1510="http://schemas.microsoft.com/office/powerpoint/2015/10/main">
-  <p1510:revLst>
-    <p1510:client id="{AFD04F4F-B5AD-4086-A3E8-204AC8B1F297}" v="6" dt="2023-09-06T10:09:15.121"/>
-  </p1510:revLst>
-</p1510:revInfo>
-</file>
-
-<file path=ppt/changesInfos/changesInfo1.xml><?xml version="1.0" encoding="utf-8"?>
-<pc:chgInfo xmlns:a="http://schemas.openxmlformats.org/drawingml/2006/main" xmlns:r="http://schemas.openxmlformats.org/officeDocument/2006/relationships" xmlns:ac="http://schemas.microsoft.com/office/drawing/2013/main/command" xmlns:pc="http://schemas.microsoft.com/office/powerpoint/2013/main/command">
-  <pc:docChgLst>
-    <pc:chgData name="Tom Booth" userId="5c6dda17feb83ac2" providerId="LiveId" clId="{AFD04F4F-B5AD-4086-A3E8-204AC8B1F297}"/>
-    <pc:docChg chg="undo custSel addSld delSld modSld sldOrd">
-      <pc:chgData name="Tom Booth" userId="5c6dda17feb83ac2" providerId="LiveId" clId="{AFD04F4F-B5AD-4086-A3E8-204AC8B1F297}" dt="2023-09-06T10:56:13.812" v="90" actId="20577"/>
-      <pc:docMkLst>
-        <pc:docMk/>
-      </pc:docMkLst>
-      <pc:sldChg chg="add del ord">
-        <pc:chgData name="Tom Booth" userId="5c6dda17feb83ac2" providerId="LiveId" clId="{AFD04F4F-B5AD-4086-A3E8-204AC8B1F297}" dt="2023-09-06T09:50:27.327" v="3" actId="47"/>
-        <pc:sldMkLst>
-          <pc:docMk/>
-          <pc:sldMk cId="1082730471" sldId="259"/>
-        </pc:sldMkLst>
-      </pc:sldChg>
-      <pc:sldChg chg="addSp delSp modSp add mod ord">
-        <pc:chgData name="Tom Booth" userId="5c6dda17feb83ac2" providerId="LiveId" clId="{AFD04F4F-B5AD-4086-A3E8-204AC8B1F297}" dt="2023-09-06T09:53:57.249" v="55" actId="1076"/>
-        <pc:sldMkLst>
-          <pc:docMk/>
-          <pc:sldMk cId="2959519369" sldId="259"/>
-        </pc:sldMkLst>
-        <pc:spChg chg="mod topLvl">
-          <ac:chgData name="Tom Booth" userId="5c6dda17feb83ac2" providerId="LiveId" clId="{AFD04F4F-B5AD-4086-A3E8-204AC8B1F297}" dt="2023-09-06T09:53:53.771" v="54" actId="164"/>
-          <ac:spMkLst>
-            <pc:docMk/>
-            <pc:sldMk cId="2959519369" sldId="259"/>
-            <ac:spMk id="4" creationId="{00000000-0000-0000-0000-000000000000}"/>
-          </ac:spMkLst>
-        </pc:spChg>
-        <pc:spChg chg="del mod topLvl">
-          <ac:chgData name="Tom Booth" userId="5c6dda17feb83ac2" providerId="LiveId" clId="{AFD04F4F-B5AD-4086-A3E8-204AC8B1F297}" dt="2023-09-06T09:50:48.207" v="10" actId="478"/>
-          <ac:spMkLst>
-            <pc:docMk/>
-            <pc:sldMk cId="2959519369" sldId="259"/>
-            <ac:spMk id="5" creationId="{00000000-0000-0000-0000-000000000000}"/>
-          </ac:spMkLst>
-        </pc:spChg>
-        <pc:spChg chg="mod topLvl">
-          <ac:chgData name="Tom Booth" userId="5c6dda17feb83ac2" providerId="LiveId" clId="{AFD04F4F-B5AD-4086-A3E8-204AC8B1F297}" dt="2023-09-06T09:53:53.771" v="54" actId="164"/>
-          <ac:spMkLst>
-            <pc:docMk/>
-            <pc:sldMk cId="2959519369" sldId="259"/>
-            <ac:spMk id="6" creationId="{00000000-0000-0000-0000-000000000000}"/>
-          </ac:spMkLst>
-        </pc:spChg>
-        <pc:spChg chg="mod topLvl">
-          <ac:chgData name="Tom Booth" userId="5c6dda17feb83ac2" providerId="LiveId" clId="{AFD04F4F-B5AD-4086-A3E8-204AC8B1F297}" dt="2023-09-06T09:53:53.771" v="54" actId="164"/>
-          <ac:spMkLst>
-            <pc:docMk/>
-            <pc:sldMk cId="2959519369" sldId="259"/>
-            <ac:spMk id="7" creationId="{00000000-0000-0000-0000-000000000000}"/>
-          </ac:spMkLst>
-        </pc:spChg>
-        <pc:spChg chg="del mod topLvl">
-          <ac:chgData name="Tom Booth" userId="5c6dda17feb83ac2" providerId="LiveId" clId="{AFD04F4F-B5AD-4086-A3E8-204AC8B1F297}" dt="2023-09-06T09:50:48.207" v="10" actId="478"/>
-          <ac:spMkLst>
-            <pc:docMk/>
-            <pc:sldMk cId="2959519369" sldId="259"/>
-            <ac:spMk id="8" creationId="{00000000-0000-0000-0000-000000000000}"/>
-          </ac:spMkLst>
-        </pc:spChg>
-        <pc:spChg chg="del mod topLvl">
-          <ac:chgData name="Tom Booth" userId="5c6dda17feb83ac2" providerId="LiveId" clId="{AFD04F4F-B5AD-4086-A3E8-204AC8B1F297}" dt="2023-09-06T09:50:41.763" v="8" actId="478"/>
-          <ac:spMkLst>
-            <pc:docMk/>
-            <pc:sldMk cId="2959519369" sldId="259"/>
-            <ac:spMk id="32" creationId="{00000000-0000-0000-0000-000000000000}"/>
-          </ac:spMkLst>
-        </pc:spChg>
-        <pc:spChg chg="del mod topLvl">
-          <ac:chgData name="Tom Booth" userId="5c6dda17feb83ac2" providerId="LiveId" clId="{AFD04F4F-B5AD-4086-A3E8-204AC8B1F297}" dt="2023-09-06T09:50:41.763" v="8" actId="478"/>
-          <ac:spMkLst>
-            <pc:docMk/>
-            <pc:sldMk cId="2959519369" sldId="259"/>
-            <ac:spMk id="33" creationId="{00000000-0000-0000-0000-000000000000}"/>
-          </ac:spMkLst>
-        </pc:spChg>
-        <pc:spChg chg="del mod topLvl">
-          <ac:chgData name="Tom Booth" userId="5c6dda17feb83ac2" providerId="LiveId" clId="{AFD04F4F-B5AD-4086-A3E8-204AC8B1F297}" dt="2023-09-06T09:50:41.763" v="8" actId="478"/>
-          <ac:spMkLst>
-            <pc:docMk/>
-            <pc:sldMk cId="2959519369" sldId="259"/>
-            <ac:spMk id="34" creationId="{00000000-0000-0000-0000-000000000000}"/>
-          </ac:spMkLst>
-        </pc:spChg>
-        <pc:spChg chg="mod topLvl">
-          <ac:chgData name="Tom Booth" userId="5c6dda17feb83ac2" providerId="LiveId" clId="{AFD04F4F-B5AD-4086-A3E8-204AC8B1F297}" dt="2023-09-06T09:53:53.771" v="54" actId="164"/>
-          <ac:spMkLst>
-            <pc:docMk/>
-            <pc:sldMk cId="2959519369" sldId="259"/>
-            <ac:spMk id="39" creationId="{00000000-0000-0000-0000-000000000000}"/>
-          </ac:spMkLst>
-        </pc:spChg>
-        <pc:spChg chg="mod topLvl">
-          <ac:chgData name="Tom Booth" userId="5c6dda17feb83ac2" providerId="LiveId" clId="{AFD04F4F-B5AD-4086-A3E8-204AC8B1F297}" dt="2023-09-06T09:53:53.771" v="54" actId="164"/>
-          <ac:spMkLst>
-            <pc:docMk/>
-            <pc:sldMk cId="2959519369" sldId="259"/>
-            <ac:spMk id="41" creationId="{00000000-0000-0000-0000-000000000000}"/>
-          </ac:spMkLst>
-        </pc:spChg>
-        <pc:spChg chg="del mod topLvl">
-          <ac:chgData name="Tom Booth" userId="5c6dda17feb83ac2" providerId="LiveId" clId="{AFD04F4F-B5AD-4086-A3E8-204AC8B1F297}" dt="2023-09-06T09:51:04.168" v="15" actId="478"/>
-          <ac:spMkLst>
-            <pc:docMk/>
-            <pc:sldMk cId="2959519369" sldId="259"/>
-            <ac:spMk id="42" creationId="{00000000-0000-0000-0000-000000000000}"/>
-          </ac:spMkLst>
-        </pc:spChg>
-        <pc:spChg chg="mod topLvl">
-          <ac:chgData name="Tom Booth" userId="5c6dda17feb83ac2" providerId="LiveId" clId="{AFD04F4F-B5AD-4086-A3E8-204AC8B1F297}" dt="2023-09-06T09:53:53.771" v="54" actId="164"/>
-          <ac:spMkLst>
-            <pc:docMk/>
-            <pc:sldMk cId="2959519369" sldId="259"/>
-            <ac:spMk id="43" creationId="{00000000-0000-0000-0000-000000000000}"/>
-          </ac:spMkLst>
-        </pc:spChg>
-        <pc:spChg chg="del mod topLvl">
-          <ac:chgData name="Tom Booth" userId="5c6dda17feb83ac2" providerId="LiveId" clId="{AFD04F4F-B5AD-4086-A3E8-204AC8B1F297}" dt="2023-09-06T09:50:48.207" v="10" actId="478"/>
-          <ac:spMkLst>
-            <pc:docMk/>
-            <pc:sldMk cId="2959519369" sldId="259"/>
-            <ac:spMk id="45" creationId="{00000000-0000-0000-0000-000000000000}"/>
-          </ac:spMkLst>
-        </pc:spChg>
-        <pc:spChg chg="del mod topLvl">
-          <ac:chgData name="Tom Booth" userId="5c6dda17feb83ac2" providerId="LiveId" clId="{AFD04F4F-B5AD-4086-A3E8-204AC8B1F297}" dt="2023-09-06T09:50:48.207" v="10" actId="478"/>
-          <ac:spMkLst>
-            <pc:docMk/>
-            <pc:sldMk cId="2959519369" sldId="259"/>
-            <ac:spMk id="46" creationId="{00000000-0000-0000-0000-000000000000}"/>
-          </ac:spMkLst>
-        </pc:spChg>
-        <pc:grpChg chg="add mod">
-          <ac:chgData name="Tom Booth" userId="5c6dda17feb83ac2" providerId="LiveId" clId="{AFD04F4F-B5AD-4086-A3E8-204AC8B1F297}" dt="2023-09-06T09:53:57.249" v="55" actId="1076"/>
-          <ac:grpSpMkLst>
-            <pc:docMk/>
-            <pc:sldMk cId="2959519369" sldId="259"/>
-            <ac:grpSpMk id="22" creationId="{A45D3BBD-83EA-C72A-F34A-A3E0CADE9FC2}"/>
-          </ac:grpSpMkLst>
-        </pc:grpChg>
-        <pc:grpChg chg="del">
-          <ac:chgData name="Tom Booth" userId="5c6dda17feb83ac2" providerId="LiveId" clId="{AFD04F4F-B5AD-4086-A3E8-204AC8B1F297}" dt="2023-09-06T09:50:37.996" v="7" actId="165"/>
-          <ac:grpSpMkLst>
-            <pc:docMk/>
-            <pc:sldMk cId="2959519369" sldId="259"/>
-            <ac:grpSpMk id="52" creationId="{00000000-0000-0000-0000-000000000000}"/>
-          </ac:grpSpMkLst>
-        </pc:grpChg>
-        <pc:cxnChg chg="add mod">
-          <ac:chgData name="Tom Booth" userId="5c6dda17feb83ac2" providerId="LiveId" clId="{AFD04F4F-B5AD-4086-A3E8-204AC8B1F297}" dt="2023-09-06T09:53:53.771" v="54" actId="164"/>
-          <ac:cxnSpMkLst>
-            <pc:docMk/>
-            <pc:sldMk cId="2959519369" sldId="259"/>
-            <ac:cxnSpMk id="10" creationId="{CBCB3278-E1A8-2469-C52C-0133701BF3F4}"/>
-          </ac:cxnSpMkLst>
-        </pc:cxnChg>
-        <pc:cxnChg chg="del mod topLvl">
-          <ac:chgData name="Tom Booth" userId="5c6dda17feb83ac2" providerId="LiveId" clId="{AFD04F4F-B5AD-4086-A3E8-204AC8B1F297}" dt="2023-09-06T09:50:45.509" v="9" actId="478"/>
-          <ac:cxnSpMkLst>
-            <pc:docMk/>
-            <pc:sldMk cId="2959519369" sldId="259"/>
-            <ac:cxnSpMk id="12" creationId="{00000000-0000-0000-0000-000000000000}"/>
-          </ac:cxnSpMkLst>
-        </pc:cxnChg>
-        <pc:cxnChg chg="add mod">
-          <ac:chgData name="Tom Booth" userId="5c6dda17feb83ac2" providerId="LiveId" clId="{AFD04F4F-B5AD-4086-A3E8-204AC8B1F297}" dt="2023-09-06T09:53:53.771" v="54" actId="164"/>
-          <ac:cxnSpMkLst>
-            <pc:docMk/>
-            <pc:sldMk cId="2959519369" sldId="259"/>
-            <ac:cxnSpMk id="13" creationId="{ACEDD3E8-03A9-2C3A-C082-5A8983C853C8}"/>
-          </ac:cxnSpMkLst>
-        </pc:cxnChg>
-        <pc:cxnChg chg="del mod topLvl">
-          <ac:chgData name="Tom Booth" userId="5c6dda17feb83ac2" providerId="LiveId" clId="{AFD04F4F-B5AD-4086-A3E8-204AC8B1F297}" dt="2023-09-06T09:50:45.509" v="9" actId="478"/>
-          <ac:cxnSpMkLst>
-            <pc:docMk/>
-            <pc:sldMk cId="2959519369" sldId="259"/>
-            <ac:cxnSpMk id="14" creationId="{00000000-0000-0000-0000-000000000000}"/>
-          </ac:cxnSpMkLst>
-        </pc:cxnChg>
-        <pc:cxnChg chg="del mod topLvl">
-          <ac:chgData name="Tom Booth" userId="5c6dda17feb83ac2" providerId="LiveId" clId="{AFD04F4F-B5AD-4086-A3E8-204AC8B1F297}" dt="2023-09-06T09:50:45.509" v="9" actId="478"/>
-          <ac:cxnSpMkLst>
-            <pc:docMk/>
-            <pc:sldMk cId="2959519369" sldId="259"/>
-            <ac:cxnSpMk id="16" creationId="{00000000-0000-0000-0000-000000000000}"/>
-          </ac:cxnSpMkLst>
-        </pc:cxnChg>
-        <pc:cxnChg chg="del mod topLvl">
-          <ac:chgData name="Tom Booth" userId="5c6dda17feb83ac2" providerId="LiveId" clId="{AFD04F4F-B5AD-4086-A3E8-204AC8B1F297}" dt="2023-09-06T09:50:45.509" v="9" actId="478"/>
-          <ac:cxnSpMkLst>
-            <pc:docMk/>
-            <pc:sldMk cId="2959519369" sldId="259"/>
-            <ac:cxnSpMk id="18" creationId="{00000000-0000-0000-0000-000000000000}"/>
-          </ac:cxnSpMkLst>
-        </pc:cxnChg>
-        <pc:cxnChg chg="add mod">
-          <ac:chgData name="Tom Booth" userId="5c6dda17feb83ac2" providerId="LiveId" clId="{AFD04F4F-B5AD-4086-A3E8-204AC8B1F297}" dt="2023-09-06T09:53:53.771" v="54" actId="164"/>
-          <ac:cxnSpMkLst>
-            <pc:docMk/>
-            <pc:sldMk cId="2959519369" sldId="259"/>
-            <ac:cxnSpMk id="21" creationId="{5135221A-49F0-183E-61CD-C17C2D306DB7}"/>
-          </ac:cxnSpMkLst>
-        </pc:cxnChg>
-        <pc:cxnChg chg="mod topLvl">
-          <ac:chgData name="Tom Booth" userId="5c6dda17feb83ac2" providerId="LiveId" clId="{AFD04F4F-B5AD-4086-A3E8-204AC8B1F297}" dt="2023-09-06T09:53:53.771" v="54" actId="164"/>
-          <ac:cxnSpMkLst>
-            <pc:docMk/>
-            <pc:sldMk cId="2959519369" sldId="259"/>
-            <ac:cxnSpMk id="35" creationId="{00000000-0000-0000-0000-000000000000}"/>
-          </ac:cxnSpMkLst>
-        </pc:cxnChg>
-        <pc:cxnChg chg="mod topLvl">
-          <ac:chgData name="Tom Booth" userId="5c6dda17feb83ac2" providerId="LiveId" clId="{AFD04F4F-B5AD-4086-A3E8-204AC8B1F297}" dt="2023-09-06T09:53:53.771" v="54" actId="164"/>
-          <ac:cxnSpMkLst>
-            <pc:docMk/>
-            <pc:sldMk cId="2959519369" sldId="259"/>
-            <ac:cxnSpMk id="38" creationId="{00000000-0000-0000-0000-000000000000}"/>
-          </ac:cxnSpMkLst>
-        </pc:cxnChg>
-        <pc:cxnChg chg="del mod topLvl">
-          <ac:chgData name="Tom Booth" userId="5c6dda17feb83ac2" providerId="LiveId" clId="{AFD04F4F-B5AD-4086-A3E8-204AC8B1F297}" dt="2023-09-06T09:50:45.509" v="9" actId="478"/>
-          <ac:cxnSpMkLst>
-            <pc:docMk/>
-            <pc:sldMk cId="2959519369" sldId="259"/>
-            <ac:cxnSpMk id="48" creationId="{00000000-0000-0000-0000-000000000000}"/>
-          </ac:cxnSpMkLst>
-        </pc:cxnChg>
-      </pc:sldChg>
-      <pc:sldChg chg="addSp modSp add mod">
-        <pc:chgData name="Tom Booth" userId="5c6dda17feb83ac2" providerId="LiveId" clId="{AFD04F4F-B5AD-4086-A3E8-204AC8B1F297}" dt="2023-09-06T10:09:15.121" v="82" actId="164"/>
-        <pc:sldMkLst>
-          <pc:docMk/>
-          <pc:sldMk cId="2526277780" sldId="260"/>
-        </pc:sldMkLst>
-        <pc:spChg chg="add mod">
-          <ac:chgData name="Tom Booth" userId="5c6dda17feb83ac2" providerId="LiveId" clId="{AFD04F4F-B5AD-4086-A3E8-204AC8B1F297}" dt="2023-09-06T10:09:15.121" v="82" actId="164"/>
-          <ac:spMkLst>
-            <pc:docMk/>
-            <pc:sldMk cId="2526277780" sldId="260"/>
-            <ac:spMk id="2" creationId="{F99AAF8A-BD8A-BD7D-7758-4F6AC6121EEF}"/>
-          </ac:spMkLst>
-        </pc:spChg>
-        <pc:spChg chg="add mod">
-          <ac:chgData name="Tom Booth" userId="5c6dda17feb83ac2" providerId="LiveId" clId="{AFD04F4F-B5AD-4086-A3E8-204AC8B1F297}" dt="2023-09-06T10:09:15.121" v="82" actId="164"/>
-          <ac:spMkLst>
-            <pc:docMk/>
-            <pc:sldMk cId="2526277780" sldId="260"/>
-            <ac:spMk id="3" creationId="{6AD4069F-0090-60B0-5597-01F6CB3DD842}"/>
-          </ac:spMkLst>
-        </pc:spChg>
-        <pc:spChg chg="add mod">
-          <ac:chgData name="Tom Booth" userId="5c6dda17feb83ac2" providerId="LiveId" clId="{AFD04F4F-B5AD-4086-A3E8-204AC8B1F297}" dt="2023-09-06T10:09:15.121" v="82" actId="164"/>
-          <ac:spMkLst>
-            <pc:docMk/>
-            <pc:sldMk cId="2526277780" sldId="260"/>
-            <ac:spMk id="5" creationId="{C05443CF-E076-3960-90BD-57863F45F3B2}"/>
-          </ac:spMkLst>
-        </pc:spChg>
-        <pc:grpChg chg="add mod">
-          <ac:chgData name="Tom Booth" userId="5c6dda17feb83ac2" providerId="LiveId" clId="{AFD04F4F-B5AD-4086-A3E8-204AC8B1F297}" dt="2023-09-06T10:09:15.121" v="82" actId="164"/>
-          <ac:grpSpMkLst>
-            <pc:docMk/>
-            <pc:sldMk cId="2526277780" sldId="260"/>
-            <ac:grpSpMk id="8" creationId="{EFA2D605-5532-DAEE-BDB9-C10C31D50A7D}"/>
-          </ac:grpSpMkLst>
-        </pc:grpChg>
-        <pc:grpChg chg="mod">
-          <ac:chgData name="Tom Booth" userId="5c6dda17feb83ac2" providerId="LiveId" clId="{AFD04F4F-B5AD-4086-A3E8-204AC8B1F297}" dt="2023-09-06T10:09:15.121" v="82" actId="164"/>
-          <ac:grpSpMkLst>
-            <pc:docMk/>
-            <pc:sldMk cId="2526277780" sldId="260"/>
-            <ac:grpSpMk id="22" creationId="{A45D3BBD-83EA-C72A-F34A-A3E0CADE9FC2}"/>
-          </ac:grpSpMkLst>
-        </pc:grpChg>
-        <pc:cxnChg chg="mod">
-          <ac:chgData name="Tom Booth" userId="5c6dda17feb83ac2" providerId="LiveId" clId="{AFD04F4F-B5AD-4086-A3E8-204AC8B1F297}" dt="2023-09-06T10:08:10.806" v="57" actId="692"/>
-          <ac:cxnSpMkLst>
-            <pc:docMk/>
-            <pc:sldMk cId="2526277780" sldId="260"/>
-            <ac:cxnSpMk id="10" creationId="{CBCB3278-E1A8-2469-C52C-0133701BF3F4}"/>
-          </ac:cxnSpMkLst>
-        </pc:cxnChg>
-        <pc:cxnChg chg="mod">
-          <ac:chgData name="Tom Booth" userId="5c6dda17feb83ac2" providerId="LiveId" clId="{AFD04F4F-B5AD-4086-A3E8-204AC8B1F297}" dt="2023-09-06T10:08:10.806" v="57" actId="692"/>
-          <ac:cxnSpMkLst>
-            <pc:docMk/>
-            <pc:sldMk cId="2526277780" sldId="260"/>
-            <ac:cxnSpMk id="13" creationId="{ACEDD3E8-03A9-2C3A-C082-5A8983C853C8}"/>
-          </ac:cxnSpMkLst>
-        </pc:cxnChg>
-        <pc:cxnChg chg="mod">
-          <ac:chgData name="Tom Booth" userId="5c6dda17feb83ac2" providerId="LiveId" clId="{AFD04F4F-B5AD-4086-A3E8-204AC8B1F297}" dt="2023-09-06T10:08:18.794" v="59" actId="692"/>
-          <ac:cxnSpMkLst>
-            <pc:docMk/>
-            <pc:sldMk cId="2526277780" sldId="260"/>
-            <ac:cxnSpMk id="21" creationId="{5135221A-49F0-183E-61CD-C17C2D306DB7}"/>
-          </ac:cxnSpMkLst>
-        </pc:cxnChg>
-      </pc:sldChg>
-      <pc:sldChg chg="modSp add mod">
-        <pc:chgData name="Tom Booth" userId="5c6dda17feb83ac2" providerId="LiveId" clId="{AFD04F4F-B5AD-4086-A3E8-204AC8B1F297}" dt="2023-09-06T10:56:13.812" v="90" actId="20577"/>
-        <pc:sldMkLst>
-          <pc:docMk/>
-          <pc:sldMk cId="1315734053" sldId="261"/>
-        </pc:sldMkLst>
-        <pc:spChg chg="mod">
-          <ac:chgData name="Tom Booth" userId="5c6dda17feb83ac2" providerId="LiveId" clId="{AFD04F4F-B5AD-4086-A3E8-204AC8B1F297}" dt="2023-09-06T10:56:04.819" v="88" actId="1076"/>
-          <ac:spMkLst>
-            <pc:docMk/>
-            <pc:sldMk cId="1315734053" sldId="261"/>
-            <ac:spMk id="2" creationId="{F99AAF8A-BD8A-BD7D-7758-4F6AC6121EEF}"/>
-          </ac:spMkLst>
-        </pc:spChg>
-        <pc:spChg chg="mod">
-          <ac:chgData name="Tom Booth" userId="5c6dda17feb83ac2" providerId="LiveId" clId="{AFD04F4F-B5AD-4086-A3E8-204AC8B1F297}" dt="2023-09-06T10:56:09.220" v="89" actId="20577"/>
-          <ac:spMkLst>
-            <pc:docMk/>
-            <pc:sldMk cId="1315734053" sldId="261"/>
-            <ac:spMk id="3" creationId="{6AD4069F-0090-60B0-5597-01F6CB3DD842}"/>
-          </ac:spMkLst>
-        </pc:spChg>
-        <pc:spChg chg="mod">
-          <ac:chgData name="Tom Booth" userId="5c6dda17feb83ac2" providerId="LiveId" clId="{AFD04F4F-B5AD-4086-A3E8-204AC8B1F297}" dt="2023-09-06T10:56:13.812" v="90" actId="20577"/>
-          <ac:spMkLst>
-            <pc:docMk/>
-            <pc:sldMk cId="1315734053" sldId="261"/>
-            <ac:spMk id="5" creationId="{C05443CF-E076-3960-90BD-57863F45F3B2}"/>
-          </ac:spMkLst>
-        </pc:spChg>
-      </pc:sldChg>
-    </pc:docChg>
-  </pc:docChgLst>
-</pc:chgInfo>
 </file>
 
 <file path=ppt/slideLayouts/slideLayout1.xml><?xml version="1.0" encoding="utf-8"?>
@@ -505,7 +151,7 @@
           </a:lstStyle>
           <a:p>
             <a:r>
-              <a:rPr lang="en-US"/>
+              <a:rPr lang="en-US" smtClean="0"/>
               <a:t>Click to edit Master title style</a:t>
             </a:r>
             <a:endParaRPr lang="en-GB"/>
@@ -570,7 +216,7 @@
           </a:lstStyle>
           <a:p>
             <a:r>
-              <a:rPr lang="en-US"/>
+              <a:rPr lang="en-US" smtClean="0"/>
               <a:t>Click to edit Master subtitle style</a:t>
             </a:r>
             <a:endParaRPr lang="en-GB"/>
@@ -594,7 +240,7 @@
           <a:p>
             <a:fld id="{AB91BCC1-83D7-40E0-AB70-2BF6E42928C4}" type="datetimeFigureOut">
               <a:rPr lang="en-GB" smtClean="0"/>
-              <a:t>06/09/2023</a:t>
+              <a:t>17/08/2023</a:t>
             </a:fld>
             <a:endParaRPr lang="en-GB"/>
           </a:p>
@@ -688,7 +334,7 @@
           <a:lstStyle/>
           <a:p>
             <a:r>
-              <a:rPr lang="en-US"/>
+              <a:rPr lang="en-US" smtClean="0"/>
               <a:t>Click to edit Master title style</a:t>
             </a:r>
             <a:endParaRPr lang="en-GB"/>
@@ -712,35 +358,35 @@
           <a:p>
             <a:pPr lvl="0"/>
             <a:r>
-              <a:rPr lang="en-US"/>
+              <a:rPr lang="en-US" smtClean="0"/>
               <a:t>Edit Master text styles</a:t>
             </a:r>
           </a:p>
           <a:p>
             <a:pPr lvl="1"/>
             <a:r>
-              <a:rPr lang="en-US"/>
+              <a:rPr lang="en-US" smtClean="0"/>
               <a:t>Second level</a:t>
             </a:r>
           </a:p>
           <a:p>
             <a:pPr lvl="2"/>
             <a:r>
-              <a:rPr lang="en-US"/>
+              <a:rPr lang="en-US" smtClean="0"/>
               <a:t>Third level</a:t>
             </a:r>
           </a:p>
           <a:p>
             <a:pPr lvl="3"/>
             <a:r>
-              <a:rPr lang="en-US"/>
+              <a:rPr lang="en-US" smtClean="0"/>
               <a:t>Fourth level</a:t>
             </a:r>
           </a:p>
           <a:p>
             <a:pPr lvl="4"/>
             <a:r>
-              <a:rPr lang="en-US"/>
+              <a:rPr lang="en-US" smtClean="0"/>
               <a:t>Fifth level</a:t>
             </a:r>
             <a:endParaRPr lang="en-GB"/>
@@ -764,7 +410,7 @@
           <a:p>
             <a:fld id="{AB91BCC1-83D7-40E0-AB70-2BF6E42928C4}" type="datetimeFigureOut">
               <a:rPr lang="en-GB" smtClean="0"/>
-              <a:t>06/09/2023</a:t>
+              <a:t>17/08/2023</a:t>
             </a:fld>
             <a:endParaRPr lang="en-GB"/>
           </a:p>
@@ -863,7 +509,7 @@
           <a:lstStyle/>
           <a:p>
             <a:r>
-              <a:rPr lang="en-US"/>
+              <a:rPr lang="en-US" smtClean="0"/>
               <a:t>Click to edit Master title style</a:t>
             </a:r>
             <a:endParaRPr lang="en-GB"/>
@@ -892,35 +538,35 @@
           <a:p>
             <a:pPr lvl="0"/>
             <a:r>
-              <a:rPr lang="en-US"/>
+              <a:rPr lang="en-US" smtClean="0"/>
               <a:t>Edit Master text styles</a:t>
             </a:r>
           </a:p>
           <a:p>
             <a:pPr lvl="1"/>
             <a:r>
-              <a:rPr lang="en-US"/>
+              <a:rPr lang="en-US" smtClean="0"/>
               <a:t>Second level</a:t>
             </a:r>
           </a:p>
           <a:p>
             <a:pPr lvl="2"/>
             <a:r>
-              <a:rPr lang="en-US"/>
+              <a:rPr lang="en-US" smtClean="0"/>
               <a:t>Third level</a:t>
             </a:r>
           </a:p>
           <a:p>
             <a:pPr lvl="3"/>
             <a:r>
-              <a:rPr lang="en-US"/>
+              <a:rPr lang="en-US" smtClean="0"/>
               <a:t>Fourth level</a:t>
             </a:r>
           </a:p>
           <a:p>
             <a:pPr lvl="4"/>
             <a:r>
-              <a:rPr lang="en-US"/>
+              <a:rPr lang="en-US" smtClean="0"/>
               <a:t>Fifth level</a:t>
             </a:r>
             <a:endParaRPr lang="en-GB"/>
@@ -944,7 +590,7 @@
           <a:p>
             <a:fld id="{AB91BCC1-83D7-40E0-AB70-2BF6E42928C4}" type="datetimeFigureOut">
               <a:rPr lang="en-GB" smtClean="0"/>
-              <a:t>06/09/2023</a:t>
+              <a:t>17/08/2023</a:t>
             </a:fld>
             <a:endParaRPr lang="en-GB"/>
           </a:p>
@@ -1038,7 +684,7 @@
           <a:lstStyle/>
           <a:p>
             <a:r>
-              <a:rPr lang="en-US"/>
+              <a:rPr lang="en-US" smtClean="0"/>
               <a:t>Click to edit Master title style</a:t>
             </a:r>
             <a:endParaRPr lang="en-GB"/>
@@ -1062,35 +708,35 @@
           <a:p>
             <a:pPr lvl="0"/>
             <a:r>
-              <a:rPr lang="en-US"/>
+              <a:rPr lang="en-US" smtClean="0"/>
               <a:t>Edit Master text styles</a:t>
             </a:r>
           </a:p>
           <a:p>
             <a:pPr lvl="1"/>
             <a:r>
-              <a:rPr lang="en-US"/>
+              <a:rPr lang="en-US" smtClean="0"/>
               <a:t>Second level</a:t>
             </a:r>
           </a:p>
           <a:p>
             <a:pPr lvl="2"/>
             <a:r>
-              <a:rPr lang="en-US"/>
+              <a:rPr lang="en-US" smtClean="0"/>
               <a:t>Third level</a:t>
             </a:r>
           </a:p>
           <a:p>
             <a:pPr lvl="3"/>
             <a:r>
-              <a:rPr lang="en-US"/>
+              <a:rPr lang="en-US" smtClean="0"/>
               <a:t>Fourth level</a:t>
             </a:r>
           </a:p>
           <a:p>
             <a:pPr lvl="4"/>
             <a:r>
-              <a:rPr lang="en-US"/>
+              <a:rPr lang="en-US" smtClean="0"/>
               <a:t>Fifth level</a:t>
             </a:r>
             <a:endParaRPr lang="en-GB"/>
@@ -1114,7 +760,7 @@
           <a:p>
             <a:fld id="{AB91BCC1-83D7-40E0-AB70-2BF6E42928C4}" type="datetimeFigureOut">
               <a:rPr lang="en-GB" smtClean="0"/>
-              <a:t>06/09/2023</a:t>
+              <a:t>17/08/2023</a:t>
             </a:fld>
             <a:endParaRPr lang="en-GB"/>
           </a:p>
@@ -1217,7 +863,7 @@
           </a:lstStyle>
           <a:p>
             <a:r>
-              <a:rPr lang="en-US"/>
+              <a:rPr lang="en-US" smtClean="0"/>
               <a:t>Click to edit Master title style</a:t>
             </a:r>
             <a:endParaRPr lang="en-GB"/>
@@ -1337,7 +983,7 @@
           <a:p>
             <a:pPr lvl="0"/>
             <a:r>
-              <a:rPr lang="en-US"/>
+              <a:rPr lang="en-US" smtClean="0"/>
               <a:t>Edit Master text styles</a:t>
             </a:r>
           </a:p>
@@ -1360,7 +1006,7 @@
           <a:p>
             <a:fld id="{AB91BCC1-83D7-40E0-AB70-2BF6E42928C4}" type="datetimeFigureOut">
               <a:rPr lang="en-GB" smtClean="0"/>
-              <a:t>06/09/2023</a:t>
+              <a:t>17/08/2023</a:t>
             </a:fld>
             <a:endParaRPr lang="en-GB"/>
           </a:p>
@@ -1454,7 +1100,7 @@
           <a:lstStyle/>
           <a:p>
             <a:r>
-              <a:rPr lang="en-US"/>
+              <a:rPr lang="en-US" smtClean="0"/>
               <a:t>Click to edit Master title style</a:t>
             </a:r>
             <a:endParaRPr lang="en-GB"/>
@@ -1483,35 +1129,35 @@
           <a:p>
             <a:pPr lvl="0"/>
             <a:r>
-              <a:rPr lang="en-US"/>
+              <a:rPr lang="en-US" smtClean="0"/>
               <a:t>Edit Master text styles</a:t>
             </a:r>
           </a:p>
           <a:p>
             <a:pPr lvl="1"/>
             <a:r>
-              <a:rPr lang="en-US"/>
+              <a:rPr lang="en-US" smtClean="0"/>
               <a:t>Second level</a:t>
             </a:r>
           </a:p>
           <a:p>
             <a:pPr lvl="2"/>
             <a:r>
-              <a:rPr lang="en-US"/>
+              <a:rPr lang="en-US" smtClean="0"/>
               <a:t>Third level</a:t>
             </a:r>
           </a:p>
           <a:p>
             <a:pPr lvl="3"/>
             <a:r>
-              <a:rPr lang="en-US"/>
+              <a:rPr lang="en-US" smtClean="0"/>
               <a:t>Fourth level</a:t>
             </a:r>
           </a:p>
           <a:p>
             <a:pPr lvl="4"/>
             <a:r>
-              <a:rPr lang="en-US"/>
+              <a:rPr lang="en-US" smtClean="0"/>
               <a:t>Fifth level</a:t>
             </a:r>
             <a:endParaRPr lang="en-GB"/>
@@ -1540,35 +1186,35 @@
           <a:p>
             <a:pPr lvl="0"/>
             <a:r>
-              <a:rPr lang="en-US"/>
+              <a:rPr lang="en-US" smtClean="0"/>
               <a:t>Edit Master text styles</a:t>
             </a:r>
           </a:p>
           <a:p>
             <a:pPr lvl="1"/>
             <a:r>
-              <a:rPr lang="en-US"/>
+              <a:rPr lang="en-US" smtClean="0"/>
               <a:t>Second level</a:t>
             </a:r>
           </a:p>
           <a:p>
             <a:pPr lvl="2"/>
             <a:r>
-              <a:rPr lang="en-US"/>
+              <a:rPr lang="en-US" smtClean="0"/>
               <a:t>Third level</a:t>
             </a:r>
           </a:p>
           <a:p>
             <a:pPr lvl="3"/>
             <a:r>
-              <a:rPr lang="en-US"/>
+              <a:rPr lang="en-US" smtClean="0"/>
               <a:t>Fourth level</a:t>
             </a:r>
           </a:p>
           <a:p>
             <a:pPr lvl="4"/>
             <a:r>
-              <a:rPr lang="en-US"/>
+              <a:rPr lang="en-US" smtClean="0"/>
               <a:t>Fifth level</a:t>
             </a:r>
             <a:endParaRPr lang="en-GB"/>
@@ -1592,7 +1238,7 @@
           <a:p>
             <a:fld id="{AB91BCC1-83D7-40E0-AB70-2BF6E42928C4}" type="datetimeFigureOut">
               <a:rPr lang="en-GB" smtClean="0"/>
-              <a:t>06/09/2023</a:t>
+              <a:t>17/08/2023</a:t>
             </a:fld>
             <a:endParaRPr lang="en-GB"/>
           </a:p>
@@ -1691,7 +1337,7 @@
           <a:lstStyle/>
           <a:p>
             <a:r>
-              <a:rPr lang="en-US"/>
+              <a:rPr lang="en-US" smtClean="0"/>
               <a:t>Click to edit Master title style</a:t>
             </a:r>
             <a:endParaRPr lang="en-GB"/>
@@ -1757,7 +1403,7 @@
           <a:p>
             <a:pPr lvl="0"/>
             <a:r>
-              <a:rPr lang="en-US"/>
+              <a:rPr lang="en-US" smtClean="0"/>
               <a:t>Edit Master text styles</a:t>
             </a:r>
           </a:p>
@@ -1785,35 +1431,35 @@
           <a:p>
             <a:pPr lvl="0"/>
             <a:r>
-              <a:rPr lang="en-US"/>
+              <a:rPr lang="en-US" smtClean="0"/>
               <a:t>Edit Master text styles</a:t>
             </a:r>
           </a:p>
           <a:p>
             <a:pPr lvl="1"/>
             <a:r>
-              <a:rPr lang="en-US"/>
+              <a:rPr lang="en-US" smtClean="0"/>
               <a:t>Second level</a:t>
             </a:r>
           </a:p>
           <a:p>
             <a:pPr lvl="2"/>
             <a:r>
-              <a:rPr lang="en-US"/>
+              <a:rPr lang="en-US" smtClean="0"/>
               <a:t>Third level</a:t>
             </a:r>
           </a:p>
           <a:p>
             <a:pPr lvl="3"/>
             <a:r>
-              <a:rPr lang="en-US"/>
+              <a:rPr lang="en-US" smtClean="0"/>
               <a:t>Fourth level</a:t>
             </a:r>
           </a:p>
           <a:p>
             <a:pPr lvl="4"/>
             <a:r>
-              <a:rPr lang="en-US"/>
+              <a:rPr lang="en-US" smtClean="0"/>
               <a:t>Fifth level</a:t>
             </a:r>
             <a:endParaRPr lang="en-GB"/>
@@ -1879,7 +1525,7 @@
           <a:p>
             <a:pPr lvl="0"/>
             <a:r>
-              <a:rPr lang="en-US"/>
+              <a:rPr lang="en-US" smtClean="0"/>
               <a:t>Edit Master text styles</a:t>
             </a:r>
           </a:p>
@@ -1907,35 +1553,35 @@
           <a:p>
             <a:pPr lvl="0"/>
             <a:r>
-              <a:rPr lang="en-US"/>
+              <a:rPr lang="en-US" smtClean="0"/>
               <a:t>Edit Master text styles</a:t>
             </a:r>
           </a:p>
           <a:p>
             <a:pPr lvl="1"/>
             <a:r>
-              <a:rPr lang="en-US"/>
+              <a:rPr lang="en-US" smtClean="0"/>
               <a:t>Second level</a:t>
             </a:r>
           </a:p>
           <a:p>
             <a:pPr lvl="2"/>
             <a:r>
-              <a:rPr lang="en-US"/>
+              <a:rPr lang="en-US" smtClean="0"/>
               <a:t>Third level</a:t>
             </a:r>
           </a:p>
           <a:p>
             <a:pPr lvl="3"/>
             <a:r>
-              <a:rPr lang="en-US"/>
+              <a:rPr lang="en-US" smtClean="0"/>
               <a:t>Fourth level</a:t>
             </a:r>
           </a:p>
           <a:p>
             <a:pPr lvl="4"/>
             <a:r>
-              <a:rPr lang="en-US"/>
+              <a:rPr lang="en-US" smtClean="0"/>
               <a:t>Fifth level</a:t>
             </a:r>
             <a:endParaRPr lang="en-GB"/>
@@ -1959,7 +1605,7 @@
           <a:p>
             <a:fld id="{AB91BCC1-83D7-40E0-AB70-2BF6E42928C4}" type="datetimeFigureOut">
               <a:rPr lang="en-GB" smtClean="0"/>
-              <a:t>06/09/2023</a:t>
+              <a:t>17/08/2023</a:t>
             </a:fld>
             <a:endParaRPr lang="en-GB"/>
           </a:p>
@@ -2053,7 +1699,7 @@
           <a:lstStyle/>
           <a:p>
             <a:r>
-              <a:rPr lang="en-US"/>
+              <a:rPr lang="en-US" smtClean="0"/>
               <a:t>Click to edit Master title style</a:t>
             </a:r>
             <a:endParaRPr lang="en-GB"/>
@@ -2077,7 +1723,7 @@
           <a:p>
             <a:fld id="{AB91BCC1-83D7-40E0-AB70-2BF6E42928C4}" type="datetimeFigureOut">
               <a:rPr lang="en-GB" smtClean="0"/>
-              <a:t>06/09/2023</a:t>
+              <a:t>17/08/2023</a:t>
             </a:fld>
             <a:endParaRPr lang="en-GB"/>
           </a:p>
@@ -2172,7 +1818,7 @@
           <a:p>
             <a:fld id="{AB91BCC1-83D7-40E0-AB70-2BF6E42928C4}" type="datetimeFigureOut">
               <a:rPr lang="en-GB" smtClean="0"/>
-              <a:t>06/09/2023</a:t>
+              <a:t>17/08/2023</a:t>
             </a:fld>
             <a:endParaRPr lang="en-GB"/>
           </a:p>
@@ -2275,7 +1921,7 @@
           </a:lstStyle>
           <a:p>
             <a:r>
-              <a:rPr lang="en-US"/>
+              <a:rPr lang="en-US" smtClean="0"/>
               <a:t>Click to edit Master title style</a:t>
             </a:r>
             <a:endParaRPr lang="en-GB"/>
@@ -2332,35 +1978,35 @@
           <a:p>
             <a:pPr lvl="0"/>
             <a:r>
-              <a:rPr lang="en-US"/>
+              <a:rPr lang="en-US" smtClean="0"/>
               <a:t>Edit Master text styles</a:t>
             </a:r>
           </a:p>
           <a:p>
             <a:pPr lvl="1"/>
             <a:r>
-              <a:rPr lang="en-US"/>
+              <a:rPr lang="en-US" smtClean="0"/>
               <a:t>Second level</a:t>
             </a:r>
           </a:p>
           <a:p>
             <a:pPr lvl="2"/>
             <a:r>
-              <a:rPr lang="en-US"/>
+              <a:rPr lang="en-US" smtClean="0"/>
               <a:t>Third level</a:t>
             </a:r>
           </a:p>
           <a:p>
             <a:pPr lvl="3"/>
             <a:r>
-              <a:rPr lang="en-US"/>
+              <a:rPr lang="en-US" smtClean="0"/>
               <a:t>Fourth level</a:t>
             </a:r>
           </a:p>
           <a:p>
             <a:pPr lvl="4"/>
             <a:r>
-              <a:rPr lang="en-US"/>
+              <a:rPr lang="en-US" smtClean="0"/>
               <a:t>Fifth level</a:t>
             </a:r>
             <a:endParaRPr lang="en-GB"/>
@@ -2426,7 +2072,7 @@
           <a:p>
             <a:pPr lvl="0"/>
             <a:r>
-              <a:rPr lang="en-US"/>
+              <a:rPr lang="en-US" smtClean="0"/>
               <a:t>Edit Master text styles</a:t>
             </a:r>
           </a:p>
@@ -2449,7 +2095,7 @@
           <a:p>
             <a:fld id="{AB91BCC1-83D7-40E0-AB70-2BF6E42928C4}" type="datetimeFigureOut">
               <a:rPr lang="en-GB" smtClean="0"/>
-              <a:t>06/09/2023</a:t>
+              <a:t>17/08/2023</a:t>
             </a:fld>
             <a:endParaRPr lang="en-GB"/>
           </a:p>
@@ -2552,7 +2198,7 @@
           </a:lstStyle>
           <a:p>
             <a:r>
-              <a:rPr lang="en-US"/>
+              <a:rPr lang="en-US" smtClean="0"/>
               <a:t>Click to edit Master title style</a:t>
             </a:r>
             <a:endParaRPr lang="en-GB"/>
@@ -2679,7 +2325,7 @@
           <a:p>
             <a:pPr lvl="0"/>
             <a:r>
-              <a:rPr lang="en-US"/>
+              <a:rPr lang="en-US" smtClean="0"/>
               <a:t>Edit Master text styles</a:t>
             </a:r>
           </a:p>
@@ -2702,7 +2348,7 @@
           <a:p>
             <a:fld id="{AB91BCC1-83D7-40E0-AB70-2BF6E42928C4}" type="datetimeFigureOut">
               <a:rPr lang="en-GB" smtClean="0"/>
-              <a:t>06/09/2023</a:t>
+              <a:t>17/08/2023</a:t>
             </a:fld>
             <a:endParaRPr lang="en-GB"/>
           </a:p>
@@ -2811,7 +2457,7 @@
           <a:lstStyle/>
           <a:p>
             <a:r>
-              <a:rPr lang="en-US"/>
+              <a:rPr lang="en-US" smtClean="0"/>
               <a:t>Click to edit Master title style</a:t>
             </a:r>
             <a:endParaRPr lang="en-GB"/>
@@ -2845,35 +2491,35 @@
           <a:p>
             <a:pPr lvl="0"/>
             <a:r>
-              <a:rPr lang="en-US"/>
+              <a:rPr lang="en-US" smtClean="0"/>
               <a:t>Edit Master text styles</a:t>
             </a:r>
           </a:p>
           <a:p>
             <a:pPr lvl="1"/>
             <a:r>
-              <a:rPr lang="en-US"/>
+              <a:rPr lang="en-US" smtClean="0"/>
               <a:t>Second level</a:t>
             </a:r>
           </a:p>
           <a:p>
             <a:pPr lvl="2"/>
             <a:r>
-              <a:rPr lang="en-US"/>
+              <a:rPr lang="en-US" smtClean="0"/>
               <a:t>Third level</a:t>
             </a:r>
           </a:p>
           <a:p>
             <a:pPr lvl="3"/>
             <a:r>
-              <a:rPr lang="en-US"/>
+              <a:rPr lang="en-US" smtClean="0"/>
               <a:t>Fourth level</a:t>
             </a:r>
           </a:p>
           <a:p>
             <a:pPr lvl="4"/>
             <a:r>
-              <a:rPr lang="en-US"/>
+              <a:rPr lang="en-US" smtClean="0"/>
               <a:t>Fifth level</a:t>
             </a:r>
             <a:endParaRPr lang="en-GB"/>
@@ -2915,7 +2561,7 @@
           <a:p>
             <a:fld id="{AB91BCC1-83D7-40E0-AB70-2BF6E42928C4}" type="datetimeFigureOut">
               <a:rPr lang="en-GB" smtClean="0"/>
-              <a:t>06/09/2023</a:t>
+              <a:t>17/08/2023</a:t>
             </a:fld>
             <a:endParaRPr lang="en-GB"/>
           </a:p>
@@ -3363,13 +3009,18 @@
           <a:p>
             <a:pPr algn="ctr"/>
             <a:r>
-              <a:rPr lang="en-GB" dirty="0">
+              <a:rPr lang="en-GB" dirty="0" smtClean="0">
                 <a:solidFill>
                   <a:schemeClr val="tx1"/>
                 </a:solidFill>
               </a:rPr>
               <a:t>Extroversion</a:t>
             </a:r>
+            <a:endParaRPr lang="en-GB" dirty="0">
+              <a:solidFill>
+                <a:schemeClr val="tx1"/>
+              </a:solidFill>
+            </a:endParaRPr>
           </a:p>
         </p:txBody>
       </p:sp>
@@ -3416,7 +3067,7 @@
           <a:p>
             <a:pPr algn="ctr"/>
             <a:r>
-              <a:rPr lang="en-GB" dirty="0" err="1">
+              <a:rPr lang="en-GB" dirty="0" err="1" smtClean="0">
                 <a:solidFill>
                   <a:schemeClr val="tx1"/>
                 </a:solidFill>
@@ -3424,13 +3075,18 @@
               <a:t>Consc</a:t>
             </a:r>
             <a:r>
-              <a:rPr lang="en-GB" dirty="0">
+              <a:rPr lang="en-GB" dirty="0" smtClean="0">
                 <a:solidFill>
                   <a:schemeClr val="tx1"/>
                 </a:solidFill>
               </a:rPr>
               <a:t>.</a:t>
             </a:r>
+            <a:endParaRPr lang="en-GB" dirty="0">
+              <a:solidFill>
+                <a:schemeClr val="tx1"/>
+              </a:solidFill>
+            </a:endParaRPr>
           </a:p>
         </p:txBody>
       </p:sp>
@@ -3477,13 +3133,18 @@
           <a:p>
             <a:pPr algn="ctr"/>
             <a:r>
-              <a:rPr lang="en-GB" dirty="0">
+              <a:rPr lang="en-GB" dirty="0" smtClean="0">
                 <a:solidFill>
                   <a:schemeClr val="tx1"/>
                 </a:solidFill>
               </a:rPr>
               <a:t>Maths Interest</a:t>
             </a:r>
+            <a:endParaRPr lang="en-GB" dirty="0">
+              <a:solidFill>
+                <a:schemeClr val="tx1"/>
+              </a:solidFill>
+            </a:endParaRPr>
           </a:p>
         </p:txBody>
       </p:sp>
@@ -3530,13 +3191,18 @@
           <a:p>
             <a:pPr algn="ctr"/>
             <a:r>
-              <a:rPr lang="en-GB" dirty="0">
+              <a:rPr lang="en-GB" dirty="0" smtClean="0">
                 <a:solidFill>
                   <a:schemeClr val="tx1"/>
                 </a:solidFill>
               </a:rPr>
               <a:t>English Interest</a:t>
             </a:r>
+            <a:endParaRPr lang="en-GB" dirty="0">
+              <a:solidFill>
+                <a:schemeClr val="tx1"/>
+              </a:solidFill>
+            </a:endParaRPr>
           </a:p>
         </p:txBody>
       </p:sp>
@@ -3583,13 +3249,18 @@
           <a:p>
             <a:pPr algn="ctr"/>
             <a:r>
-              <a:rPr lang="en-GB" dirty="0">
+              <a:rPr lang="en-GB" dirty="0" smtClean="0">
                 <a:solidFill>
                   <a:schemeClr val="tx1"/>
                 </a:solidFill>
               </a:rPr>
               <a:t>Age</a:t>
             </a:r>
+            <a:endParaRPr lang="en-GB" dirty="0">
+              <a:solidFill>
+                <a:schemeClr val="tx1"/>
+              </a:solidFill>
+            </a:endParaRPr>
           </a:p>
         </p:txBody>
       </p:sp>
@@ -3915,13 +3586,18 @@
             <a:p>
               <a:pPr algn="ctr"/>
               <a:r>
-                <a:rPr lang="en-GB" dirty="0">
+                <a:rPr lang="en-GB" dirty="0" smtClean="0">
                   <a:solidFill>
                     <a:schemeClr val="tx1"/>
                   </a:solidFill>
                 </a:rPr>
                 <a:t>Extroversion</a:t>
               </a:r>
+              <a:endParaRPr lang="en-GB" dirty="0">
+                <a:solidFill>
+                  <a:schemeClr val="tx1"/>
+                </a:solidFill>
+              </a:endParaRPr>
             </a:p>
           </p:txBody>
         </p:sp>
@@ -3968,7 +3644,7 @@
             <a:p>
               <a:pPr algn="ctr"/>
               <a:r>
-                <a:rPr lang="en-GB" dirty="0" err="1">
+                <a:rPr lang="en-GB" dirty="0" err="1" smtClean="0">
                   <a:solidFill>
                     <a:schemeClr val="tx1"/>
                   </a:solidFill>
@@ -3976,13 +3652,18 @@
                 <a:t>Consc</a:t>
               </a:r>
               <a:r>
-                <a:rPr lang="en-GB" dirty="0">
+                <a:rPr lang="en-GB" dirty="0" smtClean="0">
                   <a:solidFill>
                     <a:schemeClr val="tx1"/>
                   </a:solidFill>
                 </a:rPr>
                 <a:t>.</a:t>
               </a:r>
+              <a:endParaRPr lang="en-GB" dirty="0">
+                <a:solidFill>
+                  <a:schemeClr val="tx1"/>
+                </a:solidFill>
+              </a:endParaRPr>
             </a:p>
           </p:txBody>
         </p:sp>
@@ -4029,13 +3710,18 @@
             <a:p>
               <a:pPr algn="ctr"/>
               <a:r>
-                <a:rPr lang="en-GB" dirty="0">
+                <a:rPr lang="en-GB" dirty="0" smtClean="0">
                   <a:solidFill>
                     <a:schemeClr val="tx1"/>
                   </a:solidFill>
                 </a:rPr>
                 <a:t>Maths Interest</a:t>
               </a:r>
+              <a:endParaRPr lang="en-GB" dirty="0">
+                <a:solidFill>
+                  <a:schemeClr val="tx1"/>
+                </a:solidFill>
+              </a:endParaRPr>
             </a:p>
           </p:txBody>
         </p:sp>
@@ -4082,13 +3768,18 @@
             <a:p>
               <a:pPr algn="ctr"/>
               <a:r>
-                <a:rPr lang="en-GB" dirty="0">
+                <a:rPr lang="en-GB" dirty="0" smtClean="0">
                   <a:solidFill>
                     <a:schemeClr val="tx1"/>
                   </a:solidFill>
                 </a:rPr>
                 <a:t>English Interest</a:t>
               </a:r>
+              <a:endParaRPr lang="en-GB" dirty="0">
+                <a:solidFill>
+                  <a:schemeClr val="tx1"/>
+                </a:solidFill>
+              </a:endParaRPr>
             </a:p>
           </p:txBody>
         </p:sp>
@@ -4135,13 +3826,18 @@
             <a:p>
               <a:pPr algn="ctr"/>
               <a:r>
-                <a:rPr lang="en-GB" dirty="0">
+                <a:rPr lang="en-GB" dirty="0" smtClean="0">
                   <a:solidFill>
                     <a:schemeClr val="tx1"/>
                   </a:solidFill>
                 </a:rPr>
                 <a:t>Age</a:t>
               </a:r>
+              <a:endParaRPr lang="en-GB" dirty="0">
+                <a:solidFill>
+                  <a:schemeClr val="tx1"/>
+                </a:solidFill>
+              </a:endParaRPr>
             </a:p>
           </p:txBody>
         </p:sp>
@@ -4923,13 +4619,18 @@
             <a:p>
               <a:pPr algn="ctr"/>
               <a:r>
-                <a:rPr lang="en-GB" dirty="0">
+                <a:rPr lang="en-GB" dirty="0" smtClean="0">
                   <a:solidFill>
                     <a:schemeClr val="tx1"/>
                   </a:solidFill>
                 </a:rPr>
                 <a:t>Extroversion</a:t>
               </a:r>
+              <a:endParaRPr lang="en-GB" dirty="0">
+                <a:solidFill>
+                  <a:schemeClr val="tx1"/>
+                </a:solidFill>
+              </a:endParaRPr>
             </a:p>
           </p:txBody>
         </p:sp>
@@ -4976,7 +4677,7 @@
             <a:p>
               <a:pPr algn="ctr"/>
               <a:r>
-                <a:rPr lang="en-GB" dirty="0" err="1">
+                <a:rPr lang="en-GB" dirty="0" err="1" smtClean="0">
                   <a:solidFill>
                     <a:schemeClr val="tx1"/>
                   </a:solidFill>
@@ -4984,13 +4685,18 @@
                 <a:t>Consc</a:t>
               </a:r>
               <a:r>
-                <a:rPr lang="en-GB" dirty="0">
+                <a:rPr lang="en-GB" dirty="0" smtClean="0">
                   <a:solidFill>
                     <a:schemeClr val="tx1"/>
                   </a:solidFill>
                 </a:rPr>
                 <a:t>.</a:t>
               </a:r>
+              <a:endParaRPr lang="en-GB" dirty="0">
+                <a:solidFill>
+                  <a:schemeClr val="tx1"/>
+                </a:solidFill>
+              </a:endParaRPr>
             </a:p>
           </p:txBody>
         </p:sp>
@@ -5037,13 +4743,18 @@
             <a:p>
               <a:pPr algn="ctr"/>
               <a:r>
-                <a:rPr lang="en-GB" dirty="0">
+                <a:rPr lang="en-GB" dirty="0" smtClean="0">
                   <a:solidFill>
                     <a:schemeClr val="tx1"/>
                   </a:solidFill>
                 </a:rPr>
                 <a:t>Maths Interest</a:t>
               </a:r>
+              <a:endParaRPr lang="en-GB" dirty="0">
+                <a:solidFill>
+                  <a:schemeClr val="tx1"/>
+                </a:solidFill>
+              </a:endParaRPr>
             </a:p>
           </p:txBody>
         </p:sp>
@@ -5090,13 +4801,18 @@
             <a:p>
               <a:pPr algn="ctr"/>
               <a:r>
-                <a:rPr lang="en-GB" dirty="0">
+                <a:rPr lang="en-GB" dirty="0" smtClean="0">
                   <a:solidFill>
                     <a:schemeClr val="tx1"/>
                   </a:solidFill>
                 </a:rPr>
                 <a:t>English Interest</a:t>
               </a:r>
+              <a:endParaRPr lang="en-GB" dirty="0">
+                <a:solidFill>
+                  <a:schemeClr val="tx1"/>
+                </a:solidFill>
+              </a:endParaRPr>
             </a:p>
           </p:txBody>
         </p:sp>
@@ -5143,13 +4859,18 @@
             <a:p>
               <a:pPr algn="ctr"/>
               <a:r>
-                <a:rPr lang="en-GB" dirty="0">
+                <a:rPr lang="en-GB" dirty="0" smtClean="0">
                   <a:solidFill>
                     <a:schemeClr val="tx1"/>
                   </a:solidFill>
                 </a:rPr>
                 <a:t>Age</a:t>
               </a:r>
+              <a:endParaRPr lang="en-GB" dirty="0">
+                <a:solidFill>
+                  <a:schemeClr val="tx1"/>
+                </a:solidFill>
+              </a:endParaRPr>
             </a:p>
           </p:txBody>
         </p:sp>
@@ -5858,1959 +5579,6 @@
     <p:extLst>
       <p:ext uri="{BB962C8B-B14F-4D97-AF65-F5344CB8AC3E}">
         <p14:creationId xmlns:p14="http://schemas.microsoft.com/office/powerpoint/2010/main" val="3111813444"/>
-      </p:ext>
-    </p:extLst>
-  </p:cSld>
-  <p:clrMapOvr>
-    <a:masterClrMapping/>
-  </p:clrMapOvr>
-</p:sld>
-</file>
-
-<file path=ppt/slides/slide4.xml><?xml version="1.0" encoding="utf-8"?>
-<p:sld xmlns:a="http://schemas.openxmlformats.org/drawingml/2006/main" xmlns:r="http://schemas.openxmlformats.org/officeDocument/2006/relationships" xmlns:p="http://schemas.openxmlformats.org/presentationml/2006/main">
-  <p:cSld>
-    <p:spTree>
-      <p:nvGrpSpPr>
-        <p:cNvPr id="1" name=""/>
-        <p:cNvGrpSpPr/>
-        <p:nvPr/>
-      </p:nvGrpSpPr>
-      <p:grpSpPr>
-        <a:xfrm>
-          <a:off x="0" y="0"/>
-          <a:ext cx="0" cy="0"/>
-          <a:chOff x="0" y="0"/>
-          <a:chExt cx="0" cy="0"/>
-        </a:xfrm>
-      </p:grpSpPr>
-      <p:grpSp>
-        <p:nvGrpSpPr>
-          <p:cNvPr id="22" name="Group 21">
-            <a:extLst>
-              <a:ext uri="{FF2B5EF4-FFF2-40B4-BE49-F238E27FC236}">
-                <a16:creationId xmlns:a16="http://schemas.microsoft.com/office/drawing/2014/main" id="{A45D3BBD-83EA-C72A-F34A-A3E0CADE9FC2}"/>
-              </a:ext>
-            </a:extLst>
-          </p:cNvPr>
-          <p:cNvGrpSpPr/>
-          <p:nvPr/>
-        </p:nvGrpSpPr>
-        <p:grpSpPr>
-          <a:xfrm>
-            <a:off x="2211992" y="1526757"/>
-            <a:ext cx="8072365" cy="2904575"/>
-            <a:chOff x="1891952" y="1004243"/>
-            <a:chExt cx="8072365" cy="2904575"/>
-          </a:xfrm>
-        </p:grpSpPr>
-        <p:sp>
-          <p:nvSpPr>
-            <p:cNvPr id="4" name="Rectangle 3"/>
-            <p:cNvSpPr/>
-            <p:nvPr/>
-          </p:nvSpPr>
-          <p:spPr>
-            <a:xfrm>
-              <a:off x="1891952" y="3135735"/>
-              <a:ext cx="1487978" cy="773083"/>
-            </a:xfrm>
-            <a:prstGeom prst="rect">
-              <a:avLst/>
-            </a:prstGeom>
-            <a:noFill/>
-            <a:ln>
-              <a:solidFill>
-                <a:schemeClr val="tx1"/>
-              </a:solidFill>
-            </a:ln>
-          </p:spPr>
-          <p:style>
-            <a:lnRef idx="2">
-              <a:schemeClr val="accent1">
-                <a:shade val="50000"/>
-              </a:schemeClr>
-            </a:lnRef>
-            <a:fillRef idx="1">
-              <a:schemeClr val="accent1"/>
-            </a:fillRef>
-            <a:effectRef idx="0">
-              <a:schemeClr val="accent1"/>
-            </a:effectRef>
-            <a:fontRef idx="minor">
-              <a:schemeClr val="lt1"/>
-            </a:fontRef>
-          </p:style>
-          <p:txBody>
-            <a:bodyPr rtlCol="0" anchor="ctr"/>
-            <a:lstStyle/>
-            <a:p>
-              <a:pPr algn="ctr"/>
-              <a:r>
-                <a:rPr lang="en-GB" dirty="0">
-                  <a:solidFill>
-                    <a:schemeClr val="tx1"/>
-                  </a:solidFill>
-                </a:rPr>
-                <a:t>X</a:t>
-              </a:r>
-            </a:p>
-          </p:txBody>
-        </p:sp>
-        <p:sp>
-          <p:nvSpPr>
-            <p:cNvPr id="6" name="Rectangle 5"/>
-            <p:cNvSpPr/>
-            <p:nvPr/>
-          </p:nvSpPr>
-          <p:spPr>
-            <a:xfrm>
-              <a:off x="4887898" y="1693802"/>
-              <a:ext cx="1487978" cy="773083"/>
-            </a:xfrm>
-            <a:prstGeom prst="rect">
-              <a:avLst/>
-            </a:prstGeom>
-            <a:noFill/>
-            <a:ln>
-              <a:solidFill>
-                <a:schemeClr val="tx1"/>
-              </a:solidFill>
-            </a:ln>
-          </p:spPr>
-          <p:style>
-            <a:lnRef idx="2">
-              <a:schemeClr val="accent1">
-                <a:shade val="50000"/>
-              </a:schemeClr>
-            </a:lnRef>
-            <a:fillRef idx="1">
-              <a:schemeClr val="accent1"/>
-            </a:fillRef>
-            <a:effectRef idx="0">
-              <a:schemeClr val="accent1"/>
-            </a:effectRef>
-            <a:fontRef idx="minor">
-              <a:schemeClr val="lt1"/>
-            </a:fontRef>
-          </p:style>
-          <p:txBody>
-            <a:bodyPr rtlCol="0" anchor="ctr"/>
-            <a:lstStyle/>
-            <a:p>
-              <a:pPr algn="ctr"/>
-              <a:r>
-                <a:rPr lang="en-GB" dirty="0">
-                  <a:solidFill>
-                    <a:schemeClr val="tx1"/>
-                  </a:solidFill>
-                </a:rPr>
-                <a:t>M</a:t>
-              </a:r>
-            </a:p>
-          </p:txBody>
-        </p:sp>
-        <p:sp>
-          <p:nvSpPr>
-            <p:cNvPr id="7" name="Rectangle 6"/>
-            <p:cNvSpPr/>
-            <p:nvPr/>
-          </p:nvSpPr>
-          <p:spPr>
-            <a:xfrm>
-              <a:off x="7869201" y="3135735"/>
-              <a:ext cx="1487978" cy="773083"/>
-            </a:xfrm>
-            <a:prstGeom prst="rect">
-              <a:avLst/>
-            </a:prstGeom>
-            <a:noFill/>
-            <a:ln>
-              <a:solidFill>
-                <a:schemeClr val="tx1"/>
-              </a:solidFill>
-            </a:ln>
-          </p:spPr>
-          <p:style>
-            <a:lnRef idx="2">
-              <a:schemeClr val="accent1">
-                <a:shade val="50000"/>
-              </a:schemeClr>
-            </a:lnRef>
-            <a:fillRef idx="1">
-              <a:schemeClr val="accent1"/>
-            </a:fillRef>
-            <a:effectRef idx="0">
-              <a:schemeClr val="accent1"/>
-            </a:effectRef>
-            <a:fontRef idx="minor">
-              <a:schemeClr val="lt1"/>
-            </a:fontRef>
-          </p:style>
-          <p:txBody>
-            <a:bodyPr rtlCol="0" anchor="ctr"/>
-            <a:lstStyle/>
-            <a:p>
-              <a:pPr algn="ctr"/>
-              <a:r>
-                <a:rPr lang="en-GB" dirty="0">
-                  <a:solidFill>
-                    <a:schemeClr val="tx1"/>
-                  </a:solidFill>
-                </a:rPr>
-                <a:t>Y</a:t>
-              </a:r>
-            </a:p>
-          </p:txBody>
-        </p:sp>
-        <p:cxnSp>
-          <p:nvCxnSpPr>
-            <p:cNvPr id="35" name="Straight Arrow Connector 34"/>
-            <p:cNvCxnSpPr>
-              <a:cxnSpLocks/>
-              <a:stCxn id="39" idx="4"/>
-              <a:endCxn id="6" idx="0"/>
-            </p:cNvCxnSpPr>
-            <p:nvPr/>
-          </p:nvCxnSpPr>
-          <p:spPr>
-            <a:xfrm>
-              <a:off x="5631887" y="1250855"/>
-              <a:ext cx="0" cy="442947"/>
-            </a:xfrm>
-            <a:prstGeom prst="straightConnector1">
-              <a:avLst/>
-            </a:prstGeom>
-            <a:ln w="12700">
-              <a:solidFill>
-                <a:schemeClr val="tx1"/>
-              </a:solidFill>
-              <a:tailEnd type="triangle"/>
-            </a:ln>
-          </p:spPr>
-          <p:style>
-            <a:lnRef idx="1">
-              <a:schemeClr val="accent1"/>
-            </a:lnRef>
-            <a:fillRef idx="0">
-              <a:schemeClr val="accent1"/>
-            </a:fillRef>
-            <a:effectRef idx="0">
-              <a:schemeClr val="accent1"/>
-            </a:effectRef>
-            <a:fontRef idx="minor">
-              <a:schemeClr val="tx1"/>
-            </a:fontRef>
-          </p:style>
-        </p:cxnSp>
-        <p:cxnSp>
-          <p:nvCxnSpPr>
-            <p:cNvPr id="38" name="Straight Arrow Connector 37"/>
-            <p:cNvCxnSpPr/>
-            <p:nvPr/>
-          </p:nvCxnSpPr>
-          <p:spPr>
-            <a:xfrm flipH="1">
-              <a:off x="9358564" y="3522275"/>
-              <a:ext cx="353827" cy="1"/>
-            </a:xfrm>
-            <a:prstGeom prst="straightConnector1">
-              <a:avLst/>
-            </a:prstGeom>
-            <a:ln w="12700">
-              <a:solidFill>
-                <a:schemeClr val="tx1"/>
-              </a:solidFill>
-              <a:tailEnd type="triangle"/>
-            </a:ln>
-          </p:spPr>
-          <p:style>
-            <a:lnRef idx="1">
-              <a:schemeClr val="accent1"/>
-            </a:lnRef>
-            <a:fillRef idx="0">
-              <a:schemeClr val="accent1"/>
-            </a:fillRef>
-            <a:effectRef idx="0">
-              <a:schemeClr val="accent1"/>
-            </a:effectRef>
-            <a:fontRef idx="minor">
-              <a:schemeClr val="tx1"/>
-            </a:fontRef>
-          </p:style>
-        </p:cxnSp>
-        <p:sp>
-          <p:nvSpPr>
-            <p:cNvPr id="39" name="Oval 38"/>
-            <p:cNvSpPr/>
-            <p:nvPr/>
-          </p:nvSpPr>
-          <p:spPr>
-            <a:xfrm>
-              <a:off x="5505924" y="1004243"/>
-              <a:ext cx="251926" cy="246612"/>
-            </a:xfrm>
-            <a:prstGeom prst="ellipse">
-              <a:avLst/>
-            </a:prstGeom>
-            <a:noFill/>
-            <a:ln>
-              <a:solidFill>
-                <a:schemeClr val="tx1"/>
-              </a:solidFill>
-            </a:ln>
-          </p:spPr>
-          <p:style>
-            <a:lnRef idx="2">
-              <a:schemeClr val="accent1">
-                <a:shade val="50000"/>
-              </a:schemeClr>
-            </a:lnRef>
-            <a:fillRef idx="1">
-              <a:schemeClr val="accent1"/>
-            </a:fillRef>
-            <a:effectRef idx="0">
-              <a:schemeClr val="accent1"/>
-            </a:effectRef>
-            <a:fontRef idx="minor">
-              <a:schemeClr val="lt1"/>
-            </a:fontRef>
-          </p:style>
-          <p:txBody>
-            <a:bodyPr rtlCol="0" anchor="ctr"/>
-            <a:lstStyle/>
-            <a:p>
-              <a:pPr algn="ctr"/>
-              <a:endParaRPr lang="en-GB"/>
-            </a:p>
-          </p:txBody>
-        </p:sp>
-        <p:sp>
-          <p:nvSpPr>
-            <p:cNvPr id="41" name="Oval 40"/>
-            <p:cNvSpPr/>
-            <p:nvPr/>
-          </p:nvSpPr>
-          <p:spPr>
-            <a:xfrm>
-              <a:off x="9712391" y="3393569"/>
-              <a:ext cx="251926" cy="246612"/>
-            </a:xfrm>
-            <a:prstGeom prst="ellipse">
-              <a:avLst/>
-            </a:prstGeom>
-            <a:noFill/>
-            <a:ln>
-              <a:solidFill>
-                <a:schemeClr val="tx1"/>
-              </a:solidFill>
-            </a:ln>
-          </p:spPr>
-          <p:style>
-            <a:lnRef idx="2">
-              <a:schemeClr val="accent1">
-                <a:shade val="50000"/>
-              </a:schemeClr>
-            </a:lnRef>
-            <a:fillRef idx="1">
-              <a:schemeClr val="accent1"/>
-            </a:fillRef>
-            <a:effectRef idx="0">
-              <a:schemeClr val="accent1"/>
-            </a:effectRef>
-            <a:fontRef idx="minor">
-              <a:schemeClr val="lt1"/>
-            </a:fontRef>
-          </p:style>
-          <p:txBody>
-            <a:bodyPr rtlCol="0" anchor="ctr"/>
-            <a:lstStyle/>
-            <a:p>
-              <a:pPr algn="ctr"/>
-              <a:endParaRPr lang="en-GB"/>
-            </a:p>
-          </p:txBody>
-        </p:sp>
-        <p:sp>
-          <p:nvSpPr>
-            <p:cNvPr id="43" name="Right Bracket 42"/>
-            <p:cNvSpPr/>
-            <p:nvPr/>
-          </p:nvSpPr>
-          <p:spPr>
-            <a:xfrm rot="16200000">
-              <a:off x="2511872" y="2884886"/>
-              <a:ext cx="248137" cy="217481"/>
-            </a:xfrm>
-            <a:prstGeom prst="rightBracket">
-              <a:avLst>
-                <a:gd name="adj" fmla="val 208332"/>
-              </a:avLst>
-            </a:prstGeom>
-            <a:ln w="12700">
-              <a:solidFill>
-                <a:schemeClr val="tx1"/>
-              </a:solidFill>
-              <a:headEnd type="triangle"/>
-              <a:tailEnd type="triangle"/>
-            </a:ln>
-          </p:spPr>
-          <p:style>
-            <a:lnRef idx="1">
-              <a:schemeClr val="accent1"/>
-            </a:lnRef>
-            <a:fillRef idx="0">
-              <a:schemeClr val="accent1"/>
-            </a:fillRef>
-            <a:effectRef idx="0">
-              <a:schemeClr val="accent1"/>
-            </a:effectRef>
-            <a:fontRef idx="minor">
-              <a:schemeClr val="tx1"/>
-            </a:fontRef>
-          </p:style>
-          <p:txBody>
-            <a:bodyPr rtlCol="0" anchor="ctr"/>
-            <a:lstStyle/>
-            <a:p>
-              <a:pPr algn="ctr"/>
-              <a:endParaRPr lang="en-GB"/>
-            </a:p>
-          </p:txBody>
-        </p:sp>
-        <p:cxnSp>
-          <p:nvCxnSpPr>
-            <p:cNvPr id="10" name="Straight Arrow Connector 9">
-              <a:extLst>
-                <a:ext uri="{FF2B5EF4-FFF2-40B4-BE49-F238E27FC236}">
-                  <a16:creationId xmlns:a16="http://schemas.microsoft.com/office/drawing/2014/main" id="{CBCB3278-E1A8-2469-C52C-0133701BF3F4}"/>
-                </a:ext>
-              </a:extLst>
-            </p:cNvPr>
-            <p:cNvCxnSpPr>
-              <a:stCxn id="4" idx="3"/>
-              <a:endCxn id="6" idx="1"/>
-            </p:cNvCxnSpPr>
-            <p:nvPr/>
-          </p:nvCxnSpPr>
-          <p:spPr>
-            <a:xfrm flipV="1">
-              <a:off x="3379930" y="2080344"/>
-              <a:ext cx="1507968" cy="1441933"/>
-            </a:xfrm>
-            <a:prstGeom prst="straightConnector1">
-              <a:avLst/>
-            </a:prstGeom>
-            <a:ln w="12700">
-              <a:solidFill>
-                <a:schemeClr val="tx1"/>
-              </a:solidFill>
-              <a:tailEnd type="triangle"/>
-            </a:ln>
-          </p:spPr>
-          <p:style>
-            <a:lnRef idx="1">
-              <a:schemeClr val="accent1"/>
-            </a:lnRef>
-            <a:fillRef idx="0">
-              <a:schemeClr val="accent1"/>
-            </a:fillRef>
-            <a:effectRef idx="0">
-              <a:schemeClr val="accent1"/>
-            </a:effectRef>
-            <a:fontRef idx="minor">
-              <a:schemeClr val="tx1"/>
-            </a:fontRef>
-          </p:style>
-        </p:cxnSp>
-        <p:cxnSp>
-          <p:nvCxnSpPr>
-            <p:cNvPr id="13" name="Straight Arrow Connector 12">
-              <a:extLst>
-                <a:ext uri="{FF2B5EF4-FFF2-40B4-BE49-F238E27FC236}">
-                  <a16:creationId xmlns:a16="http://schemas.microsoft.com/office/drawing/2014/main" id="{ACEDD3E8-03A9-2C3A-C082-5A8983C853C8}"/>
-                </a:ext>
-              </a:extLst>
-            </p:cNvPr>
-            <p:cNvCxnSpPr>
-              <a:stCxn id="6" idx="3"/>
-              <a:endCxn id="7" idx="1"/>
-            </p:cNvCxnSpPr>
-            <p:nvPr/>
-          </p:nvCxnSpPr>
-          <p:spPr>
-            <a:xfrm>
-              <a:off x="6375876" y="2080344"/>
-              <a:ext cx="1493325" cy="1441933"/>
-            </a:xfrm>
-            <a:prstGeom prst="straightConnector1">
-              <a:avLst/>
-            </a:prstGeom>
-            <a:ln w="12700">
-              <a:solidFill>
-                <a:schemeClr val="tx1"/>
-              </a:solidFill>
-              <a:tailEnd type="triangle"/>
-            </a:ln>
-          </p:spPr>
-          <p:style>
-            <a:lnRef idx="1">
-              <a:schemeClr val="accent1"/>
-            </a:lnRef>
-            <a:fillRef idx="0">
-              <a:schemeClr val="accent1"/>
-            </a:fillRef>
-            <a:effectRef idx="0">
-              <a:schemeClr val="accent1"/>
-            </a:effectRef>
-            <a:fontRef idx="minor">
-              <a:schemeClr val="tx1"/>
-            </a:fontRef>
-          </p:style>
-        </p:cxnSp>
-        <p:cxnSp>
-          <p:nvCxnSpPr>
-            <p:cNvPr id="21" name="Straight Arrow Connector 20">
-              <a:extLst>
-                <a:ext uri="{FF2B5EF4-FFF2-40B4-BE49-F238E27FC236}">
-                  <a16:creationId xmlns:a16="http://schemas.microsoft.com/office/drawing/2014/main" id="{5135221A-49F0-183E-61CD-C17C2D306DB7}"/>
-                </a:ext>
-              </a:extLst>
-            </p:cNvPr>
-            <p:cNvCxnSpPr>
-              <a:stCxn id="4" idx="3"/>
-              <a:endCxn id="7" idx="1"/>
-            </p:cNvCxnSpPr>
-            <p:nvPr/>
-          </p:nvCxnSpPr>
-          <p:spPr>
-            <a:xfrm>
-              <a:off x="3379930" y="3522277"/>
-              <a:ext cx="4489271" cy="0"/>
-            </a:xfrm>
-            <a:prstGeom prst="straightConnector1">
-              <a:avLst/>
-            </a:prstGeom>
-            <a:ln w="12700">
-              <a:solidFill>
-                <a:schemeClr val="tx1"/>
-              </a:solidFill>
-              <a:tailEnd type="triangle"/>
-            </a:ln>
-          </p:spPr>
-          <p:style>
-            <a:lnRef idx="1">
-              <a:schemeClr val="accent1"/>
-            </a:lnRef>
-            <a:fillRef idx="0">
-              <a:schemeClr val="accent1"/>
-            </a:fillRef>
-            <a:effectRef idx="0">
-              <a:schemeClr val="accent1"/>
-            </a:effectRef>
-            <a:fontRef idx="minor">
-              <a:schemeClr val="tx1"/>
-            </a:fontRef>
-          </p:style>
-        </p:cxnSp>
-      </p:grpSp>
-    </p:spTree>
-    <p:extLst>
-      <p:ext uri="{BB962C8B-B14F-4D97-AF65-F5344CB8AC3E}">
-        <p14:creationId xmlns:p14="http://schemas.microsoft.com/office/powerpoint/2010/main" val="2959519369"/>
-      </p:ext>
-    </p:extLst>
-  </p:cSld>
-  <p:clrMapOvr>
-    <a:masterClrMapping/>
-  </p:clrMapOvr>
-</p:sld>
-</file>
-
-<file path=ppt/slides/slide5.xml><?xml version="1.0" encoding="utf-8"?>
-<p:sld xmlns:a="http://schemas.openxmlformats.org/drawingml/2006/main" xmlns:r="http://schemas.openxmlformats.org/officeDocument/2006/relationships" xmlns:p="http://schemas.openxmlformats.org/presentationml/2006/main">
-  <p:cSld>
-    <p:spTree>
-      <p:nvGrpSpPr>
-        <p:cNvPr id="1" name=""/>
-        <p:cNvGrpSpPr/>
-        <p:nvPr/>
-      </p:nvGrpSpPr>
-      <p:grpSpPr>
-        <a:xfrm>
-          <a:off x="0" y="0"/>
-          <a:ext cx="0" cy="0"/>
-          <a:chOff x="0" y="0"/>
-          <a:chExt cx="0" cy="0"/>
-        </a:xfrm>
-      </p:grpSpPr>
-      <p:grpSp>
-        <p:nvGrpSpPr>
-          <p:cNvPr id="8" name="Group 7">
-            <a:extLst>
-              <a:ext uri="{FF2B5EF4-FFF2-40B4-BE49-F238E27FC236}">
-                <a16:creationId xmlns:a16="http://schemas.microsoft.com/office/drawing/2014/main" id="{EFA2D605-5532-DAEE-BDB9-C10C31D50A7D}"/>
-              </a:ext>
-            </a:extLst>
-          </p:cNvPr>
-          <p:cNvGrpSpPr/>
-          <p:nvPr/>
-        </p:nvGrpSpPr>
-        <p:grpSpPr>
-          <a:xfrm>
-            <a:off x="2211992" y="1526757"/>
-            <a:ext cx="8072365" cy="3020495"/>
-            <a:chOff x="2211992" y="1526757"/>
-            <a:chExt cx="8072365" cy="3020495"/>
-          </a:xfrm>
-        </p:grpSpPr>
-        <p:grpSp>
-          <p:nvGrpSpPr>
-            <p:cNvPr id="22" name="Group 21">
-              <a:extLst>
-                <a:ext uri="{FF2B5EF4-FFF2-40B4-BE49-F238E27FC236}">
-                  <a16:creationId xmlns:a16="http://schemas.microsoft.com/office/drawing/2014/main" id="{A45D3BBD-83EA-C72A-F34A-A3E0CADE9FC2}"/>
-                </a:ext>
-              </a:extLst>
-            </p:cNvPr>
-            <p:cNvGrpSpPr/>
-            <p:nvPr/>
-          </p:nvGrpSpPr>
-          <p:grpSpPr>
-            <a:xfrm>
-              <a:off x="2211992" y="1526757"/>
-              <a:ext cx="8072365" cy="2904575"/>
-              <a:chOff x="1891952" y="1004243"/>
-              <a:chExt cx="8072365" cy="2904575"/>
-            </a:xfrm>
-          </p:grpSpPr>
-          <p:sp>
-            <p:nvSpPr>
-              <p:cNvPr id="4" name="Rectangle 3"/>
-              <p:cNvSpPr/>
-              <p:nvPr/>
-            </p:nvSpPr>
-            <p:spPr>
-              <a:xfrm>
-                <a:off x="1891952" y="3135735"/>
-                <a:ext cx="1487978" cy="773083"/>
-              </a:xfrm>
-              <a:prstGeom prst="rect">
-                <a:avLst/>
-              </a:prstGeom>
-              <a:noFill/>
-              <a:ln>
-                <a:solidFill>
-                  <a:schemeClr val="tx1"/>
-                </a:solidFill>
-              </a:ln>
-            </p:spPr>
-            <p:style>
-              <a:lnRef idx="2">
-                <a:schemeClr val="accent1">
-                  <a:shade val="50000"/>
-                </a:schemeClr>
-              </a:lnRef>
-              <a:fillRef idx="1">
-                <a:schemeClr val="accent1"/>
-              </a:fillRef>
-              <a:effectRef idx="0">
-                <a:schemeClr val="accent1"/>
-              </a:effectRef>
-              <a:fontRef idx="minor">
-                <a:schemeClr val="lt1"/>
-              </a:fontRef>
-            </p:style>
-            <p:txBody>
-              <a:bodyPr rtlCol="0" anchor="ctr"/>
-              <a:lstStyle/>
-              <a:p>
-                <a:pPr algn="ctr"/>
-                <a:r>
-                  <a:rPr lang="en-GB" dirty="0">
-                    <a:solidFill>
-                      <a:schemeClr val="tx1"/>
-                    </a:solidFill>
-                  </a:rPr>
-                  <a:t>X</a:t>
-                </a:r>
-              </a:p>
-            </p:txBody>
-          </p:sp>
-          <p:sp>
-            <p:nvSpPr>
-              <p:cNvPr id="6" name="Rectangle 5"/>
-              <p:cNvSpPr/>
-              <p:nvPr/>
-            </p:nvSpPr>
-            <p:spPr>
-              <a:xfrm>
-                <a:off x="4887898" y="1693802"/>
-                <a:ext cx="1487978" cy="773083"/>
-              </a:xfrm>
-              <a:prstGeom prst="rect">
-                <a:avLst/>
-              </a:prstGeom>
-              <a:noFill/>
-              <a:ln>
-                <a:solidFill>
-                  <a:schemeClr val="tx1"/>
-                </a:solidFill>
-              </a:ln>
-            </p:spPr>
-            <p:style>
-              <a:lnRef idx="2">
-                <a:schemeClr val="accent1">
-                  <a:shade val="50000"/>
-                </a:schemeClr>
-              </a:lnRef>
-              <a:fillRef idx="1">
-                <a:schemeClr val="accent1"/>
-              </a:fillRef>
-              <a:effectRef idx="0">
-                <a:schemeClr val="accent1"/>
-              </a:effectRef>
-              <a:fontRef idx="minor">
-                <a:schemeClr val="lt1"/>
-              </a:fontRef>
-            </p:style>
-            <p:txBody>
-              <a:bodyPr rtlCol="0" anchor="ctr"/>
-              <a:lstStyle/>
-              <a:p>
-                <a:pPr algn="ctr"/>
-                <a:r>
-                  <a:rPr lang="en-GB" dirty="0">
-                    <a:solidFill>
-                      <a:schemeClr val="tx1"/>
-                    </a:solidFill>
-                  </a:rPr>
-                  <a:t>M</a:t>
-                </a:r>
-              </a:p>
-            </p:txBody>
-          </p:sp>
-          <p:sp>
-            <p:nvSpPr>
-              <p:cNvPr id="7" name="Rectangle 6"/>
-              <p:cNvSpPr/>
-              <p:nvPr/>
-            </p:nvSpPr>
-            <p:spPr>
-              <a:xfrm>
-                <a:off x="7869201" y="3135735"/>
-                <a:ext cx="1487978" cy="773083"/>
-              </a:xfrm>
-              <a:prstGeom prst="rect">
-                <a:avLst/>
-              </a:prstGeom>
-              <a:noFill/>
-              <a:ln>
-                <a:solidFill>
-                  <a:schemeClr val="tx1"/>
-                </a:solidFill>
-              </a:ln>
-            </p:spPr>
-            <p:style>
-              <a:lnRef idx="2">
-                <a:schemeClr val="accent1">
-                  <a:shade val="50000"/>
-                </a:schemeClr>
-              </a:lnRef>
-              <a:fillRef idx="1">
-                <a:schemeClr val="accent1"/>
-              </a:fillRef>
-              <a:effectRef idx="0">
-                <a:schemeClr val="accent1"/>
-              </a:effectRef>
-              <a:fontRef idx="minor">
-                <a:schemeClr val="lt1"/>
-              </a:fontRef>
-            </p:style>
-            <p:txBody>
-              <a:bodyPr rtlCol="0" anchor="ctr"/>
-              <a:lstStyle/>
-              <a:p>
-                <a:pPr algn="ctr"/>
-                <a:r>
-                  <a:rPr lang="en-GB" dirty="0">
-                    <a:solidFill>
-                      <a:schemeClr val="tx1"/>
-                    </a:solidFill>
-                  </a:rPr>
-                  <a:t>Y</a:t>
-                </a:r>
-              </a:p>
-            </p:txBody>
-          </p:sp>
-          <p:cxnSp>
-            <p:nvCxnSpPr>
-              <p:cNvPr id="35" name="Straight Arrow Connector 34"/>
-              <p:cNvCxnSpPr>
-                <a:cxnSpLocks/>
-                <a:stCxn id="39" idx="4"/>
-                <a:endCxn id="6" idx="0"/>
-              </p:cNvCxnSpPr>
-              <p:nvPr/>
-            </p:nvCxnSpPr>
-            <p:spPr>
-              <a:xfrm>
-                <a:off x="5631887" y="1250855"/>
-                <a:ext cx="0" cy="442947"/>
-              </a:xfrm>
-              <a:prstGeom prst="straightConnector1">
-                <a:avLst/>
-              </a:prstGeom>
-              <a:ln w="12700">
-                <a:solidFill>
-                  <a:schemeClr val="tx1"/>
-                </a:solidFill>
-                <a:tailEnd type="triangle"/>
-              </a:ln>
-            </p:spPr>
-            <p:style>
-              <a:lnRef idx="1">
-                <a:schemeClr val="accent1"/>
-              </a:lnRef>
-              <a:fillRef idx="0">
-                <a:schemeClr val="accent1"/>
-              </a:fillRef>
-              <a:effectRef idx="0">
-                <a:schemeClr val="accent1"/>
-              </a:effectRef>
-              <a:fontRef idx="minor">
-                <a:schemeClr val="tx1"/>
-              </a:fontRef>
-            </p:style>
-          </p:cxnSp>
-          <p:cxnSp>
-            <p:nvCxnSpPr>
-              <p:cNvPr id="38" name="Straight Arrow Connector 37"/>
-              <p:cNvCxnSpPr/>
-              <p:nvPr/>
-            </p:nvCxnSpPr>
-            <p:spPr>
-              <a:xfrm flipH="1">
-                <a:off x="9358564" y="3522275"/>
-                <a:ext cx="353827" cy="1"/>
-              </a:xfrm>
-              <a:prstGeom prst="straightConnector1">
-                <a:avLst/>
-              </a:prstGeom>
-              <a:ln w="12700">
-                <a:solidFill>
-                  <a:schemeClr val="tx1"/>
-                </a:solidFill>
-                <a:tailEnd type="triangle"/>
-              </a:ln>
-            </p:spPr>
-            <p:style>
-              <a:lnRef idx="1">
-                <a:schemeClr val="accent1"/>
-              </a:lnRef>
-              <a:fillRef idx="0">
-                <a:schemeClr val="accent1"/>
-              </a:fillRef>
-              <a:effectRef idx="0">
-                <a:schemeClr val="accent1"/>
-              </a:effectRef>
-              <a:fontRef idx="minor">
-                <a:schemeClr val="tx1"/>
-              </a:fontRef>
-            </p:style>
-          </p:cxnSp>
-          <p:sp>
-            <p:nvSpPr>
-              <p:cNvPr id="39" name="Oval 38"/>
-              <p:cNvSpPr/>
-              <p:nvPr/>
-            </p:nvSpPr>
-            <p:spPr>
-              <a:xfrm>
-                <a:off x="5505924" y="1004243"/>
-                <a:ext cx="251926" cy="246612"/>
-              </a:xfrm>
-              <a:prstGeom prst="ellipse">
-                <a:avLst/>
-              </a:prstGeom>
-              <a:noFill/>
-              <a:ln>
-                <a:solidFill>
-                  <a:schemeClr val="tx1"/>
-                </a:solidFill>
-              </a:ln>
-            </p:spPr>
-            <p:style>
-              <a:lnRef idx="2">
-                <a:schemeClr val="accent1">
-                  <a:shade val="50000"/>
-                </a:schemeClr>
-              </a:lnRef>
-              <a:fillRef idx="1">
-                <a:schemeClr val="accent1"/>
-              </a:fillRef>
-              <a:effectRef idx="0">
-                <a:schemeClr val="accent1"/>
-              </a:effectRef>
-              <a:fontRef idx="minor">
-                <a:schemeClr val="lt1"/>
-              </a:fontRef>
-            </p:style>
-            <p:txBody>
-              <a:bodyPr rtlCol="0" anchor="ctr"/>
-              <a:lstStyle/>
-              <a:p>
-                <a:pPr algn="ctr"/>
-                <a:endParaRPr lang="en-GB"/>
-              </a:p>
-            </p:txBody>
-          </p:sp>
-          <p:sp>
-            <p:nvSpPr>
-              <p:cNvPr id="41" name="Oval 40"/>
-              <p:cNvSpPr/>
-              <p:nvPr/>
-            </p:nvSpPr>
-            <p:spPr>
-              <a:xfrm>
-                <a:off x="9712391" y="3393569"/>
-                <a:ext cx="251926" cy="246612"/>
-              </a:xfrm>
-              <a:prstGeom prst="ellipse">
-                <a:avLst/>
-              </a:prstGeom>
-              <a:noFill/>
-              <a:ln>
-                <a:solidFill>
-                  <a:schemeClr val="tx1"/>
-                </a:solidFill>
-              </a:ln>
-            </p:spPr>
-            <p:style>
-              <a:lnRef idx="2">
-                <a:schemeClr val="accent1">
-                  <a:shade val="50000"/>
-                </a:schemeClr>
-              </a:lnRef>
-              <a:fillRef idx="1">
-                <a:schemeClr val="accent1"/>
-              </a:fillRef>
-              <a:effectRef idx="0">
-                <a:schemeClr val="accent1"/>
-              </a:effectRef>
-              <a:fontRef idx="minor">
-                <a:schemeClr val="lt1"/>
-              </a:fontRef>
-            </p:style>
-            <p:txBody>
-              <a:bodyPr rtlCol="0" anchor="ctr"/>
-              <a:lstStyle/>
-              <a:p>
-                <a:pPr algn="ctr"/>
-                <a:endParaRPr lang="en-GB"/>
-              </a:p>
-            </p:txBody>
-          </p:sp>
-          <p:sp>
-            <p:nvSpPr>
-              <p:cNvPr id="43" name="Right Bracket 42"/>
-              <p:cNvSpPr/>
-              <p:nvPr/>
-            </p:nvSpPr>
-            <p:spPr>
-              <a:xfrm rot="16200000">
-                <a:off x="2511872" y="2884886"/>
-                <a:ext cx="248137" cy="217481"/>
-              </a:xfrm>
-              <a:prstGeom prst="rightBracket">
-                <a:avLst>
-                  <a:gd name="adj" fmla="val 208332"/>
-                </a:avLst>
-              </a:prstGeom>
-              <a:ln w="12700">
-                <a:solidFill>
-                  <a:schemeClr val="tx1"/>
-                </a:solidFill>
-                <a:headEnd type="triangle"/>
-                <a:tailEnd type="triangle"/>
-              </a:ln>
-            </p:spPr>
-            <p:style>
-              <a:lnRef idx="1">
-                <a:schemeClr val="accent1"/>
-              </a:lnRef>
-              <a:fillRef idx="0">
-                <a:schemeClr val="accent1"/>
-              </a:fillRef>
-              <a:effectRef idx="0">
-                <a:schemeClr val="accent1"/>
-              </a:effectRef>
-              <a:fontRef idx="minor">
-                <a:schemeClr val="tx1"/>
-              </a:fontRef>
-            </p:style>
-            <p:txBody>
-              <a:bodyPr rtlCol="0" anchor="ctr"/>
-              <a:lstStyle/>
-              <a:p>
-                <a:pPr algn="ctr"/>
-                <a:endParaRPr lang="en-GB"/>
-              </a:p>
-            </p:txBody>
-          </p:sp>
-          <p:cxnSp>
-            <p:nvCxnSpPr>
-              <p:cNvPr id="10" name="Straight Arrow Connector 9">
-                <a:extLst>
-                  <a:ext uri="{FF2B5EF4-FFF2-40B4-BE49-F238E27FC236}">
-                    <a16:creationId xmlns:a16="http://schemas.microsoft.com/office/drawing/2014/main" id="{CBCB3278-E1A8-2469-C52C-0133701BF3F4}"/>
-                  </a:ext>
-                </a:extLst>
-              </p:cNvPr>
-              <p:cNvCxnSpPr>
-                <a:stCxn id="4" idx="3"/>
-                <a:endCxn id="6" idx="1"/>
-              </p:cNvCxnSpPr>
-              <p:nvPr/>
-            </p:nvCxnSpPr>
-            <p:spPr>
-              <a:xfrm flipV="1">
-                <a:off x="3379930" y="2080344"/>
-                <a:ext cx="1507968" cy="1441933"/>
-              </a:xfrm>
-              <a:prstGeom prst="straightConnector1">
-                <a:avLst/>
-              </a:prstGeom>
-              <a:ln w="12700">
-                <a:solidFill>
-                  <a:schemeClr val="accent2">
-                    <a:lumMod val="60000"/>
-                    <a:lumOff val="40000"/>
-                  </a:schemeClr>
-                </a:solidFill>
-                <a:tailEnd type="triangle"/>
-              </a:ln>
-            </p:spPr>
-            <p:style>
-              <a:lnRef idx="1">
-                <a:schemeClr val="accent1"/>
-              </a:lnRef>
-              <a:fillRef idx="0">
-                <a:schemeClr val="accent1"/>
-              </a:fillRef>
-              <a:effectRef idx="0">
-                <a:schemeClr val="accent1"/>
-              </a:effectRef>
-              <a:fontRef idx="minor">
-                <a:schemeClr val="tx1"/>
-              </a:fontRef>
-            </p:style>
-          </p:cxnSp>
-          <p:cxnSp>
-            <p:nvCxnSpPr>
-              <p:cNvPr id="13" name="Straight Arrow Connector 12">
-                <a:extLst>
-                  <a:ext uri="{FF2B5EF4-FFF2-40B4-BE49-F238E27FC236}">
-                    <a16:creationId xmlns:a16="http://schemas.microsoft.com/office/drawing/2014/main" id="{ACEDD3E8-03A9-2C3A-C082-5A8983C853C8}"/>
-                  </a:ext>
-                </a:extLst>
-              </p:cNvPr>
-              <p:cNvCxnSpPr>
-                <a:stCxn id="6" idx="3"/>
-                <a:endCxn id="7" idx="1"/>
-              </p:cNvCxnSpPr>
-              <p:nvPr/>
-            </p:nvCxnSpPr>
-            <p:spPr>
-              <a:xfrm>
-                <a:off x="6375876" y="2080344"/>
-                <a:ext cx="1493325" cy="1441933"/>
-              </a:xfrm>
-              <a:prstGeom prst="straightConnector1">
-                <a:avLst/>
-              </a:prstGeom>
-              <a:ln w="12700">
-                <a:solidFill>
-                  <a:schemeClr val="accent2">
-                    <a:lumMod val="60000"/>
-                    <a:lumOff val="40000"/>
-                  </a:schemeClr>
-                </a:solidFill>
-                <a:tailEnd type="triangle"/>
-              </a:ln>
-            </p:spPr>
-            <p:style>
-              <a:lnRef idx="1">
-                <a:schemeClr val="accent1"/>
-              </a:lnRef>
-              <a:fillRef idx="0">
-                <a:schemeClr val="accent1"/>
-              </a:fillRef>
-              <a:effectRef idx="0">
-                <a:schemeClr val="accent1"/>
-              </a:effectRef>
-              <a:fontRef idx="minor">
-                <a:schemeClr val="tx1"/>
-              </a:fontRef>
-            </p:style>
-          </p:cxnSp>
-          <p:cxnSp>
-            <p:nvCxnSpPr>
-              <p:cNvPr id="21" name="Straight Arrow Connector 20">
-                <a:extLst>
-                  <a:ext uri="{FF2B5EF4-FFF2-40B4-BE49-F238E27FC236}">
-                    <a16:creationId xmlns:a16="http://schemas.microsoft.com/office/drawing/2014/main" id="{5135221A-49F0-183E-61CD-C17C2D306DB7}"/>
-                  </a:ext>
-                </a:extLst>
-              </p:cNvPr>
-              <p:cNvCxnSpPr>
-                <a:stCxn id="4" idx="3"/>
-                <a:endCxn id="7" idx="1"/>
-              </p:cNvCxnSpPr>
-              <p:nvPr/>
-            </p:nvCxnSpPr>
-            <p:spPr>
-              <a:xfrm>
-                <a:off x="3379930" y="3522277"/>
-                <a:ext cx="4489271" cy="0"/>
-              </a:xfrm>
-              <a:prstGeom prst="straightConnector1">
-                <a:avLst/>
-              </a:prstGeom>
-              <a:ln w="12700">
-                <a:solidFill>
-                  <a:schemeClr val="accent5">
-                    <a:lumMod val="60000"/>
-                    <a:lumOff val="40000"/>
-                  </a:schemeClr>
-                </a:solidFill>
-                <a:tailEnd type="triangle"/>
-              </a:ln>
-            </p:spPr>
-            <p:style>
-              <a:lnRef idx="1">
-                <a:schemeClr val="accent1"/>
-              </a:lnRef>
-              <a:fillRef idx="0">
-                <a:schemeClr val="accent1"/>
-              </a:fillRef>
-              <a:effectRef idx="0">
-                <a:schemeClr val="accent1"/>
-              </a:effectRef>
-              <a:fontRef idx="minor">
-                <a:schemeClr val="tx1"/>
-              </a:fontRef>
-            </p:style>
-          </p:cxnSp>
-        </p:grpSp>
-        <p:sp>
-          <p:nvSpPr>
-            <p:cNvPr id="2" name="TextBox 1">
-              <a:extLst>
-                <a:ext uri="{FF2B5EF4-FFF2-40B4-BE49-F238E27FC236}">
-                  <a16:creationId xmlns:a16="http://schemas.microsoft.com/office/drawing/2014/main" id="{F99AAF8A-BD8A-BD7D-7758-4F6AC6121EEF}"/>
-                </a:ext>
-              </a:extLst>
-            </p:cNvPr>
-            <p:cNvSpPr txBox="1"/>
-            <p:nvPr/>
-          </p:nvSpPr>
-          <p:spPr>
-            <a:xfrm>
-              <a:off x="3752396" y="2832581"/>
-              <a:ext cx="1017422" cy="369332"/>
-            </a:xfrm>
-            <a:prstGeom prst="rect">
-              <a:avLst/>
-            </a:prstGeom>
-            <a:noFill/>
-          </p:spPr>
-          <p:txBody>
-            <a:bodyPr wrap="square" rtlCol="0">
-              <a:spAutoFit/>
-            </a:bodyPr>
-            <a:lstStyle/>
-            <a:p>
-              <a:r>
-                <a:rPr lang="en-GB" dirty="0"/>
-                <a:t>Indirect</a:t>
-              </a:r>
-            </a:p>
-          </p:txBody>
-        </p:sp>
-        <p:sp>
-          <p:nvSpPr>
-            <p:cNvPr id="3" name="TextBox 2">
-              <a:extLst>
-                <a:ext uri="{FF2B5EF4-FFF2-40B4-BE49-F238E27FC236}">
-                  <a16:creationId xmlns:a16="http://schemas.microsoft.com/office/drawing/2014/main" id="{6AD4069F-0090-60B0-5597-01F6CB3DD842}"/>
-                </a:ext>
-              </a:extLst>
-            </p:cNvPr>
-            <p:cNvSpPr txBox="1"/>
-            <p:nvPr/>
-          </p:nvSpPr>
-          <p:spPr>
-            <a:xfrm>
-              <a:off x="7313000" y="2830419"/>
-              <a:ext cx="1017422" cy="369332"/>
-            </a:xfrm>
-            <a:prstGeom prst="rect">
-              <a:avLst/>
-            </a:prstGeom>
-            <a:noFill/>
-          </p:spPr>
-          <p:txBody>
-            <a:bodyPr wrap="square" rtlCol="0">
-              <a:spAutoFit/>
-            </a:bodyPr>
-            <a:lstStyle/>
-            <a:p>
-              <a:r>
-                <a:rPr lang="en-GB" dirty="0"/>
-                <a:t>Indirect</a:t>
-              </a:r>
-            </a:p>
-          </p:txBody>
-        </p:sp>
-        <p:sp>
-          <p:nvSpPr>
-            <p:cNvPr id="5" name="TextBox 4">
-              <a:extLst>
-                <a:ext uri="{FF2B5EF4-FFF2-40B4-BE49-F238E27FC236}">
-                  <a16:creationId xmlns:a16="http://schemas.microsoft.com/office/drawing/2014/main" id="{C05443CF-E076-3960-90BD-57863F45F3B2}"/>
-                </a:ext>
-              </a:extLst>
-            </p:cNvPr>
-            <p:cNvSpPr txBox="1"/>
-            <p:nvPr/>
-          </p:nvSpPr>
-          <p:spPr>
-            <a:xfrm>
-              <a:off x="5443216" y="4177920"/>
-              <a:ext cx="1017422" cy="369332"/>
-            </a:xfrm>
-            <a:prstGeom prst="rect">
-              <a:avLst/>
-            </a:prstGeom>
-            <a:noFill/>
-          </p:spPr>
-          <p:txBody>
-            <a:bodyPr wrap="square" rtlCol="0">
-              <a:spAutoFit/>
-            </a:bodyPr>
-            <a:lstStyle/>
-            <a:p>
-              <a:pPr algn="ctr"/>
-              <a:r>
-                <a:rPr lang="en-GB" dirty="0"/>
-                <a:t>Direct</a:t>
-              </a:r>
-            </a:p>
-          </p:txBody>
-        </p:sp>
-      </p:grpSp>
-    </p:spTree>
-    <p:extLst>
-      <p:ext uri="{BB962C8B-B14F-4D97-AF65-F5344CB8AC3E}">
-        <p14:creationId xmlns:p14="http://schemas.microsoft.com/office/powerpoint/2010/main" val="2526277780"/>
-      </p:ext>
-    </p:extLst>
-  </p:cSld>
-  <p:clrMapOvr>
-    <a:masterClrMapping/>
-  </p:clrMapOvr>
-</p:sld>
-</file>
-
-<file path=ppt/slides/slide6.xml><?xml version="1.0" encoding="utf-8"?>
-<p:sld xmlns:a="http://schemas.openxmlformats.org/drawingml/2006/main" xmlns:r="http://schemas.openxmlformats.org/officeDocument/2006/relationships" xmlns:p="http://schemas.openxmlformats.org/presentationml/2006/main">
-  <p:cSld>
-    <p:spTree>
-      <p:nvGrpSpPr>
-        <p:cNvPr id="1" name=""/>
-        <p:cNvGrpSpPr/>
-        <p:nvPr/>
-      </p:nvGrpSpPr>
-      <p:grpSpPr>
-        <a:xfrm>
-          <a:off x="0" y="0"/>
-          <a:ext cx="0" cy="0"/>
-          <a:chOff x="0" y="0"/>
-          <a:chExt cx="0" cy="0"/>
-        </a:xfrm>
-      </p:grpSpPr>
-      <p:grpSp>
-        <p:nvGrpSpPr>
-          <p:cNvPr id="8" name="Group 7">
-            <a:extLst>
-              <a:ext uri="{FF2B5EF4-FFF2-40B4-BE49-F238E27FC236}">
-                <a16:creationId xmlns:a16="http://schemas.microsoft.com/office/drawing/2014/main" id="{EFA2D605-5532-DAEE-BDB9-C10C31D50A7D}"/>
-              </a:ext>
-            </a:extLst>
-          </p:cNvPr>
-          <p:cNvGrpSpPr/>
-          <p:nvPr/>
-        </p:nvGrpSpPr>
-        <p:grpSpPr>
-          <a:xfrm>
-            <a:off x="2211992" y="1526757"/>
-            <a:ext cx="8072365" cy="3020495"/>
-            <a:chOff x="2211992" y="1526757"/>
-            <a:chExt cx="8072365" cy="3020495"/>
-          </a:xfrm>
-        </p:grpSpPr>
-        <p:grpSp>
-          <p:nvGrpSpPr>
-            <p:cNvPr id="22" name="Group 21">
-              <a:extLst>
-                <a:ext uri="{FF2B5EF4-FFF2-40B4-BE49-F238E27FC236}">
-                  <a16:creationId xmlns:a16="http://schemas.microsoft.com/office/drawing/2014/main" id="{A45D3BBD-83EA-C72A-F34A-A3E0CADE9FC2}"/>
-                </a:ext>
-              </a:extLst>
-            </p:cNvPr>
-            <p:cNvGrpSpPr/>
-            <p:nvPr/>
-          </p:nvGrpSpPr>
-          <p:grpSpPr>
-            <a:xfrm>
-              <a:off x="2211992" y="1526757"/>
-              <a:ext cx="8072365" cy="2904575"/>
-              <a:chOff x="1891952" y="1004243"/>
-              <a:chExt cx="8072365" cy="2904575"/>
-            </a:xfrm>
-          </p:grpSpPr>
-          <p:sp>
-            <p:nvSpPr>
-              <p:cNvPr id="4" name="Rectangle 3"/>
-              <p:cNvSpPr/>
-              <p:nvPr/>
-            </p:nvSpPr>
-            <p:spPr>
-              <a:xfrm>
-                <a:off x="1891952" y="3135735"/>
-                <a:ext cx="1487978" cy="773083"/>
-              </a:xfrm>
-              <a:prstGeom prst="rect">
-                <a:avLst/>
-              </a:prstGeom>
-              <a:noFill/>
-              <a:ln>
-                <a:solidFill>
-                  <a:schemeClr val="tx1"/>
-                </a:solidFill>
-              </a:ln>
-            </p:spPr>
-            <p:style>
-              <a:lnRef idx="2">
-                <a:schemeClr val="accent1">
-                  <a:shade val="50000"/>
-                </a:schemeClr>
-              </a:lnRef>
-              <a:fillRef idx="1">
-                <a:schemeClr val="accent1"/>
-              </a:fillRef>
-              <a:effectRef idx="0">
-                <a:schemeClr val="accent1"/>
-              </a:effectRef>
-              <a:fontRef idx="minor">
-                <a:schemeClr val="lt1"/>
-              </a:fontRef>
-            </p:style>
-            <p:txBody>
-              <a:bodyPr rtlCol="0" anchor="ctr"/>
-              <a:lstStyle/>
-              <a:p>
-                <a:pPr algn="ctr"/>
-                <a:r>
-                  <a:rPr lang="en-GB" dirty="0">
-                    <a:solidFill>
-                      <a:schemeClr val="tx1"/>
-                    </a:solidFill>
-                  </a:rPr>
-                  <a:t>X</a:t>
-                </a:r>
-              </a:p>
-            </p:txBody>
-          </p:sp>
-          <p:sp>
-            <p:nvSpPr>
-              <p:cNvPr id="6" name="Rectangle 5"/>
-              <p:cNvSpPr/>
-              <p:nvPr/>
-            </p:nvSpPr>
-            <p:spPr>
-              <a:xfrm>
-                <a:off x="4887898" y="1693802"/>
-                <a:ext cx="1487978" cy="773083"/>
-              </a:xfrm>
-              <a:prstGeom prst="rect">
-                <a:avLst/>
-              </a:prstGeom>
-              <a:noFill/>
-              <a:ln>
-                <a:solidFill>
-                  <a:schemeClr val="tx1"/>
-                </a:solidFill>
-              </a:ln>
-            </p:spPr>
-            <p:style>
-              <a:lnRef idx="2">
-                <a:schemeClr val="accent1">
-                  <a:shade val="50000"/>
-                </a:schemeClr>
-              </a:lnRef>
-              <a:fillRef idx="1">
-                <a:schemeClr val="accent1"/>
-              </a:fillRef>
-              <a:effectRef idx="0">
-                <a:schemeClr val="accent1"/>
-              </a:effectRef>
-              <a:fontRef idx="minor">
-                <a:schemeClr val="lt1"/>
-              </a:fontRef>
-            </p:style>
-            <p:txBody>
-              <a:bodyPr rtlCol="0" anchor="ctr"/>
-              <a:lstStyle/>
-              <a:p>
-                <a:pPr algn="ctr"/>
-                <a:r>
-                  <a:rPr lang="en-GB" dirty="0">
-                    <a:solidFill>
-                      <a:schemeClr val="tx1"/>
-                    </a:solidFill>
-                  </a:rPr>
-                  <a:t>M</a:t>
-                </a:r>
-              </a:p>
-            </p:txBody>
-          </p:sp>
-          <p:sp>
-            <p:nvSpPr>
-              <p:cNvPr id="7" name="Rectangle 6"/>
-              <p:cNvSpPr/>
-              <p:nvPr/>
-            </p:nvSpPr>
-            <p:spPr>
-              <a:xfrm>
-                <a:off x="7869201" y="3135735"/>
-                <a:ext cx="1487978" cy="773083"/>
-              </a:xfrm>
-              <a:prstGeom prst="rect">
-                <a:avLst/>
-              </a:prstGeom>
-              <a:noFill/>
-              <a:ln>
-                <a:solidFill>
-                  <a:schemeClr val="tx1"/>
-                </a:solidFill>
-              </a:ln>
-            </p:spPr>
-            <p:style>
-              <a:lnRef idx="2">
-                <a:schemeClr val="accent1">
-                  <a:shade val="50000"/>
-                </a:schemeClr>
-              </a:lnRef>
-              <a:fillRef idx="1">
-                <a:schemeClr val="accent1"/>
-              </a:fillRef>
-              <a:effectRef idx="0">
-                <a:schemeClr val="accent1"/>
-              </a:effectRef>
-              <a:fontRef idx="minor">
-                <a:schemeClr val="lt1"/>
-              </a:fontRef>
-            </p:style>
-            <p:txBody>
-              <a:bodyPr rtlCol="0" anchor="ctr"/>
-              <a:lstStyle/>
-              <a:p>
-                <a:pPr algn="ctr"/>
-                <a:r>
-                  <a:rPr lang="en-GB" dirty="0">
-                    <a:solidFill>
-                      <a:schemeClr val="tx1"/>
-                    </a:solidFill>
-                  </a:rPr>
-                  <a:t>Y</a:t>
-                </a:r>
-              </a:p>
-            </p:txBody>
-          </p:sp>
-          <p:cxnSp>
-            <p:nvCxnSpPr>
-              <p:cNvPr id="35" name="Straight Arrow Connector 34"/>
-              <p:cNvCxnSpPr>
-                <a:cxnSpLocks/>
-                <a:stCxn id="39" idx="4"/>
-                <a:endCxn id="6" idx="0"/>
-              </p:cNvCxnSpPr>
-              <p:nvPr/>
-            </p:nvCxnSpPr>
-            <p:spPr>
-              <a:xfrm>
-                <a:off x="5631887" y="1250855"/>
-                <a:ext cx="0" cy="442947"/>
-              </a:xfrm>
-              <a:prstGeom prst="straightConnector1">
-                <a:avLst/>
-              </a:prstGeom>
-              <a:ln w="12700">
-                <a:solidFill>
-                  <a:schemeClr val="tx1"/>
-                </a:solidFill>
-                <a:tailEnd type="triangle"/>
-              </a:ln>
-            </p:spPr>
-            <p:style>
-              <a:lnRef idx="1">
-                <a:schemeClr val="accent1"/>
-              </a:lnRef>
-              <a:fillRef idx="0">
-                <a:schemeClr val="accent1"/>
-              </a:fillRef>
-              <a:effectRef idx="0">
-                <a:schemeClr val="accent1"/>
-              </a:effectRef>
-              <a:fontRef idx="minor">
-                <a:schemeClr val="tx1"/>
-              </a:fontRef>
-            </p:style>
-          </p:cxnSp>
-          <p:cxnSp>
-            <p:nvCxnSpPr>
-              <p:cNvPr id="38" name="Straight Arrow Connector 37"/>
-              <p:cNvCxnSpPr/>
-              <p:nvPr/>
-            </p:nvCxnSpPr>
-            <p:spPr>
-              <a:xfrm flipH="1">
-                <a:off x="9358564" y="3522275"/>
-                <a:ext cx="353827" cy="1"/>
-              </a:xfrm>
-              <a:prstGeom prst="straightConnector1">
-                <a:avLst/>
-              </a:prstGeom>
-              <a:ln w="12700">
-                <a:solidFill>
-                  <a:schemeClr val="tx1"/>
-                </a:solidFill>
-                <a:tailEnd type="triangle"/>
-              </a:ln>
-            </p:spPr>
-            <p:style>
-              <a:lnRef idx="1">
-                <a:schemeClr val="accent1"/>
-              </a:lnRef>
-              <a:fillRef idx="0">
-                <a:schemeClr val="accent1"/>
-              </a:fillRef>
-              <a:effectRef idx="0">
-                <a:schemeClr val="accent1"/>
-              </a:effectRef>
-              <a:fontRef idx="minor">
-                <a:schemeClr val="tx1"/>
-              </a:fontRef>
-            </p:style>
-          </p:cxnSp>
-          <p:sp>
-            <p:nvSpPr>
-              <p:cNvPr id="39" name="Oval 38"/>
-              <p:cNvSpPr/>
-              <p:nvPr/>
-            </p:nvSpPr>
-            <p:spPr>
-              <a:xfrm>
-                <a:off x="5505924" y="1004243"/>
-                <a:ext cx="251926" cy="246612"/>
-              </a:xfrm>
-              <a:prstGeom prst="ellipse">
-                <a:avLst/>
-              </a:prstGeom>
-              <a:noFill/>
-              <a:ln>
-                <a:solidFill>
-                  <a:schemeClr val="tx1"/>
-                </a:solidFill>
-              </a:ln>
-            </p:spPr>
-            <p:style>
-              <a:lnRef idx="2">
-                <a:schemeClr val="accent1">
-                  <a:shade val="50000"/>
-                </a:schemeClr>
-              </a:lnRef>
-              <a:fillRef idx="1">
-                <a:schemeClr val="accent1"/>
-              </a:fillRef>
-              <a:effectRef idx="0">
-                <a:schemeClr val="accent1"/>
-              </a:effectRef>
-              <a:fontRef idx="minor">
-                <a:schemeClr val="lt1"/>
-              </a:fontRef>
-            </p:style>
-            <p:txBody>
-              <a:bodyPr rtlCol="0" anchor="ctr"/>
-              <a:lstStyle/>
-              <a:p>
-                <a:pPr algn="ctr"/>
-                <a:endParaRPr lang="en-GB"/>
-              </a:p>
-            </p:txBody>
-          </p:sp>
-          <p:sp>
-            <p:nvSpPr>
-              <p:cNvPr id="41" name="Oval 40"/>
-              <p:cNvSpPr/>
-              <p:nvPr/>
-            </p:nvSpPr>
-            <p:spPr>
-              <a:xfrm>
-                <a:off x="9712391" y="3393569"/>
-                <a:ext cx="251926" cy="246612"/>
-              </a:xfrm>
-              <a:prstGeom prst="ellipse">
-                <a:avLst/>
-              </a:prstGeom>
-              <a:noFill/>
-              <a:ln>
-                <a:solidFill>
-                  <a:schemeClr val="tx1"/>
-                </a:solidFill>
-              </a:ln>
-            </p:spPr>
-            <p:style>
-              <a:lnRef idx="2">
-                <a:schemeClr val="accent1">
-                  <a:shade val="50000"/>
-                </a:schemeClr>
-              </a:lnRef>
-              <a:fillRef idx="1">
-                <a:schemeClr val="accent1"/>
-              </a:fillRef>
-              <a:effectRef idx="0">
-                <a:schemeClr val="accent1"/>
-              </a:effectRef>
-              <a:fontRef idx="minor">
-                <a:schemeClr val="lt1"/>
-              </a:fontRef>
-            </p:style>
-            <p:txBody>
-              <a:bodyPr rtlCol="0" anchor="ctr"/>
-              <a:lstStyle/>
-              <a:p>
-                <a:pPr algn="ctr"/>
-                <a:endParaRPr lang="en-GB"/>
-              </a:p>
-            </p:txBody>
-          </p:sp>
-          <p:sp>
-            <p:nvSpPr>
-              <p:cNvPr id="43" name="Right Bracket 42"/>
-              <p:cNvSpPr/>
-              <p:nvPr/>
-            </p:nvSpPr>
-            <p:spPr>
-              <a:xfrm rot="16200000">
-                <a:off x="2511872" y="2884886"/>
-                <a:ext cx="248137" cy="217481"/>
-              </a:xfrm>
-              <a:prstGeom prst="rightBracket">
-                <a:avLst>
-                  <a:gd name="adj" fmla="val 208332"/>
-                </a:avLst>
-              </a:prstGeom>
-              <a:ln w="12700">
-                <a:solidFill>
-                  <a:schemeClr val="tx1"/>
-                </a:solidFill>
-                <a:headEnd type="triangle"/>
-                <a:tailEnd type="triangle"/>
-              </a:ln>
-            </p:spPr>
-            <p:style>
-              <a:lnRef idx="1">
-                <a:schemeClr val="accent1"/>
-              </a:lnRef>
-              <a:fillRef idx="0">
-                <a:schemeClr val="accent1"/>
-              </a:fillRef>
-              <a:effectRef idx="0">
-                <a:schemeClr val="accent1"/>
-              </a:effectRef>
-              <a:fontRef idx="minor">
-                <a:schemeClr val="tx1"/>
-              </a:fontRef>
-            </p:style>
-            <p:txBody>
-              <a:bodyPr rtlCol="0" anchor="ctr"/>
-              <a:lstStyle/>
-              <a:p>
-                <a:pPr algn="ctr"/>
-                <a:endParaRPr lang="en-GB"/>
-              </a:p>
-            </p:txBody>
-          </p:sp>
-          <p:cxnSp>
-            <p:nvCxnSpPr>
-              <p:cNvPr id="10" name="Straight Arrow Connector 9">
-                <a:extLst>
-                  <a:ext uri="{FF2B5EF4-FFF2-40B4-BE49-F238E27FC236}">
-                    <a16:creationId xmlns:a16="http://schemas.microsoft.com/office/drawing/2014/main" id="{CBCB3278-E1A8-2469-C52C-0133701BF3F4}"/>
-                  </a:ext>
-                </a:extLst>
-              </p:cNvPr>
-              <p:cNvCxnSpPr>
-                <a:stCxn id="4" idx="3"/>
-                <a:endCxn id="6" idx="1"/>
-              </p:cNvCxnSpPr>
-              <p:nvPr/>
-            </p:nvCxnSpPr>
-            <p:spPr>
-              <a:xfrm flipV="1">
-                <a:off x="3379930" y="2080344"/>
-                <a:ext cx="1507968" cy="1441933"/>
-              </a:xfrm>
-              <a:prstGeom prst="straightConnector1">
-                <a:avLst/>
-              </a:prstGeom>
-              <a:ln w="12700">
-                <a:solidFill>
-                  <a:schemeClr val="accent2">
-                    <a:lumMod val="60000"/>
-                    <a:lumOff val="40000"/>
-                  </a:schemeClr>
-                </a:solidFill>
-                <a:tailEnd type="triangle"/>
-              </a:ln>
-            </p:spPr>
-            <p:style>
-              <a:lnRef idx="1">
-                <a:schemeClr val="accent1"/>
-              </a:lnRef>
-              <a:fillRef idx="0">
-                <a:schemeClr val="accent1"/>
-              </a:fillRef>
-              <a:effectRef idx="0">
-                <a:schemeClr val="accent1"/>
-              </a:effectRef>
-              <a:fontRef idx="minor">
-                <a:schemeClr val="tx1"/>
-              </a:fontRef>
-            </p:style>
-          </p:cxnSp>
-          <p:cxnSp>
-            <p:nvCxnSpPr>
-              <p:cNvPr id="13" name="Straight Arrow Connector 12">
-                <a:extLst>
-                  <a:ext uri="{FF2B5EF4-FFF2-40B4-BE49-F238E27FC236}">
-                    <a16:creationId xmlns:a16="http://schemas.microsoft.com/office/drawing/2014/main" id="{ACEDD3E8-03A9-2C3A-C082-5A8983C853C8}"/>
-                  </a:ext>
-                </a:extLst>
-              </p:cNvPr>
-              <p:cNvCxnSpPr>
-                <a:stCxn id="6" idx="3"/>
-                <a:endCxn id="7" idx="1"/>
-              </p:cNvCxnSpPr>
-              <p:nvPr/>
-            </p:nvCxnSpPr>
-            <p:spPr>
-              <a:xfrm>
-                <a:off x="6375876" y="2080344"/>
-                <a:ext cx="1493325" cy="1441933"/>
-              </a:xfrm>
-              <a:prstGeom prst="straightConnector1">
-                <a:avLst/>
-              </a:prstGeom>
-              <a:ln w="12700">
-                <a:solidFill>
-                  <a:schemeClr val="accent2">
-                    <a:lumMod val="60000"/>
-                    <a:lumOff val="40000"/>
-                  </a:schemeClr>
-                </a:solidFill>
-                <a:tailEnd type="triangle"/>
-              </a:ln>
-            </p:spPr>
-            <p:style>
-              <a:lnRef idx="1">
-                <a:schemeClr val="accent1"/>
-              </a:lnRef>
-              <a:fillRef idx="0">
-                <a:schemeClr val="accent1"/>
-              </a:fillRef>
-              <a:effectRef idx="0">
-                <a:schemeClr val="accent1"/>
-              </a:effectRef>
-              <a:fontRef idx="minor">
-                <a:schemeClr val="tx1"/>
-              </a:fontRef>
-            </p:style>
-          </p:cxnSp>
-          <p:cxnSp>
-            <p:nvCxnSpPr>
-              <p:cNvPr id="21" name="Straight Arrow Connector 20">
-                <a:extLst>
-                  <a:ext uri="{FF2B5EF4-FFF2-40B4-BE49-F238E27FC236}">
-                    <a16:creationId xmlns:a16="http://schemas.microsoft.com/office/drawing/2014/main" id="{5135221A-49F0-183E-61CD-C17C2D306DB7}"/>
-                  </a:ext>
-                </a:extLst>
-              </p:cNvPr>
-              <p:cNvCxnSpPr>
-                <a:stCxn id="4" idx="3"/>
-                <a:endCxn id="7" idx="1"/>
-              </p:cNvCxnSpPr>
-              <p:nvPr/>
-            </p:nvCxnSpPr>
-            <p:spPr>
-              <a:xfrm>
-                <a:off x="3379930" y="3522277"/>
-                <a:ext cx="4489271" cy="0"/>
-              </a:xfrm>
-              <a:prstGeom prst="straightConnector1">
-                <a:avLst/>
-              </a:prstGeom>
-              <a:ln w="12700">
-                <a:solidFill>
-                  <a:schemeClr val="accent5">
-                    <a:lumMod val="60000"/>
-                    <a:lumOff val="40000"/>
-                  </a:schemeClr>
-                </a:solidFill>
-                <a:tailEnd type="triangle"/>
-              </a:ln>
-            </p:spPr>
-            <p:style>
-              <a:lnRef idx="1">
-                <a:schemeClr val="accent1"/>
-              </a:lnRef>
-              <a:fillRef idx="0">
-                <a:schemeClr val="accent1"/>
-              </a:fillRef>
-              <a:effectRef idx="0">
-                <a:schemeClr val="accent1"/>
-              </a:effectRef>
-              <a:fontRef idx="minor">
-                <a:schemeClr val="tx1"/>
-              </a:fontRef>
-            </p:style>
-          </p:cxnSp>
-        </p:grpSp>
-        <p:sp>
-          <p:nvSpPr>
-            <p:cNvPr id="2" name="TextBox 1">
-              <a:extLst>
-                <a:ext uri="{FF2B5EF4-FFF2-40B4-BE49-F238E27FC236}">
-                  <a16:creationId xmlns:a16="http://schemas.microsoft.com/office/drawing/2014/main" id="{F99AAF8A-BD8A-BD7D-7758-4F6AC6121EEF}"/>
-                </a:ext>
-              </a:extLst>
-            </p:cNvPr>
-            <p:cNvSpPr txBox="1"/>
-            <p:nvPr/>
-          </p:nvSpPr>
-          <p:spPr>
-            <a:xfrm>
-              <a:off x="4248021" y="2830419"/>
-              <a:ext cx="434250" cy="369332"/>
-            </a:xfrm>
-            <a:prstGeom prst="rect">
-              <a:avLst/>
-            </a:prstGeom>
-            <a:noFill/>
-          </p:spPr>
-          <p:txBody>
-            <a:bodyPr wrap="square" rtlCol="0">
-              <a:spAutoFit/>
-            </a:bodyPr>
-            <a:lstStyle/>
-            <a:p>
-              <a:r>
-                <a:rPr lang="en-GB" dirty="0"/>
-                <a:t>a</a:t>
-              </a:r>
-            </a:p>
-          </p:txBody>
-        </p:sp>
-        <p:sp>
-          <p:nvSpPr>
-            <p:cNvPr id="3" name="TextBox 2">
-              <a:extLst>
-                <a:ext uri="{FF2B5EF4-FFF2-40B4-BE49-F238E27FC236}">
-                  <a16:creationId xmlns:a16="http://schemas.microsoft.com/office/drawing/2014/main" id="{6AD4069F-0090-60B0-5597-01F6CB3DD842}"/>
-                </a:ext>
-              </a:extLst>
-            </p:cNvPr>
-            <p:cNvSpPr txBox="1"/>
-            <p:nvPr/>
-          </p:nvSpPr>
-          <p:spPr>
-            <a:xfrm>
-              <a:off x="7313000" y="2830419"/>
-              <a:ext cx="1017422" cy="369332"/>
-            </a:xfrm>
-            <a:prstGeom prst="rect">
-              <a:avLst/>
-            </a:prstGeom>
-            <a:noFill/>
-          </p:spPr>
-          <p:txBody>
-            <a:bodyPr wrap="square" rtlCol="0">
-              <a:spAutoFit/>
-            </a:bodyPr>
-            <a:lstStyle/>
-            <a:p>
-              <a:r>
-                <a:rPr lang="en-GB" dirty="0"/>
-                <a:t>b</a:t>
-              </a:r>
-            </a:p>
-          </p:txBody>
-        </p:sp>
-        <p:sp>
-          <p:nvSpPr>
-            <p:cNvPr id="5" name="TextBox 4">
-              <a:extLst>
-                <a:ext uri="{FF2B5EF4-FFF2-40B4-BE49-F238E27FC236}">
-                  <a16:creationId xmlns:a16="http://schemas.microsoft.com/office/drawing/2014/main" id="{C05443CF-E076-3960-90BD-57863F45F3B2}"/>
-                </a:ext>
-              </a:extLst>
-            </p:cNvPr>
-            <p:cNvSpPr txBox="1"/>
-            <p:nvPr/>
-          </p:nvSpPr>
-          <p:spPr>
-            <a:xfrm>
-              <a:off x="5443216" y="4177920"/>
-              <a:ext cx="1017422" cy="369332"/>
-            </a:xfrm>
-            <a:prstGeom prst="rect">
-              <a:avLst/>
-            </a:prstGeom>
-            <a:noFill/>
-          </p:spPr>
-          <p:txBody>
-            <a:bodyPr wrap="square" rtlCol="0">
-              <a:spAutoFit/>
-            </a:bodyPr>
-            <a:lstStyle/>
-            <a:p>
-              <a:pPr algn="ctr"/>
-              <a:r>
-                <a:rPr lang="en-GB"/>
-                <a:t>c</a:t>
-              </a:r>
-              <a:endParaRPr lang="en-GB" dirty="0"/>
-            </a:p>
-          </p:txBody>
-        </p:sp>
-      </p:grpSp>
-    </p:spTree>
-    <p:extLst>
-      <p:ext uri="{BB962C8B-B14F-4D97-AF65-F5344CB8AC3E}">
-        <p14:creationId xmlns:p14="http://schemas.microsoft.com/office/powerpoint/2010/main" val="1315734053"/>
       </p:ext>
     </p:extLst>
   </p:cSld>

</xml_diff>

<commit_message>
path lecture 2 90%
Revised week 2 path mediation lecture. The example needs to be updated for one John is happy with
</commit_message>
<xml_diff>
--- a/dapr3_lectures/pathfa_lectures/figs/diagrams.pptx
+++ b/dapr3_lectures/pathfa_lectures/figs/diagrams.pptx
@@ -8,6 +8,9 @@
     <p:sldId id="256" r:id="rId2"/>
     <p:sldId id="257" r:id="rId3"/>
     <p:sldId id="258" r:id="rId4"/>
+    <p:sldId id="259" r:id="rId5"/>
+    <p:sldId id="260" r:id="rId6"/>
+    <p:sldId id="261" r:id="rId7"/>
   </p:sldIdLst>
   <p:sldSz cx="12192000" cy="6858000"/>
   <p:notesSz cx="6858000" cy="9144000"/>
@@ -106,7 +109,358 @@
       </a:defRPr>
     </a:lvl9pPr>
   </p:defaultTextStyle>
+  <p:extLst>
+    <p:ext uri="{EFAFB233-063F-42B5-8137-9DF3F51BA10A}">
+      <p15:sldGuideLst xmlns:p15="http://schemas.microsoft.com/office/powerpoint/2012/main"/>
+    </p:ext>
+  </p:extLst>
 </p:presentation>
+</file>
+
+<file path=ppt/revisionInfo.xml><?xml version="1.0" encoding="utf-8"?>
+<p1510:revInfo xmlns:a="http://schemas.openxmlformats.org/drawingml/2006/main" xmlns:r="http://schemas.openxmlformats.org/officeDocument/2006/relationships" xmlns:p1510="http://schemas.microsoft.com/office/powerpoint/2015/10/main">
+  <p1510:revLst>
+    <p1510:client id="{AFD04F4F-B5AD-4086-A3E8-204AC8B1F297}" v="6" dt="2023-09-06T10:09:15.121"/>
+  </p1510:revLst>
+</p1510:revInfo>
+</file>
+
+<file path=ppt/changesInfos/changesInfo1.xml><?xml version="1.0" encoding="utf-8"?>
+<pc:chgInfo xmlns:a="http://schemas.openxmlformats.org/drawingml/2006/main" xmlns:r="http://schemas.openxmlformats.org/officeDocument/2006/relationships" xmlns:ac="http://schemas.microsoft.com/office/drawing/2013/main/command" xmlns:pc="http://schemas.microsoft.com/office/powerpoint/2013/main/command">
+  <pc:docChgLst>
+    <pc:chgData name="Tom Booth" userId="5c6dda17feb83ac2" providerId="LiveId" clId="{AFD04F4F-B5AD-4086-A3E8-204AC8B1F297}"/>
+    <pc:docChg chg="undo custSel addSld delSld modSld sldOrd">
+      <pc:chgData name="Tom Booth" userId="5c6dda17feb83ac2" providerId="LiveId" clId="{AFD04F4F-B5AD-4086-A3E8-204AC8B1F297}" dt="2023-09-06T10:56:13.812" v="90" actId="20577"/>
+      <pc:docMkLst>
+        <pc:docMk/>
+      </pc:docMkLst>
+      <pc:sldChg chg="add del ord">
+        <pc:chgData name="Tom Booth" userId="5c6dda17feb83ac2" providerId="LiveId" clId="{AFD04F4F-B5AD-4086-A3E8-204AC8B1F297}" dt="2023-09-06T09:50:27.327" v="3" actId="47"/>
+        <pc:sldMkLst>
+          <pc:docMk/>
+          <pc:sldMk cId="1082730471" sldId="259"/>
+        </pc:sldMkLst>
+      </pc:sldChg>
+      <pc:sldChg chg="addSp delSp modSp add mod ord">
+        <pc:chgData name="Tom Booth" userId="5c6dda17feb83ac2" providerId="LiveId" clId="{AFD04F4F-B5AD-4086-A3E8-204AC8B1F297}" dt="2023-09-06T09:53:57.249" v="55" actId="1076"/>
+        <pc:sldMkLst>
+          <pc:docMk/>
+          <pc:sldMk cId="2959519369" sldId="259"/>
+        </pc:sldMkLst>
+        <pc:spChg chg="mod topLvl">
+          <ac:chgData name="Tom Booth" userId="5c6dda17feb83ac2" providerId="LiveId" clId="{AFD04F4F-B5AD-4086-A3E8-204AC8B1F297}" dt="2023-09-06T09:53:53.771" v="54" actId="164"/>
+          <ac:spMkLst>
+            <pc:docMk/>
+            <pc:sldMk cId="2959519369" sldId="259"/>
+            <ac:spMk id="4" creationId="{00000000-0000-0000-0000-000000000000}"/>
+          </ac:spMkLst>
+        </pc:spChg>
+        <pc:spChg chg="del mod topLvl">
+          <ac:chgData name="Tom Booth" userId="5c6dda17feb83ac2" providerId="LiveId" clId="{AFD04F4F-B5AD-4086-A3E8-204AC8B1F297}" dt="2023-09-06T09:50:48.207" v="10" actId="478"/>
+          <ac:spMkLst>
+            <pc:docMk/>
+            <pc:sldMk cId="2959519369" sldId="259"/>
+            <ac:spMk id="5" creationId="{00000000-0000-0000-0000-000000000000}"/>
+          </ac:spMkLst>
+        </pc:spChg>
+        <pc:spChg chg="mod topLvl">
+          <ac:chgData name="Tom Booth" userId="5c6dda17feb83ac2" providerId="LiveId" clId="{AFD04F4F-B5AD-4086-A3E8-204AC8B1F297}" dt="2023-09-06T09:53:53.771" v="54" actId="164"/>
+          <ac:spMkLst>
+            <pc:docMk/>
+            <pc:sldMk cId="2959519369" sldId="259"/>
+            <ac:spMk id="6" creationId="{00000000-0000-0000-0000-000000000000}"/>
+          </ac:spMkLst>
+        </pc:spChg>
+        <pc:spChg chg="mod topLvl">
+          <ac:chgData name="Tom Booth" userId="5c6dda17feb83ac2" providerId="LiveId" clId="{AFD04F4F-B5AD-4086-A3E8-204AC8B1F297}" dt="2023-09-06T09:53:53.771" v="54" actId="164"/>
+          <ac:spMkLst>
+            <pc:docMk/>
+            <pc:sldMk cId="2959519369" sldId="259"/>
+            <ac:spMk id="7" creationId="{00000000-0000-0000-0000-000000000000}"/>
+          </ac:spMkLst>
+        </pc:spChg>
+        <pc:spChg chg="del mod topLvl">
+          <ac:chgData name="Tom Booth" userId="5c6dda17feb83ac2" providerId="LiveId" clId="{AFD04F4F-B5AD-4086-A3E8-204AC8B1F297}" dt="2023-09-06T09:50:48.207" v="10" actId="478"/>
+          <ac:spMkLst>
+            <pc:docMk/>
+            <pc:sldMk cId="2959519369" sldId="259"/>
+            <ac:spMk id="8" creationId="{00000000-0000-0000-0000-000000000000}"/>
+          </ac:spMkLst>
+        </pc:spChg>
+        <pc:spChg chg="del mod topLvl">
+          <ac:chgData name="Tom Booth" userId="5c6dda17feb83ac2" providerId="LiveId" clId="{AFD04F4F-B5AD-4086-A3E8-204AC8B1F297}" dt="2023-09-06T09:50:41.763" v="8" actId="478"/>
+          <ac:spMkLst>
+            <pc:docMk/>
+            <pc:sldMk cId="2959519369" sldId="259"/>
+            <ac:spMk id="32" creationId="{00000000-0000-0000-0000-000000000000}"/>
+          </ac:spMkLst>
+        </pc:spChg>
+        <pc:spChg chg="del mod topLvl">
+          <ac:chgData name="Tom Booth" userId="5c6dda17feb83ac2" providerId="LiveId" clId="{AFD04F4F-B5AD-4086-A3E8-204AC8B1F297}" dt="2023-09-06T09:50:41.763" v="8" actId="478"/>
+          <ac:spMkLst>
+            <pc:docMk/>
+            <pc:sldMk cId="2959519369" sldId="259"/>
+            <ac:spMk id="33" creationId="{00000000-0000-0000-0000-000000000000}"/>
+          </ac:spMkLst>
+        </pc:spChg>
+        <pc:spChg chg="del mod topLvl">
+          <ac:chgData name="Tom Booth" userId="5c6dda17feb83ac2" providerId="LiveId" clId="{AFD04F4F-B5AD-4086-A3E8-204AC8B1F297}" dt="2023-09-06T09:50:41.763" v="8" actId="478"/>
+          <ac:spMkLst>
+            <pc:docMk/>
+            <pc:sldMk cId="2959519369" sldId="259"/>
+            <ac:spMk id="34" creationId="{00000000-0000-0000-0000-000000000000}"/>
+          </ac:spMkLst>
+        </pc:spChg>
+        <pc:spChg chg="mod topLvl">
+          <ac:chgData name="Tom Booth" userId="5c6dda17feb83ac2" providerId="LiveId" clId="{AFD04F4F-B5AD-4086-A3E8-204AC8B1F297}" dt="2023-09-06T09:53:53.771" v="54" actId="164"/>
+          <ac:spMkLst>
+            <pc:docMk/>
+            <pc:sldMk cId="2959519369" sldId="259"/>
+            <ac:spMk id="39" creationId="{00000000-0000-0000-0000-000000000000}"/>
+          </ac:spMkLst>
+        </pc:spChg>
+        <pc:spChg chg="mod topLvl">
+          <ac:chgData name="Tom Booth" userId="5c6dda17feb83ac2" providerId="LiveId" clId="{AFD04F4F-B5AD-4086-A3E8-204AC8B1F297}" dt="2023-09-06T09:53:53.771" v="54" actId="164"/>
+          <ac:spMkLst>
+            <pc:docMk/>
+            <pc:sldMk cId="2959519369" sldId="259"/>
+            <ac:spMk id="41" creationId="{00000000-0000-0000-0000-000000000000}"/>
+          </ac:spMkLst>
+        </pc:spChg>
+        <pc:spChg chg="del mod topLvl">
+          <ac:chgData name="Tom Booth" userId="5c6dda17feb83ac2" providerId="LiveId" clId="{AFD04F4F-B5AD-4086-A3E8-204AC8B1F297}" dt="2023-09-06T09:51:04.168" v="15" actId="478"/>
+          <ac:spMkLst>
+            <pc:docMk/>
+            <pc:sldMk cId="2959519369" sldId="259"/>
+            <ac:spMk id="42" creationId="{00000000-0000-0000-0000-000000000000}"/>
+          </ac:spMkLst>
+        </pc:spChg>
+        <pc:spChg chg="mod topLvl">
+          <ac:chgData name="Tom Booth" userId="5c6dda17feb83ac2" providerId="LiveId" clId="{AFD04F4F-B5AD-4086-A3E8-204AC8B1F297}" dt="2023-09-06T09:53:53.771" v="54" actId="164"/>
+          <ac:spMkLst>
+            <pc:docMk/>
+            <pc:sldMk cId="2959519369" sldId="259"/>
+            <ac:spMk id="43" creationId="{00000000-0000-0000-0000-000000000000}"/>
+          </ac:spMkLst>
+        </pc:spChg>
+        <pc:spChg chg="del mod topLvl">
+          <ac:chgData name="Tom Booth" userId="5c6dda17feb83ac2" providerId="LiveId" clId="{AFD04F4F-B5AD-4086-A3E8-204AC8B1F297}" dt="2023-09-06T09:50:48.207" v="10" actId="478"/>
+          <ac:spMkLst>
+            <pc:docMk/>
+            <pc:sldMk cId="2959519369" sldId="259"/>
+            <ac:spMk id="45" creationId="{00000000-0000-0000-0000-000000000000}"/>
+          </ac:spMkLst>
+        </pc:spChg>
+        <pc:spChg chg="del mod topLvl">
+          <ac:chgData name="Tom Booth" userId="5c6dda17feb83ac2" providerId="LiveId" clId="{AFD04F4F-B5AD-4086-A3E8-204AC8B1F297}" dt="2023-09-06T09:50:48.207" v="10" actId="478"/>
+          <ac:spMkLst>
+            <pc:docMk/>
+            <pc:sldMk cId="2959519369" sldId="259"/>
+            <ac:spMk id="46" creationId="{00000000-0000-0000-0000-000000000000}"/>
+          </ac:spMkLst>
+        </pc:spChg>
+        <pc:grpChg chg="add mod">
+          <ac:chgData name="Tom Booth" userId="5c6dda17feb83ac2" providerId="LiveId" clId="{AFD04F4F-B5AD-4086-A3E8-204AC8B1F297}" dt="2023-09-06T09:53:57.249" v="55" actId="1076"/>
+          <ac:grpSpMkLst>
+            <pc:docMk/>
+            <pc:sldMk cId="2959519369" sldId="259"/>
+            <ac:grpSpMk id="22" creationId="{A45D3BBD-83EA-C72A-F34A-A3E0CADE9FC2}"/>
+          </ac:grpSpMkLst>
+        </pc:grpChg>
+        <pc:grpChg chg="del">
+          <ac:chgData name="Tom Booth" userId="5c6dda17feb83ac2" providerId="LiveId" clId="{AFD04F4F-B5AD-4086-A3E8-204AC8B1F297}" dt="2023-09-06T09:50:37.996" v="7" actId="165"/>
+          <ac:grpSpMkLst>
+            <pc:docMk/>
+            <pc:sldMk cId="2959519369" sldId="259"/>
+            <ac:grpSpMk id="52" creationId="{00000000-0000-0000-0000-000000000000}"/>
+          </ac:grpSpMkLst>
+        </pc:grpChg>
+        <pc:cxnChg chg="add mod">
+          <ac:chgData name="Tom Booth" userId="5c6dda17feb83ac2" providerId="LiveId" clId="{AFD04F4F-B5AD-4086-A3E8-204AC8B1F297}" dt="2023-09-06T09:53:53.771" v="54" actId="164"/>
+          <ac:cxnSpMkLst>
+            <pc:docMk/>
+            <pc:sldMk cId="2959519369" sldId="259"/>
+            <ac:cxnSpMk id="10" creationId="{CBCB3278-E1A8-2469-C52C-0133701BF3F4}"/>
+          </ac:cxnSpMkLst>
+        </pc:cxnChg>
+        <pc:cxnChg chg="del mod topLvl">
+          <ac:chgData name="Tom Booth" userId="5c6dda17feb83ac2" providerId="LiveId" clId="{AFD04F4F-B5AD-4086-A3E8-204AC8B1F297}" dt="2023-09-06T09:50:45.509" v="9" actId="478"/>
+          <ac:cxnSpMkLst>
+            <pc:docMk/>
+            <pc:sldMk cId="2959519369" sldId="259"/>
+            <ac:cxnSpMk id="12" creationId="{00000000-0000-0000-0000-000000000000}"/>
+          </ac:cxnSpMkLst>
+        </pc:cxnChg>
+        <pc:cxnChg chg="add mod">
+          <ac:chgData name="Tom Booth" userId="5c6dda17feb83ac2" providerId="LiveId" clId="{AFD04F4F-B5AD-4086-A3E8-204AC8B1F297}" dt="2023-09-06T09:53:53.771" v="54" actId="164"/>
+          <ac:cxnSpMkLst>
+            <pc:docMk/>
+            <pc:sldMk cId="2959519369" sldId="259"/>
+            <ac:cxnSpMk id="13" creationId="{ACEDD3E8-03A9-2C3A-C082-5A8983C853C8}"/>
+          </ac:cxnSpMkLst>
+        </pc:cxnChg>
+        <pc:cxnChg chg="del mod topLvl">
+          <ac:chgData name="Tom Booth" userId="5c6dda17feb83ac2" providerId="LiveId" clId="{AFD04F4F-B5AD-4086-A3E8-204AC8B1F297}" dt="2023-09-06T09:50:45.509" v="9" actId="478"/>
+          <ac:cxnSpMkLst>
+            <pc:docMk/>
+            <pc:sldMk cId="2959519369" sldId="259"/>
+            <ac:cxnSpMk id="14" creationId="{00000000-0000-0000-0000-000000000000}"/>
+          </ac:cxnSpMkLst>
+        </pc:cxnChg>
+        <pc:cxnChg chg="del mod topLvl">
+          <ac:chgData name="Tom Booth" userId="5c6dda17feb83ac2" providerId="LiveId" clId="{AFD04F4F-B5AD-4086-A3E8-204AC8B1F297}" dt="2023-09-06T09:50:45.509" v="9" actId="478"/>
+          <ac:cxnSpMkLst>
+            <pc:docMk/>
+            <pc:sldMk cId="2959519369" sldId="259"/>
+            <ac:cxnSpMk id="16" creationId="{00000000-0000-0000-0000-000000000000}"/>
+          </ac:cxnSpMkLst>
+        </pc:cxnChg>
+        <pc:cxnChg chg="del mod topLvl">
+          <ac:chgData name="Tom Booth" userId="5c6dda17feb83ac2" providerId="LiveId" clId="{AFD04F4F-B5AD-4086-A3E8-204AC8B1F297}" dt="2023-09-06T09:50:45.509" v="9" actId="478"/>
+          <ac:cxnSpMkLst>
+            <pc:docMk/>
+            <pc:sldMk cId="2959519369" sldId="259"/>
+            <ac:cxnSpMk id="18" creationId="{00000000-0000-0000-0000-000000000000}"/>
+          </ac:cxnSpMkLst>
+        </pc:cxnChg>
+        <pc:cxnChg chg="add mod">
+          <ac:chgData name="Tom Booth" userId="5c6dda17feb83ac2" providerId="LiveId" clId="{AFD04F4F-B5AD-4086-A3E8-204AC8B1F297}" dt="2023-09-06T09:53:53.771" v="54" actId="164"/>
+          <ac:cxnSpMkLst>
+            <pc:docMk/>
+            <pc:sldMk cId="2959519369" sldId="259"/>
+            <ac:cxnSpMk id="21" creationId="{5135221A-49F0-183E-61CD-C17C2D306DB7}"/>
+          </ac:cxnSpMkLst>
+        </pc:cxnChg>
+        <pc:cxnChg chg="mod topLvl">
+          <ac:chgData name="Tom Booth" userId="5c6dda17feb83ac2" providerId="LiveId" clId="{AFD04F4F-B5AD-4086-A3E8-204AC8B1F297}" dt="2023-09-06T09:53:53.771" v="54" actId="164"/>
+          <ac:cxnSpMkLst>
+            <pc:docMk/>
+            <pc:sldMk cId="2959519369" sldId="259"/>
+            <ac:cxnSpMk id="35" creationId="{00000000-0000-0000-0000-000000000000}"/>
+          </ac:cxnSpMkLst>
+        </pc:cxnChg>
+        <pc:cxnChg chg="mod topLvl">
+          <ac:chgData name="Tom Booth" userId="5c6dda17feb83ac2" providerId="LiveId" clId="{AFD04F4F-B5AD-4086-A3E8-204AC8B1F297}" dt="2023-09-06T09:53:53.771" v="54" actId="164"/>
+          <ac:cxnSpMkLst>
+            <pc:docMk/>
+            <pc:sldMk cId="2959519369" sldId="259"/>
+            <ac:cxnSpMk id="38" creationId="{00000000-0000-0000-0000-000000000000}"/>
+          </ac:cxnSpMkLst>
+        </pc:cxnChg>
+        <pc:cxnChg chg="del mod topLvl">
+          <ac:chgData name="Tom Booth" userId="5c6dda17feb83ac2" providerId="LiveId" clId="{AFD04F4F-B5AD-4086-A3E8-204AC8B1F297}" dt="2023-09-06T09:50:45.509" v="9" actId="478"/>
+          <ac:cxnSpMkLst>
+            <pc:docMk/>
+            <pc:sldMk cId="2959519369" sldId="259"/>
+            <ac:cxnSpMk id="48" creationId="{00000000-0000-0000-0000-000000000000}"/>
+          </ac:cxnSpMkLst>
+        </pc:cxnChg>
+      </pc:sldChg>
+      <pc:sldChg chg="addSp modSp add mod">
+        <pc:chgData name="Tom Booth" userId="5c6dda17feb83ac2" providerId="LiveId" clId="{AFD04F4F-B5AD-4086-A3E8-204AC8B1F297}" dt="2023-09-06T10:09:15.121" v="82" actId="164"/>
+        <pc:sldMkLst>
+          <pc:docMk/>
+          <pc:sldMk cId="2526277780" sldId="260"/>
+        </pc:sldMkLst>
+        <pc:spChg chg="add mod">
+          <ac:chgData name="Tom Booth" userId="5c6dda17feb83ac2" providerId="LiveId" clId="{AFD04F4F-B5AD-4086-A3E8-204AC8B1F297}" dt="2023-09-06T10:09:15.121" v="82" actId="164"/>
+          <ac:spMkLst>
+            <pc:docMk/>
+            <pc:sldMk cId="2526277780" sldId="260"/>
+            <ac:spMk id="2" creationId="{F99AAF8A-BD8A-BD7D-7758-4F6AC6121EEF}"/>
+          </ac:spMkLst>
+        </pc:spChg>
+        <pc:spChg chg="add mod">
+          <ac:chgData name="Tom Booth" userId="5c6dda17feb83ac2" providerId="LiveId" clId="{AFD04F4F-B5AD-4086-A3E8-204AC8B1F297}" dt="2023-09-06T10:09:15.121" v="82" actId="164"/>
+          <ac:spMkLst>
+            <pc:docMk/>
+            <pc:sldMk cId="2526277780" sldId="260"/>
+            <ac:spMk id="3" creationId="{6AD4069F-0090-60B0-5597-01F6CB3DD842}"/>
+          </ac:spMkLst>
+        </pc:spChg>
+        <pc:spChg chg="add mod">
+          <ac:chgData name="Tom Booth" userId="5c6dda17feb83ac2" providerId="LiveId" clId="{AFD04F4F-B5AD-4086-A3E8-204AC8B1F297}" dt="2023-09-06T10:09:15.121" v="82" actId="164"/>
+          <ac:spMkLst>
+            <pc:docMk/>
+            <pc:sldMk cId="2526277780" sldId="260"/>
+            <ac:spMk id="5" creationId="{C05443CF-E076-3960-90BD-57863F45F3B2}"/>
+          </ac:spMkLst>
+        </pc:spChg>
+        <pc:grpChg chg="add mod">
+          <ac:chgData name="Tom Booth" userId="5c6dda17feb83ac2" providerId="LiveId" clId="{AFD04F4F-B5AD-4086-A3E8-204AC8B1F297}" dt="2023-09-06T10:09:15.121" v="82" actId="164"/>
+          <ac:grpSpMkLst>
+            <pc:docMk/>
+            <pc:sldMk cId="2526277780" sldId="260"/>
+            <ac:grpSpMk id="8" creationId="{EFA2D605-5532-DAEE-BDB9-C10C31D50A7D}"/>
+          </ac:grpSpMkLst>
+        </pc:grpChg>
+        <pc:grpChg chg="mod">
+          <ac:chgData name="Tom Booth" userId="5c6dda17feb83ac2" providerId="LiveId" clId="{AFD04F4F-B5AD-4086-A3E8-204AC8B1F297}" dt="2023-09-06T10:09:15.121" v="82" actId="164"/>
+          <ac:grpSpMkLst>
+            <pc:docMk/>
+            <pc:sldMk cId="2526277780" sldId="260"/>
+            <ac:grpSpMk id="22" creationId="{A45D3BBD-83EA-C72A-F34A-A3E0CADE9FC2}"/>
+          </ac:grpSpMkLst>
+        </pc:grpChg>
+        <pc:cxnChg chg="mod">
+          <ac:chgData name="Tom Booth" userId="5c6dda17feb83ac2" providerId="LiveId" clId="{AFD04F4F-B5AD-4086-A3E8-204AC8B1F297}" dt="2023-09-06T10:08:10.806" v="57" actId="692"/>
+          <ac:cxnSpMkLst>
+            <pc:docMk/>
+            <pc:sldMk cId="2526277780" sldId="260"/>
+            <ac:cxnSpMk id="10" creationId="{CBCB3278-E1A8-2469-C52C-0133701BF3F4}"/>
+          </ac:cxnSpMkLst>
+        </pc:cxnChg>
+        <pc:cxnChg chg="mod">
+          <ac:chgData name="Tom Booth" userId="5c6dda17feb83ac2" providerId="LiveId" clId="{AFD04F4F-B5AD-4086-A3E8-204AC8B1F297}" dt="2023-09-06T10:08:10.806" v="57" actId="692"/>
+          <ac:cxnSpMkLst>
+            <pc:docMk/>
+            <pc:sldMk cId="2526277780" sldId="260"/>
+            <ac:cxnSpMk id="13" creationId="{ACEDD3E8-03A9-2C3A-C082-5A8983C853C8}"/>
+          </ac:cxnSpMkLst>
+        </pc:cxnChg>
+        <pc:cxnChg chg="mod">
+          <ac:chgData name="Tom Booth" userId="5c6dda17feb83ac2" providerId="LiveId" clId="{AFD04F4F-B5AD-4086-A3E8-204AC8B1F297}" dt="2023-09-06T10:08:18.794" v="59" actId="692"/>
+          <ac:cxnSpMkLst>
+            <pc:docMk/>
+            <pc:sldMk cId="2526277780" sldId="260"/>
+            <ac:cxnSpMk id="21" creationId="{5135221A-49F0-183E-61CD-C17C2D306DB7}"/>
+          </ac:cxnSpMkLst>
+        </pc:cxnChg>
+      </pc:sldChg>
+      <pc:sldChg chg="modSp add mod">
+        <pc:chgData name="Tom Booth" userId="5c6dda17feb83ac2" providerId="LiveId" clId="{AFD04F4F-B5AD-4086-A3E8-204AC8B1F297}" dt="2023-09-06T10:56:13.812" v="90" actId="20577"/>
+        <pc:sldMkLst>
+          <pc:docMk/>
+          <pc:sldMk cId="1315734053" sldId="261"/>
+        </pc:sldMkLst>
+        <pc:spChg chg="mod">
+          <ac:chgData name="Tom Booth" userId="5c6dda17feb83ac2" providerId="LiveId" clId="{AFD04F4F-B5AD-4086-A3E8-204AC8B1F297}" dt="2023-09-06T10:56:04.819" v="88" actId="1076"/>
+          <ac:spMkLst>
+            <pc:docMk/>
+            <pc:sldMk cId="1315734053" sldId="261"/>
+            <ac:spMk id="2" creationId="{F99AAF8A-BD8A-BD7D-7758-4F6AC6121EEF}"/>
+          </ac:spMkLst>
+        </pc:spChg>
+        <pc:spChg chg="mod">
+          <ac:chgData name="Tom Booth" userId="5c6dda17feb83ac2" providerId="LiveId" clId="{AFD04F4F-B5AD-4086-A3E8-204AC8B1F297}" dt="2023-09-06T10:56:09.220" v="89" actId="20577"/>
+          <ac:spMkLst>
+            <pc:docMk/>
+            <pc:sldMk cId="1315734053" sldId="261"/>
+            <ac:spMk id="3" creationId="{6AD4069F-0090-60B0-5597-01F6CB3DD842}"/>
+          </ac:spMkLst>
+        </pc:spChg>
+        <pc:spChg chg="mod">
+          <ac:chgData name="Tom Booth" userId="5c6dda17feb83ac2" providerId="LiveId" clId="{AFD04F4F-B5AD-4086-A3E8-204AC8B1F297}" dt="2023-09-06T10:56:13.812" v="90" actId="20577"/>
+          <ac:spMkLst>
+            <pc:docMk/>
+            <pc:sldMk cId="1315734053" sldId="261"/>
+            <ac:spMk id="5" creationId="{C05443CF-E076-3960-90BD-57863F45F3B2}"/>
+          </ac:spMkLst>
+        </pc:spChg>
+      </pc:sldChg>
+    </pc:docChg>
+  </pc:docChgLst>
+</pc:chgInfo>
 </file>
 
 <file path=ppt/slideLayouts/slideLayout1.xml><?xml version="1.0" encoding="utf-8"?>
@@ -151,7 +505,7 @@
           </a:lstStyle>
           <a:p>
             <a:r>
-              <a:rPr lang="en-US" smtClean="0"/>
+              <a:rPr lang="en-US"/>
               <a:t>Click to edit Master title style</a:t>
             </a:r>
             <a:endParaRPr lang="en-GB"/>
@@ -216,7 +570,7 @@
           </a:lstStyle>
           <a:p>
             <a:r>
-              <a:rPr lang="en-US" smtClean="0"/>
+              <a:rPr lang="en-US"/>
               <a:t>Click to edit Master subtitle style</a:t>
             </a:r>
             <a:endParaRPr lang="en-GB"/>
@@ -240,7 +594,7 @@
           <a:p>
             <a:fld id="{AB91BCC1-83D7-40E0-AB70-2BF6E42928C4}" type="datetimeFigureOut">
               <a:rPr lang="en-GB" smtClean="0"/>
-              <a:t>17/08/2023</a:t>
+              <a:t>06/09/2023</a:t>
             </a:fld>
             <a:endParaRPr lang="en-GB"/>
           </a:p>
@@ -334,7 +688,7 @@
           <a:lstStyle/>
           <a:p>
             <a:r>
-              <a:rPr lang="en-US" smtClean="0"/>
+              <a:rPr lang="en-US"/>
               <a:t>Click to edit Master title style</a:t>
             </a:r>
             <a:endParaRPr lang="en-GB"/>
@@ -358,35 +712,35 @@
           <a:p>
             <a:pPr lvl="0"/>
             <a:r>
-              <a:rPr lang="en-US" smtClean="0"/>
+              <a:rPr lang="en-US"/>
               <a:t>Edit Master text styles</a:t>
             </a:r>
           </a:p>
           <a:p>
             <a:pPr lvl="1"/>
             <a:r>
-              <a:rPr lang="en-US" smtClean="0"/>
+              <a:rPr lang="en-US"/>
               <a:t>Second level</a:t>
             </a:r>
           </a:p>
           <a:p>
             <a:pPr lvl="2"/>
             <a:r>
-              <a:rPr lang="en-US" smtClean="0"/>
+              <a:rPr lang="en-US"/>
               <a:t>Third level</a:t>
             </a:r>
           </a:p>
           <a:p>
             <a:pPr lvl="3"/>
             <a:r>
-              <a:rPr lang="en-US" smtClean="0"/>
+              <a:rPr lang="en-US"/>
               <a:t>Fourth level</a:t>
             </a:r>
           </a:p>
           <a:p>
             <a:pPr lvl="4"/>
             <a:r>
-              <a:rPr lang="en-US" smtClean="0"/>
+              <a:rPr lang="en-US"/>
               <a:t>Fifth level</a:t>
             </a:r>
             <a:endParaRPr lang="en-GB"/>
@@ -410,7 +764,7 @@
           <a:p>
             <a:fld id="{AB91BCC1-83D7-40E0-AB70-2BF6E42928C4}" type="datetimeFigureOut">
               <a:rPr lang="en-GB" smtClean="0"/>
-              <a:t>17/08/2023</a:t>
+              <a:t>06/09/2023</a:t>
             </a:fld>
             <a:endParaRPr lang="en-GB"/>
           </a:p>
@@ -509,7 +863,7 @@
           <a:lstStyle/>
           <a:p>
             <a:r>
-              <a:rPr lang="en-US" smtClean="0"/>
+              <a:rPr lang="en-US"/>
               <a:t>Click to edit Master title style</a:t>
             </a:r>
             <a:endParaRPr lang="en-GB"/>
@@ -538,35 +892,35 @@
           <a:p>
             <a:pPr lvl="0"/>
             <a:r>
-              <a:rPr lang="en-US" smtClean="0"/>
+              <a:rPr lang="en-US"/>
               <a:t>Edit Master text styles</a:t>
             </a:r>
           </a:p>
           <a:p>
             <a:pPr lvl="1"/>
             <a:r>
-              <a:rPr lang="en-US" smtClean="0"/>
+              <a:rPr lang="en-US"/>
               <a:t>Second level</a:t>
             </a:r>
           </a:p>
           <a:p>
             <a:pPr lvl="2"/>
             <a:r>
-              <a:rPr lang="en-US" smtClean="0"/>
+              <a:rPr lang="en-US"/>
               <a:t>Third level</a:t>
             </a:r>
           </a:p>
           <a:p>
             <a:pPr lvl="3"/>
             <a:r>
-              <a:rPr lang="en-US" smtClean="0"/>
+              <a:rPr lang="en-US"/>
               <a:t>Fourth level</a:t>
             </a:r>
           </a:p>
           <a:p>
             <a:pPr lvl="4"/>
             <a:r>
-              <a:rPr lang="en-US" smtClean="0"/>
+              <a:rPr lang="en-US"/>
               <a:t>Fifth level</a:t>
             </a:r>
             <a:endParaRPr lang="en-GB"/>
@@ -590,7 +944,7 @@
           <a:p>
             <a:fld id="{AB91BCC1-83D7-40E0-AB70-2BF6E42928C4}" type="datetimeFigureOut">
               <a:rPr lang="en-GB" smtClean="0"/>
-              <a:t>17/08/2023</a:t>
+              <a:t>06/09/2023</a:t>
             </a:fld>
             <a:endParaRPr lang="en-GB"/>
           </a:p>
@@ -684,7 +1038,7 @@
           <a:lstStyle/>
           <a:p>
             <a:r>
-              <a:rPr lang="en-US" smtClean="0"/>
+              <a:rPr lang="en-US"/>
               <a:t>Click to edit Master title style</a:t>
             </a:r>
             <a:endParaRPr lang="en-GB"/>
@@ -708,35 +1062,35 @@
           <a:p>
             <a:pPr lvl="0"/>
             <a:r>
-              <a:rPr lang="en-US" smtClean="0"/>
+              <a:rPr lang="en-US"/>
               <a:t>Edit Master text styles</a:t>
             </a:r>
           </a:p>
           <a:p>
             <a:pPr lvl="1"/>
             <a:r>
-              <a:rPr lang="en-US" smtClean="0"/>
+              <a:rPr lang="en-US"/>
               <a:t>Second level</a:t>
             </a:r>
           </a:p>
           <a:p>
             <a:pPr lvl="2"/>
             <a:r>
-              <a:rPr lang="en-US" smtClean="0"/>
+              <a:rPr lang="en-US"/>
               <a:t>Third level</a:t>
             </a:r>
           </a:p>
           <a:p>
             <a:pPr lvl="3"/>
             <a:r>
-              <a:rPr lang="en-US" smtClean="0"/>
+              <a:rPr lang="en-US"/>
               <a:t>Fourth level</a:t>
             </a:r>
           </a:p>
           <a:p>
             <a:pPr lvl="4"/>
             <a:r>
-              <a:rPr lang="en-US" smtClean="0"/>
+              <a:rPr lang="en-US"/>
               <a:t>Fifth level</a:t>
             </a:r>
             <a:endParaRPr lang="en-GB"/>
@@ -760,7 +1114,7 @@
           <a:p>
             <a:fld id="{AB91BCC1-83D7-40E0-AB70-2BF6E42928C4}" type="datetimeFigureOut">
               <a:rPr lang="en-GB" smtClean="0"/>
-              <a:t>17/08/2023</a:t>
+              <a:t>06/09/2023</a:t>
             </a:fld>
             <a:endParaRPr lang="en-GB"/>
           </a:p>
@@ -863,7 +1217,7 @@
           </a:lstStyle>
           <a:p>
             <a:r>
-              <a:rPr lang="en-US" smtClean="0"/>
+              <a:rPr lang="en-US"/>
               <a:t>Click to edit Master title style</a:t>
             </a:r>
             <a:endParaRPr lang="en-GB"/>
@@ -983,7 +1337,7 @@
           <a:p>
             <a:pPr lvl="0"/>
             <a:r>
-              <a:rPr lang="en-US" smtClean="0"/>
+              <a:rPr lang="en-US"/>
               <a:t>Edit Master text styles</a:t>
             </a:r>
           </a:p>
@@ -1006,7 +1360,7 @@
           <a:p>
             <a:fld id="{AB91BCC1-83D7-40E0-AB70-2BF6E42928C4}" type="datetimeFigureOut">
               <a:rPr lang="en-GB" smtClean="0"/>
-              <a:t>17/08/2023</a:t>
+              <a:t>06/09/2023</a:t>
             </a:fld>
             <a:endParaRPr lang="en-GB"/>
           </a:p>
@@ -1100,7 +1454,7 @@
           <a:lstStyle/>
           <a:p>
             <a:r>
-              <a:rPr lang="en-US" smtClean="0"/>
+              <a:rPr lang="en-US"/>
               <a:t>Click to edit Master title style</a:t>
             </a:r>
             <a:endParaRPr lang="en-GB"/>
@@ -1129,35 +1483,35 @@
           <a:p>
             <a:pPr lvl="0"/>
             <a:r>
-              <a:rPr lang="en-US" smtClean="0"/>
+              <a:rPr lang="en-US"/>
               <a:t>Edit Master text styles</a:t>
             </a:r>
           </a:p>
           <a:p>
             <a:pPr lvl="1"/>
             <a:r>
-              <a:rPr lang="en-US" smtClean="0"/>
+              <a:rPr lang="en-US"/>
               <a:t>Second level</a:t>
             </a:r>
           </a:p>
           <a:p>
             <a:pPr lvl="2"/>
             <a:r>
-              <a:rPr lang="en-US" smtClean="0"/>
+              <a:rPr lang="en-US"/>
               <a:t>Third level</a:t>
             </a:r>
           </a:p>
           <a:p>
             <a:pPr lvl="3"/>
             <a:r>
-              <a:rPr lang="en-US" smtClean="0"/>
+              <a:rPr lang="en-US"/>
               <a:t>Fourth level</a:t>
             </a:r>
           </a:p>
           <a:p>
             <a:pPr lvl="4"/>
             <a:r>
-              <a:rPr lang="en-US" smtClean="0"/>
+              <a:rPr lang="en-US"/>
               <a:t>Fifth level</a:t>
             </a:r>
             <a:endParaRPr lang="en-GB"/>
@@ -1186,35 +1540,35 @@
           <a:p>
             <a:pPr lvl="0"/>
             <a:r>
-              <a:rPr lang="en-US" smtClean="0"/>
+              <a:rPr lang="en-US"/>
               <a:t>Edit Master text styles</a:t>
             </a:r>
           </a:p>
           <a:p>
             <a:pPr lvl="1"/>
             <a:r>
-              <a:rPr lang="en-US" smtClean="0"/>
+              <a:rPr lang="en-US"/>
               <a:t>Second level</a:t>
             </a:r>
           </a:p>
           <a:p>
             <a:pPr lvl="2"/>
             <a:r>
-              <a:rPr lang="en-US" smtClean="0"/>
+              <a:rPr lang="en-US"/>
               <a:t>Third level</a:t>
             </a:r>
           </a:p>
           <a:p>
             <a:pPr lvl="3"/>
             <a:r>
-              <a:rPr lang="en-US" smtClean="0"/>
+              <a:rPr lang="en-US"/>
               <a:t>Fourth level</a:t>
             </a:r>
           </a:p>
           <a:p>
             <a:pPr lvl="4"/>
             <a:r>
-              <a:rPr lang="en-US" smtClean="0"/>
+              <a:rPr lang="en-US"/>
               <a:t>Fifth level</a:t>
             </a:r>
             <a:endParaRPr lang="en-GB"/>
@@ -1238,7 +1592,7 @@
           <a:p>
             <a:fld id="{AB91BCC1-83D7-40E0-AB70-2BF6E42928C4}" type="datetimeFigureOut">
               <a:rPr lang="en-GB" smtClean="0"/>
-              <a:t>17/08/2023</a:t>
+              <a:t>06/09/2023</a:t>
             </a:fld>
             <a:endParaRPr lang="en-GB"/>
           </a:p>
@@ -1337,7 +1691,7 @@
           <a:lstStyle/>
           <a:p>
             <a:r>
-              <a:rPr lang="en-US" smtClean="0"/>
+              <a:rPr lang="en-US"/>
               <a:t>Click to edit Master title style</a:t>
             </a:r>
             <a:endParaRPr lang="en-GB"/>
@@ -1403,7 +1757,7 @@
           <a:p>
             <a:pPr lvl="0"/>
             <a:r>
-              <a:rPr lang="en-US" smtClean="0"/>
+              <a:rPr lang="en-US"/>
               <a:t>Edit Master text styles</a:t>
             </a:r>
           </a:p>
@@ -1431,35 +1785,35 @@
           <a:p>
             <a:pPr lvl="0"/>
             <a:r>
-              <a:rPr lang="en-US" smtClean="0"/>
+              <a:rPr lang="en-US"/>
               <a:t>Edit Master text styles</a:t>
             </a:r>
           </a:p>
           <a:p>
             <a:pPr lvl="1"/>
             <a:r>
-              <a:rPr lang="en-US" smtClean="0"/>
+              <a:rPr lang="en-US"/>
               <a:t>Second level</a:t>
             </a:r>
           </a:p>
           <a:p>
             <a:pPr lvl="2"/>
             <a:r>
-              <a:rPr lang="en-US" smtClean="0"/>
+              <a:rPr lang="en-US"/>
               <a:t>Third level</a:t>
             </a:r>
           </a:p>
           <a:p>
             <a:pPr lvl="3"/>
             <a:r>
-              <a:rPr lang="en-US" smtClean="0"/>
+              <a:rPr lang="en-US"/>
               <a:t>Fourth level</a:t>
             </a:r>
           </a:p>
           <a:p>
             <a:pPr lvl="4"/>
             <a:r>
-              <a:rPr lang="en-US" smtClean="0"/>
+              <a:rPr lang="en-US"/>
               <a:t>Fifth level</a:t>
             </a:r>
             <a:endParaRPr lang="en-GB"/>
@@ -1525,7 +1879,7 @@
           <a:p>
             <a:pPr lvl="0"/>
             <a:r>
-              <a:rPr lang="en-US" smtClean="0"/>
+              <a:rPr lang="en-US"/>
               <a:t>Edit Master text styles</a:t>
             </a:r>
           </a:p>
@@ -1553,35 +1907,35 @@
           <a:p>
             <a:pPr lvl="0"/>
             <a:r>
-              <a:rPr lang="en-US" smtClean="0"/>
+              <a:rPr lang="en-US"/>
               <a:t>Edit Master text styles</a:t>
             </a:r>
           </a:p>
           <a:p>
             <a:pPr lvl="1"/>
             <a:r>
-              <a:rPr lang="en-US" smtClean="0"/>
+              <a:rPr lang="en-US"/>
               <a:t>Second level</a:t>
             </a:r>
           </a:p>
           <a:p>
             <a:pPr lvl="2"/>
             <a:r>
-              <a:rPr lang="en-US" smtClean="0"/>
+              <a:rPr lang="en-US"/>
               <a:t>Third level</a:t>
             </a:r>
           </a:p>
           <a:p>
             <a:pPr lvl="3"/>
             <a:r>
-              <a:rPr lang="en-US" smtClean="0"/>
+              <a:rPr lang="en-US"/>
               <a:t>Fourth level</a:t>
             </a:r>
           </a:p>
           <a:p>
             <a:pPr lvl="4"/>
             <a:r>
-              <a:rPr lang="en-US" smtClean="0"/>
+              <a:rPr lang="en-US"/>
               <a:t>Fifth level</a:t>
             </a:r>
             <a:endParaRPr lang="en-GB"/>
@@ -1605,7 +1959,7 @@
           <a:p>
             <a:fld id="{AB91BCC1-83D7-40E0-AB70-2BF6E42928C4}" type="datetimeFigureOut">
               <a:rPr lang="en-GB" smtClean="0"/>
-              <a:t>17/08/2023</a:t>
+              <a:t>06/09/2023</a:t>
             </a:fld>
             <a:endParaRPr lang="en-GB"/>
           </a:p>
@@ -1699,7 +2053,7 @@
           <a:lstStyle/>
           <a:p>
             <a:r>
-              <a:rPr lang="en-US" smtClean="0"/>
+              <a:rPr lang="en-US"/>
               <a:t>Click to edit Master title style</a:t>
             </a:r>
             <a:endParaRPr lang="en-GB"/>
@@ -1723,7 +2077,7 @@
           <a:p>
             <a:fld id="{AB91BCC1-83D7-40E0-AB70-2BF6E42928C4}" type="datetimeFigureOut">
               <a:rPr lang="en-GB" smtClean="0"/>
-              <a:t>17/08/2023</a:t>
+              <a:t>06/09/2023</a:t>
             </a:fld>
             <a:endParaRPr lang="en-GB"/>
           </a:p>
@@ -1818,7 +2172,7 @@
           <a:p>
             <a:fld id="{AB91BCC1-83D7-40E0-AB70-2BF6E42928C4}" type="datetimeFigureOut">
               <a:rPr lang="en-GB" smtClean="0"/>
-              <a:t>17/08/2023</a:t>
+              <a:t>06/09/2023</a:t>
             </a:fld>
             <a:endParaRPr lang="en-GB"/>
           </a:p>
@@ -1921,7 +2275,7 @@
           </a:lstStyle>
           <a:p>
             <a:r>
-              <a:rPr lang="en-US" smtClean="0"/>
+              <a:rPr lang="en-US"/>
               <a:t>Click to edit Master title style</a:t>
             </a:r>
             <a:endParaRPr lang="en-GB"/>
@@ -1978,35 +2332,35 @@
           <a:p>
             <a:pPr lvl="0"/>
             <a:r>
-              <a:rPr lang="en-US" smtClean="0"/>
+              <a:rPr lang="en-US"/>
               <a:t>Edit Master text styles</a:t>
             </a:r>
           </a:p>
           <a:p>
             <a:pPr lvl="1"/>
             <a:r>
-              <a:rPr lang="en-US" smtClean="0"/>
+              <a:rPr lang="en-US"/>
               <a:t>Second level</a:t>
             </a:r>
           </a:p>
           <a:p>
             <a:pPr lvl="2"/>
             <a:r>
-              <a:rPr lang="en-US" smtClean="0"/>
+              <a:rPr lang="en-US"/>
               <a:t>Third level</a:t>
             </a:r>
           </a:p>
           <a:p>
             <a:pPr lvl="3"/>
             <a:r>
-              <a:rPr lang="en-US" smtClean="0"/>
+              <a:rPr lang="en-US"/>
               <a:t>Fourth level</a:t>
             </a:r>
           </a:p>
           <a:p>
             <a:pPr lvl="4"/>
             <a:r>
-              <a:rPr lang="en-US" smtClean="0"/>
+              <a:rPr lang="en-US"/>
               <a:t>Fifth level</a:t>
             </a:r>
             <a:endParaRPr lang="en-GB"/>
@@ -2072,7 +2426,7 @@
           <a:p>
             <a:pPr lvl="0"/>
             <a:r>
-              <a:rPr lang="en-US" smtClean="0"/>
+              <a:rPr lang="en-US"/>
               <a:t>Edit Master text styles</a:t>
             </a:r>
           </a:p>
@@ -2095,7 +2449,7 @@
           <a:p>
             <a:fld id="{AB91BCC1-83D7-40E0-AB70-2BF6E42928C4}" type="datetimeFigureOut">
               <a:rPr lang="en-GB" smtClean="0"/>
-              <a:t>17/08/2023</a:t>
+              <a:t>06/09/2023</a:t>
             </a:fld>
             <a:endParaRPr lang="en-GB"/>
           </a:p>
@@ -2198,7 +2552,7 @@
           </a:lstStyle>
           <a:p>
             <a:r>
-              <a:rPr lang="en-US" smtClean="0"/>
+              <a:rPr lang="en-US"/>
               <a:t>Click to edit Master title style</a:t>
             </a:r>
             <a:endParaRPr lang="en-GB"/>
@@ -2325,7 +2679,7 @@
           <a:p>
             <a:pPr lvl="0"/>
             <a:r>
-              <a:rPr lang="en-US" smtClean="0"/>
+              <a:rPr lang="en-US"/>
               <a:t>Edit Master text styles</a:t>
             </a:r>
           </a:p>
@@ -2348,7 +2702,7 @@
           <a:p>
             <a:fld id="{AB91BCC1-83D7-40E0-AB70-2BF6E42928C4}" type="datetimeFigureOut">
               <a:rPr lang="en-GB" smtClean="0"/>
-              <a:t>17/08/2023</a:t>
+              <a:t>06/09/2023</a:t>
             </a:fld>
             <a:endParaRPr lang="en-GB"/>
           </a:p>
@@ -2457,7 +2811,7 @@
           <a:lstStyle/>
           <a:p>
             <a:r>
-              <a:rPr lang="en-US" smtClean="0"/>
+              <a:rPr lang="en-US"/>
               <a:t>Click to edit Master title style</a:t>
             </a:r>
             <a:endParaRPr lang="en-GB"/>
@@ -2491,35 +2845,35 @@
           <a:p>
             <a:pPr lvl="0"/>
             <a:r>
-              <a:rPr lang="en-US" smtClean="0"/>
+              <a:rPr lang="en-US"/>
               <a:t>Edit Master text styles</a:t>
             </a:r>
           </a:p>
           <a:p>
             <a:pPr lvl="1"/>
             <a:r>
-              <a:rPr lang="en-US" smtClean="0"/>
+              <a:rPr lang="en-US"/>
               <a:t>Second level</a:t>
             </a:r>
           </a:p>
           <a:p>
             <a:pPr lvl="2"/>
             <a:r>
-              <a:rPr lang="en-US" smtClean="0"/>
+              <a:rPr lang="en-US"/>
               <a:t>Third level</a:t>
             </a:r>
           </a:p>
           <a:p>
             <a:pPr lvl="3"/>
             <a:r>
-              <a:rPr lang="en-US" smtClean="0"/>
+              <a:rPr lang="en-US"/>
               <a:t>Fourth level</a:t>
             </a:r>
           </a:p>
           <a:p>
             <a:pPr lvl="4"/>
             <a:r>
-              <a:rPr lang="en-US" smtClean="0"/>
+              <a:rPr lang="en-US"/>
               <a:t>Fifth level</a:t>
             </a:r>
             <a:endParaRPr lang="en-GB"/>
@@ -2561,7 +2915,7 @@
           <a:p>
             <a:fld id="{AB91BCC1-83D7-40E0-AB70-2BF6E42928C4}" type="datetimeFigureOut">
               <a:rPr lang="en-GB" smtClean="0"/>
-              <a:t>17/08/2023</a:t>
+              <a:t>06/09/2023</a:t>
             </a:fld>
             <a:endParaRPr lang="en-GB"/>
           </a:p>
@@ -3009,18 +3363,13 @@
           <a:p>
             <a:pPr algn="ctr"/>
             <a:r>
-              <a:rPr lang="en-GB" dirty="0" smtClean="0">
+              <a:rPr lang="en-GB" dirty="0">
                 <a:solidFill>
                   <a:schemeClr val="tx1"/>
                 </a:solidFill>
               </a:rPr>
               <a:t>Extroversion</a:t>
             </a:r>
-            <a:endParaRPr lang="en-GB" dirty="0">
-              <a:solidFill>
-                <a:schemeClr val="tx1"/>
-              </a:solidFill>
-            </a:endParaRPr>
           </a:p>
         </p:txBody>
       </p:sp>
@@ -3067,7 +3416,7 @@
           <a:p>
             <a:pPr algn="ctr"/>
             <a:r>
-              <a:rPr lang="en-GB" dirty="0" err="1" smtClean="0">
+              <a:rPr lang="en-GB" dirty="0" err="1">
                 <a:solidFill>
                   <a:schemeClr val="tx1"/>
                 </a:solidFill>
@@ -3075,18 +3424,13 @@
               <a:t>Consc</a:t>
             </a:r>
             <a:r>
-              <a:rPr lang="en-GB" dirty="0" smtClean="0">
+              <a:rPr lang="en-GB" dirty="0">
                 <a:solidFill>
                   <a:schemeClr val="tx1"/>
                 </a:solidFill>
               </a:rPr>
               <a:t>.</a:t>
             </a:r>
-            <a:endParaRPr lang="en-GB" dirty="0">
-              <a:solidFill>
-                <a:schemeClr val="tx1"/>
-              </a:solidFill>
-            </a:endParaRPr>
           </a:p>
         </p:txBody>
       </p:sp>
@@ -3133,18 +3477,13 @@
           <a:p>
             <a:pPr algn="ctr"/>
             <a:r>
-              <a:rPr lang="en-GB" dirty="0" smtClean="0">
+              <a:rPr lang="en-GB" dirty="0">
                 <a:solidFill>
                   <a:schemeClr val="tx1"/>
                 </a:solidFill>
               </a:rPr>
               <a:t>Maths Interest</a:t>
             </a:r>
-            <a:endParaRPr lang="en-GB" dirty="0">
-              <a:solidFill>
-                <a:schemeClr val="tx1"/>
-              </a:solidFill>
-            </a:endParaRPr>
           </a:p>
         </p:txBody>
       </p:sp>
@@ -3191,18 +3530,13 @@
           <a:p>
             <a:pPr algn="ctr"/>
             <a:r>
-              <a:rPr lang="en-GB" dirty="0" smtClean="0">
+              <a:rPr lang="en-GB" dirty="0">
                 <a:solidFill>
                   <a:schemeClr val="tx1"/>
                 </a:solidFill>
               </a:rPr>
               <a:t>English Interest</a:t>
             </a:r>
-            <a:endParaRPr lang="en-GB" dirty="0">
-              <a:solidFill>
-                <a:schemeClr val="tx1"/>
-              </a:solidFill>
-            </a:endParaRPr>
           </a:p>
         </p:txBody>
       </p:sp>
@@ -3249,18 +3583,13 @@
           <a:p>
             <a:pPr algn="ctr"/>
             <a:r>
-              <a:rPr lang="en-GB" dirty="0" smtClean="0">
+              <a:rPr lang="en-GB" dirty="0">
                 <a:solidFill>
                   <a:schemeClr val="tx1"/>
                 </a:solidFill>
               </a:rPr>
               <a:t>Age</a:t>
             </a:r>
-            <a:endParaRPr lang="en-GB" dirty="0">
-              <a:solidFill>
-                <a:schemeClr val="tx1"/>
-              </a:solidFill>
-            </a:endParaRPr>
           </a:p>
         </p:txBody>
       </p:sp>
@@ -3586,18 +3915,13 @@
             <a:p>
               <a:pPr algn="ctr"/>
               <a:r>
-                <a:rPr lang="en-GB" dirty="0" smtClean="0">
+                <a:rPr lang="en-GB" dirty="0">
                   <a:solidFill>
                     <a:schemeClr val="tx1"/>
                   </a:solidFill>
                 </a:rPr>
                 <a:t>Extroversion</a:t>
               </a:r>
-              <a:endParaRPr lang="en-GB" dirty="0">
-                <a:solidFill>
-                  <a:schemeClr val="tx1"/>
-                </a:solidFill>
-              </a:endParaRPr>
             </a:p>
           </p:txBody>
         </p:sp>
@@ -3644,7 +3968,7 @@
             <a:p>
               <a:pPr algn="ctr"/>
               <a:r>
-                <a:rPr lang="en-GB" dirty="0" err="1" smtClean="0">
+                <a:rPr lang="en-GB" dirty="0" err="1">
                   <a:solidFill>
                     <a:schemeClr val="tx1"/>
                   </a:solidFill>
@@ -3652,18 +3976,13 @@
                 <a:t>Consc</a:t>
               </a:r>
               <a:r>
-                <a:rPr lang="en-GB" dirty="0" smtClean="0">
+                <a:rPr lang="en-GB" dirty="0">
                   <a:solidFill>
                     <a:schemeClr val="tx1"/>
                   </a:solidFill>
                 </a:rPr>
                 <a:t>.</a:t>
               </a:r>
-              <a:endParaRPr lang="en-GB" dirty="0">
-                <a:solidFill>
-                  <a:schemeClr val="tx1"/>
-                </a:solidFill>
-              </a:endParaRPr>
             </a:p>
           </p:txBody>
         </p:sp>
@@ -3710,18 +4029,13 @@
             <a:p>
               <a:pPr algn="ctr"/>
               <a:r>
-                <a:rPr lang="en-GB" dirty="0" smtClean="0">
+                <a:rPr lang="en-GB" dirty="0">
                   <a:solidFill>
                     <a:schemeClr val="tx1"/>
                   </a:solidFill>
                 </a:rPr>
                 <a:t>Maths Interest</a:t>
               </a:r>
-              <a:endParaRPr lang="en-GB" dirty="0">
-                <a:solidFill>
-                  <a:schemeClr val="tx1"/>
-                </a:solidFill>
-              </a:endParaRPr>
             </a:p>
           </p:txBody>
         </p:sp>
@@ -3768,18 +4082,13 @@
             <a:p>
               <a:pPr algn="ctr"/>
               <a:r>
-                <a:rPr lang="en-GB" dirty="0" smtClean="0">
+                <a:rPr lang="en-GB" dirty="0">
                   <a:solidFill>
                     <a:schemeClr val="tx1"/>
                   </a:solidFill>
                 </a:rPr>
                 <a:t>English Interest</a:t>
               </a:r>
-              <a:endParaRPr lang="en-GB" dirty="0">
-                <a:solidFill>
-                  <a:schemeClr val="tx1"/>
-                </a:solidFill>
-              </a:endParaRPr>
             </a:p>
           </p:txBody>
         </p:sp>
@@ -3826,18 +4135,13 @@
             <a:p>
               <a:pPr algn="ctr"/>
               <a:r>
-                <a:rPr lang="en-GB" dirty="0" smtClean="0">
+                <a:rPr lang="en-GB" dirty="0">
                   <a:solidFill>
                     <a:schemeClr val="tx1"/>
                   </a:solidFill>
                 </a:rPr>
                 <a:t>Age</a:t>
               </a:r>
-              <a:endParaRPr lang="en-GB" dirty="0">
-                <a:solidFill>
-                  <a:schemeClr val="tx1"/>
-                </a:solidFill>
-              </a:endParaRPr>
             </a:p>
           </p:txBody>
         </p:sp>
@@ -4619,18 +4923,13 @@
             <a:p>
               <a:pPr algn="ctr"/>
               <a:r>
-                <a:rPr lang="en-GB" dirty="0" smtClean="0">
+                <a:rPr lang="en-GB" dirty="0">
                   <a:solidFill>
                     <a:schemeClr val="tx1"/>
                   </a:solidFill>
                 </a:rPr>
                 <a:t>Extroversion</a:t>
               </a:r>
-              <a:endParaRPr lang="en-GB" dirty="0">
-                <a:solidFill>
-                  <a:schemeClr val="tx1"/>
-                </a:solidFill>
-              </a:endParaRPr>
             </a:p>
           </p:txBody>
         </p:sp>
@@ -4677,7 +4976,7 @@
             <a:p>
               <a:pPr algn="ctr"/>
               <a:r>
-                <a:rPr lang="en-GB" dirty="0" err="1" smtClean="0">
+                <a:rPr lang="en-GB" dirty="0" err="1">
                   <a:solidFill>
                     <a:schemeClr val="tx1"/>
                   </a:solidFill>
@@ -4685,18 +4984,13 @@
                 <a:t>Consc</a:t>
               </a:r>
               <a:r>
-                <a:rPr lang="en-GB" dirty="0" smtClean="0">
+                <a:rPr lang="en-GB" dirty="0">
                   <a:solidFill>
                     <a:schemeClr val="tx1"/>
                   </a:solidFill>
                 </a:rPr>
                 <a:t>.</a:t>
               </a:r>
-              <a:endParaRPr lang="en-GB" dirty="0">
-                <a:solidFill>
-                  <a:schemeClr val="tx1"/>
-                </a:solidFill>
-              </a:endParaRPr>
             </a:p>
           </p:txBody>
         </p:sp>
@@ -4743,18 +5037,13 @@
             <a:p>
               <a:pPr algn="ctr"/>
               <a:r>
-                <a:rPr lang="en-GB" dirty="0" smtClean="0">
+                <a:rPr lang="en-GB" dirty="0">
                   <a:solidFill>
                     <a:schemeClr val="tx1"/>
                   </a:solidFill>
                 </a:rPr>
                 <a:t>Maths Interest</a:t>
               </a:r>
-              <a:endParaRPr lang="en-GB" dirty="0">
-                <a:solidFill>
-                  <a:schemeClr val="tx1"/>
-                </a:solidFill>
-              </a:endParaRPr>
             </a:p>
           </p:txBody>
         </p:sp>
@@ -4801,18 +5090,13 @@
             <a:p>
               <a:pPr algn="ctr"/>
               <a:r>
-                <a:rPr lang="en-GB" dirty="0" smtClean="0">
+                <a:rPr lang="en-GB" dirty="0">
                   <a:solidFill>
                     <a:schemeClr val="tx1"/>
                   </a:solidFill>
                 </a:rPr>
                 <a:t>English Interest</a:t>
               </a:r>
-              <a:endParaRPr lang="en-GB" dirty="0">
-                <a:solidFill>
-                  <a:schemeClr val="tx1"/>
-                </a:solidFill>
-              </a:endParaRPr>
             </a:p>
           </p:txBody>
         </p:sp>
@@ -4859,18 +5143,13 @@
             <a:p>
               <a:pPr algn="ctr"/>
               <a:r>
-                <a:rPr lang="en-GB" dirty="0" smtClean="0">
+                <a:rPr lang="en-GB" dirty="0">
                   <a:solidFill>
                     <a:schemeClr val="tx1"/>
                   </a:solidFill>
                 </a:rPr>
                 <a:t>Age</a:t>
               </a:r>
-              <a:endParaRPr lang="en-GB" dirty="0">
-                <a:solidFill>
-                  <a:schemeClr val="tx1"/>
-                </a:solidFill>
-              </a:endParaRPr>
             </a:p>
           </p:txBody>
         </p:sp>
@@ -5579,6 +5858,1959 @@
     <p:extLst>
       <p:ext uri="{BB962C8B-B14F-4D97-AF65-F5344CB8AC3E}">
         <p14:creationId xmlns:p14="http://schemas.microsoft.com/office/powerpoint/2010/main" val="3111813444"/>
+      </p:ext>
+    </p:extLst>
+  </p:cSld>
+  <p:clrMapOvr>
+    <a:masterClrMapping/>
+  </p:clrMapOvr>
+</p:sld>
+</file>
+
+<file path=ppt/slides/slide4.xml><?xml version="1.0" encoding="utf-8"?>
+<p:sld xmlns:a="http://schemas.openxmlformats.org/drawingml/2006/main" xmlns:r="http://schemas.openxmlformats.org/officeDocument/2006/relationships" xmlns:p="http://schemas.openxmlformats.org/presentationml/2006/main">
+  <p:cSld>
+    <p:spTree>
+      <p:nvGrpSpPr>
+        <p:cNvPr id="1" name=""/>
+        <p:cNvGrpSpPr/>
+        <p:nvPr/>
+      </p:nvGrpSpPr>
+      <p:grpSpPr>
+        <a:xfrm>
+          <a:off x="0" y="0"/>
+          <a:ext cx="0" cy="0"/>
+          <a:chOff x="0" y="0"/>
+          <a:chExt cx="0" cy="0"/>
+        </a:xfrm>
+      </p:grpSpPr>
+      <p:grpSp>
+        <p:nvGrpSpPr>
+          <p:cNvPr id="22" name="Group 21">
+            <a:extLst>
+              <a:ext uri="{FF2B5EF4-FFF2-40B4-BE49-F238E27FC236}">
+                <a16:creationId xmlns:a16="http://schemas.microsoft.com/office/drawing/2014/main" id="{A45D3BBD-83EA-C72A-F34A-A3E0CADE9FC2}"/>
+              </a:ext>
+            </a:extLst>
+          </p:cNvPr>
+          <p:cNvGrpSpPr/>
+          <p:nvPr/>
+        </p:nvGrpSpPr>
+        <p:grpSpPr>
+          <a:xfrm>
+            <a:off x="2211992" y="1526757"/>
+            <a:ext cx="8072365" cy="2904575"/>
+            <a:chOff x="1891952" y="1004243"/>
+            <a:chExt cx="8072365" cy="2904575"/>
+          </a:xfrm>
+        </p:grpSpPr>
+        <p:sp>
+          <p:nvSpPr>
+            <p:cNvPr id="4" name="Rectangle 3"/>
+            <p:cNvSpPr/>
+            <p:nvPr/>
+          </p:nvSpPr>
+          <p:spPr>
+            <a:xfrm>
+              <a:off x="1891952" y="3135735"/>
+              <a:ext cx="1487978" cy="773083"/>
+            </a:xfrm>
+            <a:prstGeom prst="rect">
+              <a:avLst/>
+            </a:prstGeom>
+            <a:noFill/>
+            <a:ln>
+              <a:solidFill>
+                <a:schemeClr val="tx1"/>
+              </a:solidFill>
+            </a:ln>
+          </p:spPr>
+          <p:style>
+            <a:lnRef idx="2">
+              <a:schemeClr val="accent1">
+                <a:shade val="50000"/>
+              </a:schemeClr>
+            </a:lnRef>
+            <a:fillRef idx="1">
+              <a:schemeClr val="accent1"/>
+            </a:fillRef>
+            <a:effectRef idx="0">
+              <a:schemeClr val="accent1"/>
+            </a:effectRef>
+            <a:fontRef idx="minor">
+              <a:schemeClr val="lt1"/>
+            </a:fontRef>
+          </p:style>
+          <p:txBody>
+            <a:bodyPr rtlCol="0" anchor="ctr"/>
+            <a:lstStyle/>
+            <a:p>
+              <a:pPr algn="ctr"/>
+              <a:r>
+                <a:rPr lang="en-GB" dirty="0">
+                  <a:solidFill>
+                    <a:schemeClr val="tx1"/>
+                  </a:solidFill>
+                </a:rPr>
+                <a:t>X</a:t>
+              </a:r>
+            </a:p>
+          </p:txBody>
+        </p:sp>
+        <p:sp>
+          <p:nvSpPr>
+            <p:cNvPr id="6" name="Rectangle 5"/>
+            <p:cNvSpPr/>
+            <p:nvPr/>
+          </p:nvSpPr>
+          <p:spPr>
+            <a:xfrm>
+              <a:off x="4887898" y="1693802"/>
+              <a:ext cx="1487978" cy="773083"/>
+            </a:xfrm>
+            <a:prstGeom prst="rect">
+              <a:avLst/>
+            </a:prstGeom>
+            <a:noFill/>
+            <a:ln>
+              <a:solidFill>
+                <a:schemeClr val="tx1"/>
+              </a:solidFill>
+            </a:ln>
+          </p:spPr>
+          <p:style>
+            <a:lnRef idx="2">
+              <a:schemeClr val="accent1">
+                <a:shade val="50000"/>
+              </a:schemeClr>
+            </a:lnRef>
+            <a:fillRef idx="1">
+              <a:schemeClr val="accent1"/>
+            </a:fillRef>
+            <a:effectRef idx="0">
+              <a:schemeClr val="accent1"/>
+            </a:effectRef>
+            <a:fontRef idx="minor">
+              <a:schemeClr val="lt1"/>
+            </a:fontRef>
+          </p:style>
+          <p:txBody>
+            <a:bodyPr rtlCol="0" anchor="ctr"/>
+            <a:lstStyle/>
+            <a:p>
+              <a:pPr algn="ctr"/>
+              <a:r>
+                <a:rPr lang="en-GB" dirty="0">
+                  <a:solidFill>
+                    <a:schemeClr val="tx1"/>
+                  </a:solidFill>
+                </a:rPr>
+                <a:t>M</a:t>
+              </a:r>
+            </a:p>
+          </p:txBody>
+        </p:sp>
+        <p:sp>
+          <p:nvSpPr>
+            <p:cNvPr id="7" name="Rectangle 6"/>
+            <p:cNvSpPr/>
+            <p:nvPr/>
+          </p:nvSpPr>
+          <p:spPr>
+            <a:xfrm>
+              <a:off x="7869201" y="3135735"/>
+              <a:ext cx="1487978" cy="773083"/>
+            </a:xfrm>
+            <a:prstGeom prst="rect">
+              <a:avLst/>
+            </a:prstGeom>
+            <a:noFill/>
+            <a:ln>
+              <a:solidFill>
+                <a:schemeClr val="tx1"/>
+              </a:solidFill>
+            </a:ln>
+          </p:spPr>
+          <p:style>
+            <a:lnRef idx="2">
+              <a:schemeClr val="accent1">
+                <a:shade val="50000"/>
+              </a:schemeClr>
+            </a:lnRef>
+            <a:fillRef idx="1">
+              <a:schemeClr val="accent1"/>
+            </a:fillRef>
+            <a:effectRef idx="0">
+              <a:schemeClr val="accent1"/>
+            </a:effectRef>
+            <a:fontRef idx="minor">
+              <a:schemeClr val="lt1"/>
+            </a:fontRef>
+          </p:style>
+          <p:txBody>
+            <a:bodyPr rtlCol="0" anchor="ctr"/>
+            <a:lstStyle/>
+            <a:p>
+              <a:pPr algn="ctr"/>
+              <a:r>
+                <a:rPr lang="en-GB" dirty="0">
+                  <a:solidFill>
+                    <a:schemeClr val="tx1"/>
+                  </a:solidFill>
+                </a:rPr>
+                <a:t>Y</a:t>
+              </a:r>
+            </a:p>
+          </p:txBody>
+        </p:sp>
+        <p:cxnSp>
+          <p:nvCxnSpPr>
+            <p:cNvPr id="35" name="Straight Arrow Connector 34"/>
+            <p:cNvCxnSpPr>
+              <a:cxnSpLocks/>
+              <a:stCxn id="39" idx="4"/>
+              <a:endCxn id="6" idx="0"/>
+            </p:cNvCxnSpPr>
+            <p:nvPr/>
+          </p:nvCxnSpPr>
+          <p:spPr>
+            <a:xfrm>
+              <a:off x="5631887" y="1250855"/>
+              <a:ext cx="0" cy="442947"/>
+            </a:xfrm>
+            <a:prstGeom prst="straightConnector1">
+              <a:avLst/>
+            </a:prstGeom>
+            <a:ln w="12700">
+              <a:solidFill>
+                <a:schemeClr val="tx1"/>
+              </a:solidFill>
+              <a:tailEnd type="triangle"/>
+            </a:ln>
+          </p:spPr>
+          <p:style>
+            <a:lnRef idx="1">
+              <a:schemeClr val="accent1"/>
+            </a:lnRef>
+            <a:fillRef idx="0">
+              <a:schemeClr val="accent1"/>
+            </a:fillRef>
+            <a:effectRef idx="0">
+              <a:schemeClr val="accent1"/>
+            </a:effectRef>
+            <a:fontRef idx="minor">
+              <a:schemeClr val="tx1"/>
+            </a:fontRef>
+          </p:style>
+        </p:cxnSp>
+        <p:cxnSp>
+          <p:nvCxnSpPr>
+            <p:cNvPr id="38" name="Straight Arrow Connector 37"/>
+            <p:cNvCxnSpPr/>
+            <p:nvPr/>
+          </p:nvCxnSpPr>
+          <p:spPr>
+            <a:xfrm flipH="1">
+              <a:off x="9358564" y="3522275"/>
+              <a:ext cx="353827" cy="1"/>
+            </a:xfrm>
+            <a:prstGeom prst="straightConnector1">
+              <a:avLst/>
+            </a:prstGeom>
+            <a:ln w="12700">
+              <a:solidFill>
+                <a:schemeClr val="tx1"/>
+              </a:solidFill>
+              <a:tailEnd type="triangle"/>
+            </a:ln>
+          </p:spPr>
+          <p:style>
+            <a:lnRef idx="1">
+              <a:schemeClr val="accent1"/>
+            </a:lnRef>
+            <a:fillRef idx="0">
+              <a:schemeClr val="accent1"/>
+            </a:fillRef>
+            <a:effectRef idx="0">
+              <a:schemeClr val="accent1"/>
+            </a:effectRef>
+            <a:fontRef idx="minor">
+              <a:schemeClr val="tx1"/>
+            </a:fontRef>
+          </p:style>
+        </p:cxnSp>
+        <p:sp>
+          <p:nvSpPr>
+            <p:cNvPr id="39" name="Oval 38"/>
+            <p:cNvSpPr/>
+            <p:nvPr/>
+          </p:nvSpPr>
+          <p:spPr>
+            <a:xfrm>
+              <a:off x="5505924" y="1004243"/>
+              <a:ext cx="251926" cy="246612"/>
+            </a:xfrm>
+            <a:prstGeom prst="ellipse">
+              <a:avLst/>
+            </a:prstGeom>
+            <a:noFill/>
+            <a:ln>
+              <a:solidFill>
+                <a:schemeClr val="tx1"/>
+              </a:solidFill>
+            </a:ln>
+          </p:spPr>
+          <p:style>
+            <a:lnRef idx="2">
+              <a:schemeClr val="accent1">
+                <a:shade val="50000"/>
+              </a:schemeClr>
+            </a:lnRef>
+            <a:fillRef idx="1">
+              <a:schemeClr val="accent1"/>
+            </a:fillRef>
+            <a:effectRef idx="0">
+              <a:schemeClr val="accent1"/>
+            </a:effectRef>
+            <a:fontRef idx="minor">
+              <a:schemeClr val="lt1"/>
+            </a:fontRef>
+          </p:style>
+          <p:txBody>
+            <a:bodyPr rtlCol="0" anchor="ctr"/>
+            <a:lstStyle/>
+            <a:p>
+              <a:pPr algn="ctr"/>
+              <a:endParaRPr lang="en-GB"/>
+            </a:p>
+          </p:txBody>
+        </p:sp>
+        <p:sp>
+          <p:nvSpPr>
+            <p:cNvPr id="41" name="Oval 40"/>
+            <p:cNvSpPr/>
+            <p:nvPr/>
+          </p:nvSpPr>
+          <p:spPr>
+            <a:xfrm>
+              <a:off x="9712391" y="3393569"/>
+              <a:ext cx="251926" cy="246612"/>
+            </a:xfrm>
+            <a:prstGeom prst="ellipse">
+              <a:avLst/>
+            </a:prstGeom>
+            <a:noFill/>
+            <a:ln>
+              <a:solidFill>
+                <a:schemeClr val="tx1"/>
+              </a:solidFill>
+            </a:ln>
+          </p:spPr>
+          <p:style>
+            <a:lnRef idx="2">
+              <a:schemeClr val="accent1">
+                <a:shade val="50000"/>
+              </a:schemeClr>
+            </a:lnRef>
+            <a:fillRef idx="1">
+              <a:schemeClr val="accent1"/>
+            </a:fillRef>
+            <a:effectRef idx="0">
+              <a:schemeClr val="accent1"/>
+            </a:effectRef>
+            <a:fontRef idx="minor">
+              <a:schemeClr val="lt1"/>
+            </a:fontRef>
+          </p:style>
+          <p:txBody>
+            <a:bodyPr rtlCol="0" anchor="ctr"/>
+            <a:lstStyle/>
+            <a:p>
+              <a:pPr algn="ctr"/>
+              <a:endParaRPr lang="en-GB"/>
+            </a:p>
+          </p:txBody>
+        </p:sp>
+        <p:sp>
+          <p:nvSpPr>
+            <p:cNvPr id="43" name="Right Bracket 42"/>
+            <p:cNvSpPr/>
+            <p:nvPr/>
+          </p:nvSpPr>
+          <p:spPr>
+            <a:xfrm rot="16200000">
+              <a:off x="2511872" y="2884886"/>
+              <a:ext cx="248137" cy="217481"/>
+            </a:xfrm>
+            <a:prstGeom prst="rightBracket">
+              <a:avLst>
+                <a:gd name="adj" fmla="val 208332"/>
+              </a:avLst>
+            </a:prstGeom>
+            <a:ln w="12700">
+              <a:solidFill>
+                <a:schemeClr val="tx1"/>
+              </a:solidFill>
+              <a:headEnd type="triangle"/>
+              <a:tailEnd type="triangle"/>
+            </a:ln>
+          </p:spPr>
+          <p:style>
+            <a:lnRef idx="1">
+              <a:schemeClr val="accent1"/>
+            </a:lnRef>
+            <a:fillRef idx="0">
+              <a:schemeClr val="accent1"/>
+            </a:fillRef>
+            <a:effectRef idx="0">
+              <a:schemeClr val="accent1"/>
+            </a:effectRef>
+            <a:fontRef idx="minor">
+              <a:schemeClr val="tx1"/>
+            </a:fontRef>
+          </p:style>
+          <p:txBody>
+            <a:bodyPr rtlCol="0" anchor="ctr"/>
+            <a:lstStyle/>
+            <a:p>
+              <a:pPr algn="ctr"/>
+              <a:endParaRPr lang="en-GB"/>
+            </a:p>
+          </p:txBody>
+        </p:sp>
+        <p:cxnSp>
+          <p:nvCxnSpPr>
+            <p:cNvPr id="10" name="Straight Arrow Connector 9">
+              <a:extLst>
+                <a:ext uri="{FF2B5EF4-FFF2-40B4-BE49-F238E27FC236}">
+                  <a16:creationId xmlns:a16="http://schemas.microsoft.com/office/drawing/2014/main" id="{CBCB3278-E1A8-2469-C52C-0133701BF3F4}"/>
+                </a:ext>
+              </a:extLst>
+            </p:cNvPr>
+            <p:cNvCxnSpPr>
+              <a:stCxn id="4" idx="3"/>
+              <a:endCxn id="6" idx="1"/>
+            </p:cNvCxnSpPr>
+            <p:nvPr/>
+          </p:nvCxnSpPr>
+          <p:spPr>
+            <a:xfrm flipV="1">
+              <a:off x="3379930" y="2080344"/>
+              <a:ext cx="1507968" cy="1441933"/>
+            </a:xfrm>
+            <a:prstGeom prst="straightConnector1">
+              <a:avLst/>
+            </a:prstGeom>
+            <a:ln w="12700">
+              <a:solidFill>
+                <a:schemeClr val="tx1"/>
+              </a:solidFill>
+              <a:tailEnd type="triangle"/>
+            </a:ln>
+          </p:spPr>
+          <p:style>
+            <a:lnRef idx="1">
+              <a:schemeClr val="accent1"/>
+            </a:lnRef>
+            <a:fillRef idx="0">
+              <a:schemeClr val="accent1"/>
+            </a:fillRef>
+            <a:effectRef idx="0">
+              <a:schemeClr val="accent1"/>
+            </a:effectRef>
+            <a:fontRef idx="minor">
+              <a:schemeClr val="tx1"/>
+            </a:fontRef>
+          </p:style>
+        </p:cxnSp>
+        <p:cxnSp>
+          <p:nvCxnSpPr>
+            <p:cNvPr id="13" name="Straight Arrow Connector 12">
+              <a:extLst>
+                <a:ext uri="{FF2B5EF4-FFF2-40B4-BE49-F238E27FC236}">
+                  <a16:creationId xmlns:a16="http://schemas.microsoft.com/office/drawing/2014/main" id="{ACEDD3E8-03A9-2C3A-C082-5A8983C853C8}"/>
+                </a:ext>
+              </a:extLst>
+            </p:cNvPr>
+            <p:cNvCxnSpPr>
+              <a:stCxn id="6" idx="3"/>
+              <a:endCxn id="7" idx="1"/>
+            </p:cNvCxnSpPr>
+            <p:nvPr/>
+          </p:nvCxnSpPr>
+          <p:spPr>
+            <a:xfrm>
+              <a:off x="6375876" y="2080344"/>
+              <a:ext cx="1493325" cy="1441933"/>
+            </a:xfrm>
+            <a:prstGeom prst="straightConnector1">
+              <a:avLst/>
+            </a:prstGeom>
+            <a:ln w="12700">
+              <a:solidFill>
+                <a:schemeClr val="tx1"/>
+              </a:solidFill>
+              <a:tailEnd type="triangle"/>
+            </a:ln>
+          </p:spPr>
+          <p:style>
+            <a:lnRef idx="1">
+              <a:schemeClr val="accent1"/>
+            </a:lnRef>
+            <a:fillRef idx="0">
+              <a:schemeClr val="accent1"/>
+            </a:fillRef>
+            <a:effectRef idx="0">
+              <a:schemeClr val="accent1"/>
+            </a:effectRef>
+            <a:fontRef idx="minor">
+              <a:schemeClr val="tx1"/>
+            </a:fontRef>
+          </p:style>
+        </p:cxnSp>
+        <p:cxnSp>
+          <p:nvCxnSpPr>
+            <p:cNvPr id="21" name="Straight Arrow Connector 20">
+              <a:extLst>
+                <a:ext uri="{FF2B5EF4-FFF2-40B4-BE49-F238E27FC236}">
+                  <a16:creationId xmlns:a16="http://schemas.microsoft.com/office/drawing/2014/main" id="{5135221A-49F0-183E-61CD-C17C2D306DB7}"/>
+                </a:ext>
+              </a:extLst>
+            </p:cNvPr>
+            <p:cNvCxnSpPr>
+              <a:stCxn id="4" idx="3"/>
+              <a:endCxn id="7" idx="1"/>
+            </p:cNvCxnSpPr>
+            <p:nvPr/>
+          </p:nvCxnSpPr>
+          <p:spPr>
+            <a:xfrm>
+              <a:off x="3379930" y="3522277"/>
+              <a:ext cx="4489271" cy="0"/>
+            </a:xfrm>
+            <a:prstGeom prst="straightConnector1">
+              <a:avLst/>
+            </a:prstGeom>
+            <a:ln w="12700">
+              <a:solidFill>
+                <a:schemeClr val="tx1"/>
+              </a:solidFill>
+              <a:tailEnd type="triangle"/>
+            </a:ln>
+          </p:spPr>
+          <p:style>
+            <a:lnRef idx="1">
+              <a:schemeClr val="accent1"/>
+            </a:lnRef>
+            <a:fillRef idx="0">
+              <a:schemeClr val="accent1"/>
+            </a:fillRef>
+            <a:effectRef idx="0">
+              <a:schemeClr val="accent1"/>
+            </a:effectRef>
+            <a:fontRef idx="minor">
+              <a:schemeClr val="tx1"/>
+            </a:fontRef>
+          </p:style>
+        </p:cxnSp>
+      </p:grpSp>
+    </p:spTree>
+    <p:extLst>
+      <p:ext uri="{BB962C8B-B14F-4D97-AF65-F5344CB8AC3E}">
+        <p14:creationId xmlns:p14="http://schemas.microsoft.com/office/powerpoint/2010/main" val="2959519369"/>
+      </p:ext>
+    </p:extLst>
+  </p:cSld>
+  <p:clrMapOvr>
+    <a:masterClrMapping/>
+  </p:clrMapOvr>
+</p:sld>
+</file>
+
+<file path=ppt/slides/slide5.xml><?xml version="1.0" encoding="utf-8"?>
+<p:sld xmlns:a="http://schemas.openxmlformats.org/drawingml/2006/main" xmlns:r="http://schemas.openxmlformats.org/officeDocument/2006/relationships" xmlns:p="http://schemas.openxmlformats.org/presentationml/2006/main">
+  <p:cSld>
+    <p:spTree>
+      <p:nvGrpSpPr>
+        <p:cNvPr id="1" name=""/>
+        <p:cNvGrpSpPr/>
+        <p:nvPr/>
+      </p:nvGrpSpPr>
+      <p:grpSpPr>
+        <a:xfrm>
+          <a:off x="0" y="0"/>
+          <a:ext cx="0" cy="0"/>
+          <a:chOff x="0" y="0"/>
+          <a:chExt cx="0" cy="0"/>
+        </a:xfrm>
+      </p:grpSpPr>
+      <p:grpSp>
+        <p:nvGrpSpPr>
+          <p:cNvPr id="8" name="Group 7">
+            <a:extLst>
+              <a:ext uri="{FF2B5EF4-FFF2-40B4-BE49-F238E27FC236}">
+                <a16:creationId xmlns:a16="http://schemas.microsoft.com/office/drawing/2014/main" id="{EFA2D605-5532-DAEE-BDB9-C10C31D50A7D}"/>
+              </a:ext>
+            </a:extLst>
+          </p:cNvPr>
+          <p:cNvGrpSpPr/>
+          <p:nvPr/>
+        </p:nvGrpSpPr>
+        <p:grpSpPr>
+          <a:xfrm>
+            <a:off x="2211992" y="1526757"/>
+            <a:ext cx="8072365" cy="3020495"/>
+            <a:chOff x="2211992" y="1526757"/>
+            <a:chExt cx="8072365" cy="3020495"/>
+          </a:xfrm>
+        </p:grpSpPr>
+        <p:grpSp>
+          <p:nvGrpSpPr>
+            <p:cNvPr id="22" name="Group 21">
+              <a:extLst>
+                <a:ext uri="{FF2B5EF4-FFF2-40B4-BE49-F238E27FC236}">
+                  <a16:creationId xmlns:a16="http://schemas.microsoft.com/office/drawing/2014/main" id="{A45D3BBD-83EA-C72A-F34A-A3E0CADE9FC2}"/>
+                </a:ext>
+              </a:extLst>
+            </p:cNvPr>
+            <p:cNvGrpSpPr/>
+            <p:nvPr/>
+          </p:nvGrpSpPr>
+          <p:grpSpPr>
+            <a:xfrm>
+              <a:off x="2211992" y="1526757"/>
+              <a:ext cx="8072365" cy="2904575"/>
+              <a:chOff x="1891952" y="1004243"/>
+              <a:chExt cx="8072365" cy="2904575"/>
+            </a:xfrm>
+          </p:grpSpPr>
+          <p:sp>
+            <p:nvSpPr>
+              <p:cNvPr id="4" name="Rectangle 3"/>
+              <p:cNvSpPr/>
+              <p:nvPr/>
+            </p:nvSpPr>
+            <p:spPr>
+              <a:xfrm>
+                <a:off x="1891952" y="3135735"/>
+                <a:ext cx="1487978" cy="773083"/>
+              </a:xfrm>
+              <a:prstGeom prst="rect">
+                <a:avLst/>
+              </a:prstGeom>
+              <a:noFill/>
+              <a:ln>
+                <a:solidFill>
+                  <a:schemeClr val="tx1"/>
+                </a:solidFill>
+              </a:ln>
+            </p:spPr>
+            <p:style>
+              <a:lnRef idx="2">
+                <a:schemeClr val="accent1">
+                  <a:shade val="50000"/>
+                </a:schemeClr>
+              </a:lnRef>
+              <a:fillRef idx="1">
+                <a:schemeClr val="accent1"/>
+              </a:fillRef>
+              <a:effectRef idx="0">
+                <a:schemeClr val="accent1"/>
+              </a:effectRef>
+              <a:fontRef idx="minor">
+                <a:schemeClr val="lt1"/>
+              </a:fontRef>
+            </p:style>
+            <p:txBody>
+              <a:bodyPr rtlCol="0" anchor="ctr"/>
+              <a:lstStyle/>
+              <a:p>
+                <a:pPr algn="ctr"/>
+                <a:r>
+                  <a:rPr lang="en-GB" dirty="0">
+                    <a:solidFill>
+                      <a:schemeClr val="tx1"/>
+                    </a:solidFill>
+                  </a:rPr>
+                  <a:t>X</a:t>
+                </a:r>
+              </a:p>
+            </p:txBody>
+          </p:sp>
+          <p:sp>
+            <p:nvSpPr>
+              <p:cNvPr id="6" name="Rectangle 5"/>
+              <p:cNvSpPr/>
+              <p:nvPr/>
+            </p:nvSpPr>
+            <p:spPr>
+              <a:xfrm>
+                <a:off x="4887898" y="1693802"/>
+                <a:ext cx="1487978" cy="773083"/>
+              </a:xfrm>
+              <a:prstGeom prst="rect">
+                <a:avLst/>
+              </a:prstGeom>
+              <a:noFill/>
+              <a:ln>
+                <a:solidFill>
+                  <a:schemeClr val="tx1"/>
+                </a:solidFill>
+              </a:ln>
+            </p:spPr>
+            <p:style>
+              <a:lnRef idx="2">
+                <a:schemeClr val="accent1">
+                  <a:shade val="50000"/>
+                </a:schemeClr>
+              </a:lnRef>
+              <a:fillRef idx="1">
+                <a:schemeClr val="accent1"/>
+              </a:fillRef>
+              <a:effectRef idx="0">
+                <a:schemeClr val="accent1"/>
+              </a:effectRef>
+              <a:fontRef idx="minor">
+                <a:schemeClr val="lt1"/>
+              </a:fontRef>
+            </p:style>
+            <p:txBody>
+              <a:bodyPr rtlCol="0" anchor="ctr"/>
+              <a:lstStyle/>
+              <a:p>
+                <a:pPr algn="ctr"/>
+                <a:r>
+                  <a:rPr lang="en-GB" dirty="0">
+                    <a:solidFill>
+                      <a:schemeClr val="tx1"/>
+                    </a:solidFill>
+                  </a:rPr>
+                  <a:t>M</a:t>
+                </a:r>
+              </a:p>
+            </p:txBody>
+          </p:sp>
+          <p:sp>
+            <p:nvSpPr>
+              <p:cNvPr id="7" name="Rectangle 6"/>
+              <p:cNvSpPr/>
+              <p:nvPr/>
+            </p:nvSpPr>
+            <p:spPr>
+              <a:xfrm>
+                <a:off x="7869201" y="3135735"/>
+                <a:ext cx="1487978" cy="773083"/>
+              </a:xfrm>
+              <a:prstGeom prst="rect">
+                <a:avLst/>
+              </a:prstGeom>
+              <a:noFill/>
+              <a:ln>
+                <a:solidFill>
+                  <a:schemeClr val="tx1"/>
+                </a:solidFill>
+              </a:ln>
+            </p:spPr>
+            <p:style>
+              <a:lnRef idx="2">
+                <a:schemeClr val="accent1">
+                  <a:shade val="50000"/>
+                </a:schemeClr>
+              </a:lnRef>
+              <a:fillRef idx="1">
+                <a:schemeClr val="accent1"/>
+              </a:fillRef>
+              <a:effectRef idx="0">
+                <a:schemeClr val="accent1"/>
+              </a:effectRef>
+              <a:fontRef idx="minor">
+                <a:schemeClr val="lt1"/>
+              </a:fontRef>
+            </p:style>
+            <p:txBody>
+              <a:bodyPr rtlCol="0" anchor="ctr"/>
+              <a:lstStyle/>
+              <a:p>
+                <a:pPr algn="ctr"/>
+                <a:r>
+                  <a:rPr lang="en-GB" dirty="0">
+                    <a:solidFill>
+                      <a:schemeClr val="tx1"/>
+                    </a:solidFill>
+                  </a:rPr>
+                  <a:t>Y</a:t>
+                </a:r>
+              </a:p>
+            </p:txBody>
+          </p:sp>
+          <p:cxnSp>
+            <p:nvCxnSpPr>
+              <p:cNvPr id="35" name="Straight Arrow Connector 34"/>
+              <p:cNvCxnSpPr>
+                <a:cxnSpLocks/>
+                <a:stCxn id="39" idx="4"/>
+                <a:endCxn id="6" idx="0"/>
+              </p:cNvCxnSpPr>
+              <p:nvPr/>
+            </p:nvCxnSpPr>
+            <p:spPr>
+              <a:xfrm>
+                <a:off x="5631887" y="1250855"/>
+                <a:ext cx="0" cy="442947"/>
+              </a:xfrm>
+              <a:prstGeom prst="straightConnector1">
+                <a:avLst/>
+              </a:prstGeom>
+              <a:ln w="12700">
+                <a:solidFill>
+                  <a:schemeClr val="tx1"/>
+                </a:solidFill>
+                <a:tailEnd type="triangle"/>
+              </a:ln>
+            </p:spPr>
+            <p:style>
+              <a:lnRef idx="1">
+                <a:schemeClr val="accent1"/>
+              </a:lnRef>
+              <a:fillRef idx="0">
+                <a:schemeClr val="accent1"/>
+              </a:fillRef>
+              <a:effectRef idx="0">
+                <a:schemeClr val="accent1"/>
+              </a:effectRef>
+              <a:fontRef idx="minor">
+                <a:schemeClr val="tx1"/>
+              </a:fontRef>
+            </p:style>
+          </p:cxnSp>
+          <p:cxnSp>
+            <p:nvCxnSpPr>
+              <p:cNvPr id="38" name="Straight Arrow Connector 37"/>
+              <p:cNvCxnSpPr/>
+              <p:nvPr/>
+            </p:nvCxnSpPr>
+            <p:spPr>
+              <a:xfrm flipH="1">
+                <a:off x="9358564" y="3522275"/>
+                <a:ext cx="353827" cy="1"/>
+              </a:xfrm>
+              <a:prstGeom prst="straightConnector1">
+                <a:avLst/>
+              </a:prstGeom>
+              <a:ln w="12700">
+                <a:solidFill>
+                  <a:schemeClr val="tx1"/>
+                </a:solidFill>
+                <a:tailEnd type="triangle"/>
+              </a:ln>
+            </p:spPr>
+            <p:style>
+              <a:lnRef idx="1">
+                <a:schemeClr val="accent1"/>
+              </a:lnRef>
+              <a:fillRef idx="0">
+                <a:schemeClr val="accent1"/>
+              </a:fillRef>
+              <a:effectRef idx="0">
+                <a:schemeClr val="accent1"/>
+              </a:effectRef>
+              <a:fontRef idx="minor">
+                <a:schemeClr val="tx1"/>
+              </a:fontRef>
+            </p:style>
+          </p:cxnSp>
+          <p:sp>
+            <p:nvSpPr>
+              <p:cNvPr id="39" name="Oval 38"/>
+              <p:cNvSpPr/>
+              <p:nvPr/>
+            </p:nvSpPr>
+            <p:spPr>
+              <a:xfrm>
+                <a:off x="5505924" y="1004243"/>
+                <a:ext cx="251926" cy="246612"/>
+              </a:xfrm>
+              <a:prstGeom prst="ellipse">
+                <a:avLst/>
+              </a:prstGeom>
+              <a:noFill/>
+              <a:ln>
+                <a:solidFill>
+                  <a:schemeClr val="tx1"/>
+                </a:solidFill>
+              </a:ln>
+            </p:spPr>
+            <p:style>
+              <a:lnRef idx="2">
+                <a:schemeClr val="accent1">
+                  <a:shade val="50000"/>
+                </a:schemeClr>
+              </a:lnRef>
+              <a:fillRef idx="1">
+                <a:schemeClr val="accent1"/>
+              </a:fillRef>
+              <a:effectRef idx="0">
+                <a:schemeClr val="accent1"/>
+              </a:effectRef>
+              <a:fontRef idx="minor">
+                <a:schemeClr val="lt1"/>
+              </a:fontRef>
+            </p:style>
+            <p:txBody>
+              <a:bodyPr rtlCol="0" anchor="ctr"/>
+              <a:lstStyle/>
+              <a:p>
+                <a:pPr algn="ctr"/>
+                <a:endParaRPr lang="en-GB"/>
+              </a:p>
+            </p:txBody>
+          </p:sp>
+          <p:sp>
+            <p:nvSpPr>
+              <p:cNvPr id="41" name="Oval 40"/>
+              <p:cNvSpPr/>
+              <p:nvPr/>
+            </p:nvSpPr>
+            <p:spPr>
+              <a:xfrm>
+                <a:off x="9712391" y="3393569"/>
+                <a:ext cx="251926" cy="246612"/>
+              </a:xfrm>
+              <a:prstGeom prst="ellipse">
+                <a:avLst/>
+              </a:prstGeom>
+              <a:noFill/>
+              <a:ln>
+                <a:solidFill>
+                  <a:schemeClr val="tx1"/>
+                </a:solidFill>
+              </a:ln>
+            </p:spPr>
+            <p:style>
+              <a:lnRef idx="2">
+                <a:schemeClr val="accent1">
+                  <a:shade val="50000"/>
+                </a:schemeClr>
+              </a:lnRef>
+              <a:fillRef idx="1">
+                <a:schemeClr val="accent1"/>
+              </a:fillRef>
+              <a:effectRef idx="0">
+                <a:schemeClr val="accent1"/>
+              </a:effectRef>
+              <a:fontRef idx="minor">
+                <a:schemeClr val="lt1"/>
+              </a:fontRef>
+            </p:style>
+            <p:txBody>
+              <a:bodyPr rtlCol="0" anchor="ctr"/>
+              <a:lstStyle/>
+              <a:p>
+                <a:pPr algn="ctr"/>
+                <a:endParaRPr lang="en-GB"/>
+              </a:p>
+            </p:txBody>
+          </p:sp>
+          <p:sp>
+            <p:nvSpPr>
+              <p:cNvPr id="43" name="Right Bracket 42"/>
+              <p:cNvSpPr/>
+              <p:nvPr/>
+            </p:nvSpPr>
+            <p:spPr>
+              <a:xfrm rot="16200000">
+                <a:off x="2511872" y="2884886"/>
+                <a:ext cx="248137" cy="217481"/>
+              </a:xfrm>
+              <a:prstGeom prst="rightBracket">
+                <a:avLst>
+                  <a:gd name="adj" fmla="val 208332"/>
+                </a:avLst>
+              </a:prstGeom>
+              <a:ln w="12700">
+                <a:solidFill>
+                  <a:schemeClr val="tx1"/>
+                </a:solidFill>
+                <a:headEnd type="triangle"/>
+                <a:tailEnd type="triangle"/>
+              </a:ln>
+            </p:spPr>
+            <p:style>
+              <a:lnRef idx="1">
+                <a:schemeClr val="accent1"/>
+              </a:lnRef>
+              <a:fillRef idx="0">
+                <a:schemeClr val="accent1"/>
+              </a:fillRef>
+              <a:effectRef idx="0">
+                <a:schemeClr val="accent1"/>
+              </a:effectRef>
+              <a:fontRef idx="minor">
+                <a:schemeClr val="tx1"/>
+              </a:fontRef>
+            </p:style>
+            <p:txBody>
+              <a:bodyPr rtlCol="0" anchor="ctr"/>
+              <a:lstStyle/>
+              <a:p>
+                <a:pPr algn="ctr"/>
+                <a:endParaRPr lang="en-GB"/>
+              </a:p>
+            </p:txBody>
+          </p:sp>
+          <p:cxnSp>
+            <p:nvCxnSpPr>
+              <p:cNvPr id="10" name="Straight Arrow Connector 9">
+                <a:extLst>
+                  <a:ext uri="{FF2B5EF4-FFF2-40B4-BE49-F238E27FC236}">
+                    <a16:creationId xmlns:a16="http://schemas.microsoft.com/office/drawing/2014/main" id="{CBCB3278-E1A8-2469-C52C-0133701BF3F4}"/>
+                  </a:ext>
+                </a:extLst>
+              </p:cNvPr>
+              <p:cNvCxnSpPr>
+                <a:stCxn id="4" idx="3"/>
+                <a:endCxn id="6" idx="1"/>
+              </p:cNvCxnSpPr>
+              <p:nvPr/>
+            </p:nvCxnSpPr>
+            <p:spPr>
+              <a:xfrm flipV="1">
+                <a:off x="3379930" y="2080344"/>
+                <a:ext cx="1507968" cy="1441933"/>
+              </a:xfrm>
+              <a:prstGeom prst="straightConnector1">
+                <a:avLst/>
+              </a:prstGeom>
+              <a:ln w="12700">
+                <a:solidFill>
+                  <a:schemeClr val="accent2">
+                    <a:lumMod val="60000"/>
+                    <a:lumOff val="40000"/>
+                  </a:schemeClr>
+                </a:solidFill>
+                <a:tailEnd type="triangle"/>
+              </a:ln>
+            </p:spPr>
+            <p:style>
+              <a:lnRef idx="1">
+                <a:schemeClr val="accent1"/>
+              </a:lnRef>
+              <a:fillRef idx="0">
+                <a:schemeClr val="accent1"/>
+              </a:fillRef>
+              <a:effectRef idx="0">
+                <a:schemeClr val="accent1"/>
+              </a:effectRef>
+              <a:fontRef idx="minor">
+                <a:schemeClr val="tx1"/>
+              </a:fontRef>
+            </p:style>
+          </p:cxnSp>
+          <p:cxnSp>
+            <p:nvCxnSpPr>
+              <p:cNvPr id="13" name="Straight Arrow Connector 12">
+                <a:extLst>
+                  <a:ext uri="{FF2B5EF4-FFF2-40B4-BE49-F238E27FC236}">
+                    <a16:creationId xmlns:a16="http://schemas.microsoft.com/office/drawing/2014/main" id="{ACEDD3E8-03A9-2C3A-C082-5A8983C853C8}"/>
+                  </a:ext>
+                </a:extLst>
+              </p:cNvPr>
+              <p:cNvCxnSpPr>
+                <a:stCxn id="6" idx="3"/>
+                <a:endCxn id="7" idx="1"/>
+              </p:cNvCxnSpPr>
+              <p:nvPr/>
+            </p:nvCxnSpPr>
+            <p:spPr>
+              <a:xfrm>
+                <a:off x="6375876" y="2080344"/>
+                <a:ext cx="1493325" cy="1441933"/>
+              </a:xfrm>
+              <a:prstGeom prst="straightConnector1">
+                <a:avLst/>
+              </a:prstGeom>
+              <a:ln w="12700">
+                <a:solidFill>
+                  <a:schemeClr val="accent2">
+                    <a:lumMod val="60000"/>
+                    <a:lumOff val="40000"/>
+                  </a:schemeClr>
+                </a:solidFill>
+                <a:tailEnd type="triangle"/>
+              </a:ln>
+            </p:spPr>
+            <p:style>
+              <a:lnRef idx="1">
+                <a:schemeClr val="accent1"/>
+              </a:lnRef>
+              <a:fillRef idx="0">
+                <a:schemeClr val="accent1"/>
+              </a:fillRef>
+              <a:effectRef idx="0">
+                <a:schemeClr val="accent1"/>
+              </a:effectRef>
+              <a:fontRef idx="minor">
+                <a:schemeClr val="tx1"/>
+              </a:fontRef>
+            </p:style>
+          </p:cxnSp>
+          <p:cxnSp>
+            <p:nvCxnSpPr>
+              <p:cNvPr id="21" name="Straight Arrow Connector 20">
+                <a:extLst>
+                  <a:ext uri="{FF2B5EF4-FFF2-40B4-BE49-F238E27FC236}">
+                    <a16:creationId xmlns:a16="http://schemas.microsoft.com/office/drawing/2014/main" id="{5135221A-49F0-183E-61CD-C17C2D306DB7}"/>
+                  </a:ext>
+                </a:extLst>
+              </p:cNvPr>
+              <p:cNvCxnSpPr>
+                <a:stCxn id="4" idx="3"/>
+                <a:endCxn id="7" idx="1"/>
+              </p:cNvCxnSpPr>
+              <p:nvPr/>
+            </p:nvCxnSpPr>
+            <p:spPr>
+              <a:xfrm>
+                <a:off x="3379930" y="3522277"/>
+                <a:ext cx="4489271" cy="0"/>
+              </a:xfrm>
+              <a:prstGeom prst="straightConnector1">
+                <a:avLst/>
+              </a:prstGeom>
+              <a:ln w="12700">
+                <a:solidFill>
+                  <a:schemeClr val="accent5">
+                    <a:lumMod val="60000"/>
+                    <a:lumOff val="40000"/>
+                  </a:schemeClr>
+                </a:solidFill>
+                <a:tailEnd type="triangle"/>
+              </a:ln>
+            </p:spPr>
+            <p:style>
+              <a:lnRef idx="1">
+                <a:schemeClr val="accent1"/>
+              </a:lnRef>
+              <a:fillRef idx="0">
+                <a:schemeClr val="accent1"/>
+              </a:fillRef>
+              <a:effectRef idx="0">
+                <a:schemeClr val="accent1"/>
+              </a:effectRef>
+              <a:fontRef idx="minor">
+                <a:schemeClr val="tx1"/>
+              </a:fontRef>
+            </p:style>
+          </p:cxnSp>
+        </p:grpSp>
+        <p:sp>
+          <p:nvSpPr>
+            <p:cNvPr id="2" name="TextBox 1">
+              <a:extLst>
+                <a:ext uri="{FF2B5EF4-FFF2-40B4-BE49-F238E27FC236}">
+                  <a16:creationId xmlns:a16="http://schemas.microsoft.com/office/drawing/2014/main" id="{F99AAF8A-BD8A-BD7D-7758-4F6AC6121EEF}"/>
+                </a:ext>
+              </a:extLst>
+            </p:cNvPr>
+            <p:cNvSpPr txBox="1"/>
+            <p:nvPr/>
+          </p:nvSpPr>
+          <p:spPr>
+            <a:xfrm>
+              <a:off x="3752396" y="2832581"/>
+              <a:ext cx="1017422" cy="369332"/>
+            </a:xfrm>
+            <a:prstGeom prst="rect">
+              <a:avLst/>
+            </a:prstGeom>
+            <a:noFill/>
+          </p:spPr>
+          <p:txBody>
+            <a:bodyPr wrap="square" rtlCol="0">
+              <a:spAutoFit/>
+            </a:bodyPr>
+            <a:lstStyle/>
+            <a:p>
+              <a:r>
+                <a:rPr lang="en-GB" dirty="0"/>
+                <a:t>Indirect</a:t>
+              </a:r>
+            </a:p>
+          </p:txBody>
+        </p:sp>
+        <p:sp>
+          <p:nvSpPr>
+            <p:cNvPr id="3" name="TextBox 2">
+              <a:extLst>
+                <a:ext uri="{FF2B5EF4-FFF2-40B4-BE49-F238E27FC236}">
+                  <a16:creationId xmlns:a16="http://schemas.microsoft.com/office/drawing/2014/main" id="{6AD4069F-0090-60B0-5597-01F6CB3DD842}"/>
+                </a:ext>
+              </a:extLst>
+            </p:cNvPr>
+            <p:cNvSpPr txBox="1"/>
+            <p:nvPr/>
+          </p:nvSpPr>
+          <p:spPr>
+            <a:xfrm>
+              <a:off x="7313000" y="2830419"/>
+              <a:ext cx="1017422" cy="369332"/>
+            </a:xfrm>
+            <a:prstGeom prst="rect">
+              <a:avLst/>
+            </a:prstGeom>
+            <a:noFill/>
+          </p:spPr>
+          <p:txBody>
+            <a:bodyPr wrap="square" rtlCol="0">
+              <a:spAutoFit/>
+            </a:bodyPr>
+            <a:lstStyle/>
+            <a:p>
+              <a:r>
+                <a:rPr lang="en-GB" dirty="0"/>
+                <a:t>Indirect</a:t>
+              </a:r>
+            </a:p>
+          </p:txBody>
+        </p:sp>
+        <p:sp>
+          <p:nvSpPr>
+            <p:cNvPr id="5" name="TextBox 4">
+              <a:extLst>
+                <a:ext uri="{FF2B5EF4-FFF2-40B4-BE49-F238E27FC236}">
+                  <a16:creationId xmlns:a16="http://schemas.microsoft.com/office/drawing/2014/main" id="{C05443CF-E076-3960-90BD-57863F45F3B2}"/>
+                </a:ext>
+              </a:extLst>
+            </p:cNvPr>
+            <p:cNvSpPr txBox="1"/>
+            <p:nvPr/>
+          </p:nvSpPr>
+          <p:spPr>
+            <a:xfrm>
+              <a:off x="5443216" y="4177920"/>
+              <a:ext cx="1017422" cy="369332"/>
+            </a:xfrm>
+            <a:prstGeom prst="rect">
+              <a:avLst/>
+            </a:prstGeom>
+            <a:noFill/>
+          </p:spPr>
+          <p:txBody>
+            <a:bodyPr wrap="square" rtlCol="0">
+              <a:spAutoFit/>
+            </a:bodyPr>
+            <a:lstStyle/>
+            <a:p>
+              <a:pPr algn="ctr"/>
+              <a:r>
+                <a:rPr lang="en-GB" dirty="0"/>
+                <a:t>Direct</a:t>
+              </a:r>
+            </a:p>
+          </p:txBody>
+        </p:sp>
+      </p:grpSp>
+    </p:spTree>
+    <p:extLst>
+      <p:ext uri="{BB962C8B-B14F-4D97-AF65-F5344CB8AC3E}">
+        <p14:creationId xmlns:p14="http://schemas.microsoft.com/office/powerpoint/2010/main" val="2526277780"/>
+      </p:ext>
+    </p:extLst>
+  </p:cSld>
+  <p:clrMapOvr>
+    <a:masterClrMapping/>
+  </p:clrMapOvr>
+</p:sld>
+</file>
+
+<file path=ppt/slides/slide6.xml><?xml version="1.0" encoding="utf-8"?>
+<p:sld xmlns:a="http://schemas.openxmlformats.org/drawingml/2006/main" xmlns:r="http://schemas.openxmlformats.org/officeDocument/2006/relationships" xmlns:p="http://schemas.openxmlformats.org/presentationml/2006/main">
+  <p:cSld>
+    <p:spTree>
+      <p:nvGrpSpPr>
+        <p:cNvPr id="1" name=""/>
+        <p:cNvGrpSpPr/>
+        <p:nvPr/>
+      </p:nvGrpSpPr>
+      <p:grpSpPr>
+        <a:xfrm>
+          <a:off x="0" y="0"/>
+          <a:ext cx="0" cy="0"/>
+          <a:chOff x="0" y="0"/>
+          <a:chExt cx="0" cy="0"/>
+        </a:xfrm>
+      </p:grpSpPr>
+      <p:grpSp>
+        <p:nvGrpSpPr>
+          <p:cNvPr id="8" name="Group 7">
+            <a:extLst>
+              <a:ext uri="{FF2B5EF4-FFF2-40B4-BE49-F238E27FC236}">
+                <a16:creationId xmlns:a16="http://schemas.microsoft.com/office/drawing/2014/main" id="{EFA2D605-5532-DAEE-BDB9-C10C31D50A7D}"/>
+              </a:ext>
+            </a:extLst>
+          </p:cNvPr>
+          <p:cNvGrpSpPr/>
+          <p:nvPr/>
+        </p:nvGrpSpPr>
+        <p:grpSpPr>
+          <a:xfrm>
+            <a:off x="2211992" y="1526757"/>
+            <a:ext cx="8072365" cy="3020495"/>
+            <a:chOff x="2211992" y="1526757"/>
+            <a:chExt cx="8072365" cy="3020495"/>
+          </a:xfrm>
+        </p:grpSpPr>
+        <p:grpSp>
+          <p:nvGrpSpPr>
+            <p:cNvPr id="22" name="Group 21">
+              <a:extLst>
+                <a:ext uri="{FF2B5EF4-FFF2-40B4-BE49-F238E27FC236}">
+                  <a16:creationId xmlns:a16="http://schemas.microsoft.com/office/drawing/2014/main" id="{A45D3BBD-83EA-C72A-F34A-A3E0CADE9FC2}"/>
+                </a:ext>
+              </a:extLst>
+            </p:cNvPr>
+            <p:cNvGrpSpPr/>
+            <p:nvPr/>
+          </p:nvGrpSpPr>
+          <p:grpSpPr>
+            <a:xfrm>
+              <a:off x="2211992" y="1526757"/>
+              <a:ext cx="8072365" cy="2904575"/>
+              <a:chOff x="1891952" y="1004243"/>
+              <a:chExt cx="8072365" cy="2904575"/>
+            </a:xfrm>
+          </p:grpSpPr>
+          <p:sp>
+            <p:nvSpPr>
+              <p:cNvPr id="4" name="Rectangle 3"/>
+              <p:cNvSpPr/>
+              <p:nvPr/>
+            </p:nvSpPr>
+            <p:spPr>
+              <a:xfrm>
+                <a:off x="1891952" y="3135735"/>
+                <a:ext cx="1487978" cy="773083"/>
+              </a:xfrm>
+              <a:prstGeom prst="rect">
+                <a:avLst/>
+              </a:prstGeom>
+              <a:noFill/>
+              <a:ln>
+                <a:solidFill>
+                  <a:schemeClr val="tx1"/>
+                </a:solidFill>
+              </a:ln>
+            </p:spPr>
+            <p:style>
+              <a:lnRef idx="2">
+                <a:schemeClr val="accent1">
+                  <a:shade val="50000"/>
+                </a:schemeClr>
+              </a:lnRef>
+              <a:fillRef idx="1">
+                <a:schemeClr val="accent1"/>
+              </a:fillRef>
+              <a:effectRef idx="0">
+                <a:schemeClr val="accent1"/>
+              </a:effectRef>
+              <a:fontRef idx="minor">
+                <a:schemeClr val="lt1"/>
+              </a:fontRef>
+            </p:style>
+            <p:txBody>
+              <a:bodyPr rtlCol="0" anchor="ctr"/>
+              <a:lstStyle/>
+              <a:p>
+                <a:pPr algn="ctr"/>
+                <a:r>
+                  <a:rPr lang="en-GB" dirty="0">
+                    <a:solidFill>
+                      <a:schemeClr val="tx1"/>
+                    </a:solidFill>
+                  </a:rPr>
+                  <a:t>X</a:t>
+                </a:r>
+              </a:p>
+            </p:txBody>
+          </p:sp>
+          <p:sp>
+            <p:nvSpPr>
+              <p:cNvPr id="6" name="Rectangle 5"/>
+              <p:cNvSpPr/>
+              <p:nvPr/>
+            </p:nvSpPr>
+            <p:spPr>
+              <a:xfrm>
+                <a:off x="4887898" y="1693802"/>
+                <a:ext cx="1487978" cy="773083"/>
+              </a:xfrm>
+              <a:prstGeom prst="rect">
+                <a:avLst/>
+              </a:prstGeom>
+              <a:noFill/>
+              <a:ln>
+                <a:solidFill>
+                  <a:schemeClr val="tx1"/>
+                </a:solidFill>
+              </a:ln>
+            </p:spPr>
+            <p:style>
+              <a:lnRef idx="2">
+                <a:schemeClr val="accent1">
+                  <a:shade val="50000"/>
+                </a:schemeClr>
+              </a:lnRef>
+              <a:fillRef idx="1">
+                <a:schemeClr val="accent1"/>
+              </a:fillRef>
+              <a:effectRef idx="0">
+                <a:schemeClr val="accent1"/>
+              </a:effectRef>
+              <a:fontRef idx="minor">
+                <a:schemeClr val="lt1"/>
+              </a:fontRef>
+            </p:style>
+            <p:txBody>
+              <a:bodyPr rtlCol="0" anchor="ctr"/>
+              <a:lstStyle/>
+              <a:p>
+                <a:pPr algn="ctr"/>
+                <a:r>
+                  <a:rPr lang="en-GB" dirty="0">
+                    <a:solidFill>
+                      <a:schemeClr val="tx1"/>
+                    </a:solidFill>
+                  </a:rPr>
+                  <a:t>M</a:t>
+                </a:r>
+              </a:p>
+            </p:txBody>
+          </p:sp>
+          <p:sp>
+            <p:nvSpPr>
+              <p:cNvPr id="7" name="Rectangle 6"/>
+              <p:cNvSpPr/>
+              <p:nvPr/>
+            </p:nvSpPr>
+            <p:spPr>
+              <a:xfrm>
+                <a:off x="7869201" y="3135735"/>
+                <a:ext cx="1487978" cy="773083"/>
+              </a:xfrm>
+              <a:prstGeom prst="rect">
+                <a:avLst/>
+              </a:prstGeom>
+              <a:noFill/>
+              <a:ln>
+                <a:solidFill>
+                  <a:schemeClr val="tx1"/>
+                </a:solidFill>
+              </a:ln>
+            </p:spPr>
+            <p:style>
+              <a:lnRef idx="2">
+                <a:schemeClr val="accent1">
+                  <a:shade val="50000"/>
+                </a:schemeClr>
+              </a:lnRef>
+              <a:fillRef idx="1">
+                <a:schemeClr val="accent1"/>
+              </a:fillRef>
+              <a:effectRef idx="0">
+                <a:schemeClr val="accent1"/>
+              </a:effectRef>
+              <a:fontRef idx="minor">
+                <a:schemeClr val="lt1"/>
+              </a:fontRef>
+            </p:style>
+            <p:txBody>
+              <a:bodyPr rtlCol="0" anchor="ctr"/>
+              <a:lstStyle/>
+              <a:p>
+                <a:pPr algn="ctr"/>
+                <a:r>
+                  <a:rPr lang="en-GB" dirty="0">
+                    <a:solidFill>
+                      <a:schemeClr val="tx1"/>
+                    </a:solidFill>
+                  </a:rPr>
+                  <a:t>Y</a:t>
+                </a:r>
+              </a:p>
+            </p:txBody>
+          </p:sp>
+          <p:cxnSp>
+            <p:nvCxnSpPr>
+              <p:cNvPr id="35" name="Straight Arrow Connector 34"/>
+              <p:cNvCxnSpPr>
+                <a:cxnSpLocks/>
+                <a:stCxn id="39" idx="4"/>
+                <a:endCxn id="6" idx="0"/>
+              </p:cNvCxnSpPr>
+              <p:nvPr/>
+            </p:nvCxnSpPr>
+            <p:spPr>
+              <a:xfrm>
+                <a:off x="5631887" y="1250855"/>
+                <a:ext cx="0" cy="442947"/>
+              </a:xfrm>
+              <a:prstGeom prst="straightConnector1">
+                <a:avLst/>
+              </a:prstGeom>
+              <a:ln w="12700">
+                <a:solidFill>
+                  <a:schemeClr val="tx1"/>
+                </a:solidFill>
+                <a:tailEnd type="triangle"/>
+              </a:ln>
+            </p:spPr>
+            <p:style>
+              <a:lnRef idx="1">
+                <a:schemeClr val="accent1"/>
+              </a:lnRef>
+              <a:fillRef idx="0">
+                <a:schemeClr val="accent1"/>
+              </a:fillRef>
+              <a:effectRef idx="0">
+                <a:schemeClr val="accent1"/>
+              </a:effectRef>
+              <a:fontRef idx="minor">
+                <a:schemeClr val="tx1"/>
+              </a:fontRef>
+            </p:style>
+          </p:cxnSp>
+          <p:cxnSp>
+            <p:nvCxnSpPr>
+              <p:cNvPr id="38" name="Straight Arrow Connector 37"/>
+              <p:cNvCxnSpPr/>
+              <p:nvPr/>
+            </p:nvCxnSpPr>
+            <p:spPr>
+              <a:xfrm flipH="1">
+                <a:off x="9358564" y="3522275"/>
+                <a:ext cx="353827" cy="1"/>
+              </a:xfrm>
+              <a:prstGeom prst="straightConnector1">
+                <a:avLst/>
+              </a:prstGeom>
+              <a:ln w="12700">
+                <a:solidFill>
+                  <a:schemeClr val="tx1"/>
+                </a:solidFill>
+                <a:tailEnd type="triangle"/>
+              </a:ln>
+            </p:spPr>
+            <p:style>
+              <a:lnRef idx="1">
+                <a:schemeClr val="accent1"/>
+              </a:lnRef>
+              <a:fillRef idx="0">
+                <a:schemeClr val="accent1"/>
+              </a:fillRef>
+              <a:effectRef idx="0">
+                <a:schemeClr val="accent1"/>
+              </a:effectRef>
+              <a:fontRef idx="minor">
+                <a:schemeClr val="tx1"/>
+              </a:fontRef>
+            </p:style>
+          </p:cxnSp>
+          <p:sp>
+            <p:nvSpPr>
+              <p:cNvPr id="39" name="Oval 38"/>
+              <p:cNvSpPr/>
+              <p:nvPr/>
+            </p:nvSpPr>
+            <p:spPr>
+              <a:xfrm>
+                <a:off x="5505924" y="1004243"/>
+                <a:ext cx="251926" cy="246612"/>
+              </a:xfrm>
+              <a:prstGeom prst="ellipse">
+                <a:avLst/>
+              </a:prstGeom>
+              <a:noFill/>
+              <a:ln>
+                <a:solidFill>
+                  <a:schemeClr val="tx1"/>
+                </a:solidFill>
+              </a:ln>
+            </p:spPr>
+            <p:style>
+              <a:lnRef idx="2">
+                <a:schemeClr val="accent1">
+                  <a:shade val="50000"/>
+                </a:schemeClr>
+              </a:lnRef>
+              <a:fillRef idx="1">
+                <a:schemeClr val="accent1"/>
+              </a:fillRef>
+              <a:effectRef idx="0">
+                <a:schemeClr val="accent1"/>
+              </a:effectRef>
+              <a:fontRef idx="minor">
+                <a:schemeClr val="lt1"/>
+              </a:fontRef>
+            </p:style>
+            <p:txBody>
+              <a:bodyPr rtlCol="0" anchor="ctr"/>
+              <a:lstStyle/>
+              <a:p>
+                <a:pPr algn="ctr"/>
+                <a:endParaRPr lang="en-GB"/>
+              </a:p>
+            </p:txBody>
+          </p:sp>
+          <p:sp>
+            <p:nvSpPr>
+              <p:cNvPr id="41" name="Oval 40"/>
+              <p:cNvSpPr/>
+              <p:nvPr/>
+            </p:nvSpPr>
+            <p:spPr>
+              <a:xfrm>
+                <a:off x="9712391" y="3393569"/>
+                <a:ext cx="251926" cy="246612"/>
+              </a:xfrm>
+              <a:prstGeom prst="ellipse">
+                <a:avLst/>
+              </a:prstGeom>
+              <a:noFill/>
+              <a:ln>
+                <a:solidFill>
+                  <a:schemeClr val="tx1"/>
+                </a:solidFill>
+              </a:ln>
+            </p:spPr>
+            <p:style>
+              <a:lnRef idx="2">
+                <a:schemeClr val="accent1">
+                  <a:shade val="50000"/>
+                </a:schemeClr>
+              </a:lnRef>
+              <a:fillRef idx="1">
+                <a:schemeClr val="accent1"/>
+              </a:fillRef>
+              <a:effectRef idx="0">
+                <a:schemeClr val="accent1"/>
+              </a:effectRef>
+              <a:fontRef idx="minor">
+                <a:schemeClr val="lt1"/>
+              </a:fontRef>
+            </p:style>
+            <p:txBody>
+              <a:bodyPr rtlCol="0" anchor="ctr"/>
+              <a:lstStyle/>
+              <a:p>
+                <a:pPr algn="ctr"/>
+                <a:endParaRPr lang="en-GB"/>
+              </a:p>
+            </p:txBody>
+          </p:sp>
+          <p:sp>
+            <p:nvSpPr>
+              <p:cNvPr id="43" name="Right Bracket 42"/>
+              <p:cNvSpPr/>
+              <p:nvPr/>
+            </p:nvSpPr>
+            <p:spPr>
+              <a:xfrm rot="16200000">
+                <a:off x="2511872" y="2884886"/>
+                <a:ext cx="248137" cy="217481"/>
+              </a:xfrm>
+              <a:prstGeom prst="rightBracket">
+                <a:avLst>
+                  <a:gd name="adj" fmla="val 208332"/>
+                </a:avLst>
+              </a:prstGeom>
+              <a:ln w="12700">
+                <a:solidFill>
+                  <a:schemeClr val="tx1"/>
+                </a:solidFill>
+                <a:headEnd type="triangle"/>
+                <a:tailEnd type="triangle"/>
+              </a:ln>
+            </p:spPr>
+            <p:style>
+              <a:lnRef idx="1">
+                <a:schemeClr val="accent1"/>
+              </a:lnRef>
+              <a:fillRef idx="0">
+                <a:schemeClr val="accent1"/>
+              </a:fillRef>
+              <a:effectRef idx="0">
+                <a:schemeClr val="accent1"/>
+              </a:effectRef>
+              <a:fontRef idx="minor">
+                <a:schemeClr val="tx1"/>
+              </a:fontRef>
+            </p:style>
+            <p:txBody>
+              <a:bodyPr rtlCol="0" anchor="ctr"/>
+              <a:lstStyle/>
+              <a:p>
+                <a:pPr algn="ctr"/>
+                <a:endParaRPr lang="en-GB"/>
+              </a:p>
+            </p:txBody>
+          </p:sp>
+          <p:cxnSp>
+            <p:nvCxnSpPr>
+              <p:cNvPr id="10" name="Straight Arrow Connector 9">
+                <a:extLst>
+                  <a:ext uri="{FF2B5EF4-FFF2-40B4-BE49-F238E27FC236}">
+                    <a16:creationId xmlns:a16="http://schemas.microsoft.com/office/drawing/2014/main" id="{CBCB3278-E1A8-2469-C52C-0133701BF3F4}"/>
+                  </a:ext>
+                </a:extLst>
+              </p:cNvPr>
+              <p:cNvCxnSpPr>
+                <a:stCxn id="4" idx="3"/>
+                <a:endCxn id="6" idx="1"/>
+              </p:cNvCxnSpPr>
+              <p:nvPr/>
+            </p:nvCxnSpPr>
+            <p:spPr>
+              <a:xfrm flipV="1">
+                <a:off x="3379930" y="2080344"/>
+                <a:ext cx="1507968" cy="1441933"/>
+              </a:xfrm>
+              <a:prstGeom prst="straightConnector1">
+                <a:avLst/>
+              </a:prstGeom>
+              <a:ln w="12700">
+                <a:solidFill>
+                  <a:schemeClr val="accent2">
+                    <a:lumMod val="60000"/>
+                    <a:lumOff val="40000"/>
+                  </a:schemeClr>
+                </a:solidFill>
+                <a:tailEnd type="triangle"/>
+              </a:ln>
+            </p:spPr>
+            <p:style>
+              <a:lnRef idx="1">
+                <a:schemeClr val="accent1"/>
+              </a:lnRef>
+              <a:fillRef idx="0">
+                <a:schemeClr val="accent1"/>
+              </a:fillRef>
+              <a:effectRef idx="0">
+                <a:schemeClr val="accent1"/>
+              </a:effectRef>
+              <a:fontRef idx="minor">
+                <a:schemeClr val="tx1"/>
+              </a:fontRef>
+            </p:style>
+          </p:cxnSp>
+          <p:cxnSp>
+            <p:nvCxnSpPr>
+              <p:cNvPr id="13" name="Straight Arrow Connector 12">
+                <a:extLst>
+                  <a:ext uri="{FF2B5EF4-FFF2-40B4-BE49-F238E27FC236}">
+                    <a16:creationId xmlns:a16="http://schemas.microsoft.com/office/drawing/2014/main" id="{ACEDD3E8-03A9-2C3A-C082-5A8983C853C8}"/>
+                  </a:ext>
+                </a:extLst>
+              </p:cNvPr>
+              <p:cNvCxnSpPr>
+                <a:stCxn id="6" idx="3"/>
+                <a:endCxn id="7" idx="1"/>
+              </p:cNvCxnSpPr>
+              <p:nvPr/>
+            </p:nvCxnSpPr>
+            <p:spPr>
+              <a:xfrm>
+                <a:off x="6375876" y="2080344"/>
+                <a:ext cx="1493325" cy="1441933"/>
+              </a:xfrm>
+              <a:prstGeom prst="straightConnector1">
+                <a:avLst/>
+              </a:prstGeom>
+              <a:ln w="12700">
+                <a:solidFill>
+                  <a:schemeClr val="accent2">
+                    <a:lumMod val="60000"/>
+                    <a:lumOff val="40000"/>
+                  </a:schemeClr>
+                </a:solidFill>
+                <a:tailEnd type="triangle"/>
+              </a:ln>
+            </p:spPr>
+            <p:style>
+              <a:lnRef idx="1">
+                <a:schemeClr val="accent1"/>
+              </a:lnRef>
+              <a:fillRef idx="0">
+                <a:schemeClr val="accent1"/>
+              </a:fillRef>
+              <a:effectRef idx="0">
+                <a:schemeClr val="accent1"/>
+              </a:effectRef>
+              <a:fontRef idx="minor">
+                <a:schemeClr val="tx1"/>
+              </a:fontRef>
+            </p:style>
+          </p:cxnSp>
+          <p:cxnSp>
+            <p:nvCxnSpPr>
+              <p:cNvPr id="21" name="Straight Arrow Connector 20">
+                <a:extLst>
+                  <a:ext uri="{FF2B5EF4-FFF2-40B4-BE49-F238E27FC236}">
+                    <a16:creationId xmlns:a16="http://schemas.microsoft.com/office/drawing/2014/main" id="{5135221A-49F0-183E-61CD-C17C2D306DB7}"/>
+                  </a:ext>
+                </a:extLst>
+              </p:cNvPr>
+              <p:cNvCxnSpPr>
+                <a:stCxn id="4" idx="3"/>
+                <a:endCxn id="7" idx="1"/>
+              </p:cNvCxnSpPr>
+              <p:nvPr/>
+            </p:nvCxnSpPr>
+            <p:spPr>
+              <a:xfrm>
+                <a:off x="3379930" y="3522277"/>
+                <a:ext cx="4489271" cy="0"/>
+              </a:xfrm>
+              <a:prstGeom prst="straightConnector1">
+                <a:avLst/>
+              </a:prstGeom>
+              <a:ln w="12700">
+                <a:solidFill>
+                  <a:schemeClr val="accent5">
+                    <a:lumMod val="60000"/>
+                    <a:lumOff val="40000"/>
+                  </a:schemeClr>
+                </a:solidFill>
+                <a:tailEnd type="triangle"/>
+              </a:ln>
+            </p:spPr>
+            <p:style>
+              <a:lnRef idx="1">
+                <a:schemeClr val="accent1"/>
+              </a:lnRef>
+              <a:fillRef idx="0">
+                <a:schemeClr val="accent1"/>
+              </a:fillRef>
+              <a:effectRef idx="0">
+                <a:schemeClr val="accent1"/>
+              </a:effectRef>
+              <a:fontRef idx="minor">
+                <a:schemeClr val="tx1"/>
+              </a:fontRef>
+            </p:style>
+          </p:cxnSp>
+        </p:grpSp>
+        <p:sp>
+          <p:nvSpPr>
+            <p:cNvPr id="2" name="TextBox 1">
+              <a:extLst>
+                <a:ext uri="{FF2B5EF4-FFF2-40B4-BE49-F238E27FC236}">
+                  <a16:creationId xmlns:a16="http://schemas.microsoft.com/office/drawing/2014/main" id="{F99AAF8A-BD8A-BD7D-7758-4F6AC6121EEF}"/>
+                </a:ext>
+              </a:extLst>
+            </p:cNvPr>
+            <p:cNvSpPr txBox="1"/>
+            <p:nvPr/>
+          </p:nvSpPr>
+          <p:spPr>
+            <a:xfrm>
+              <a:off x="4248021" y="2830419"/>
+              <a:ext cx="434250" cy="369332"/>
+            </a:xfrm>
+            <a:prstGeom prst="rect">
+              <a:avLst/>
+            </a:prstGeom>
+            <a:noFill/>
+          </p:spPr>
+          <p:txBody>
+            <a:bodyPr wrap="square" rtlCol="0">
+              <a:spAutoFit/>
+            </a:bodyPr>
+            <a:lstStyle/>
+            <a:p>
+              <a:r>
+                <a:rPr lang="en-GB" dirty="0"/>
+                <a:t>a</a:t>
+              </a:r>
+            </a:p>
+          </p:txBody>
+        </p:sp>
+        <p:sp>
+          <p:nvSpPr>
+            <p:cNvPr id="3" name="TextBox 2">
+              <a:extLst>
+                <a:ext uri="{FF2B5EF4-FFF2-40B4-BE49-F238E27FC236}">
+                  <a16:creationId xmlns:a16="http://schemas.microsoft.com/office/drawing/2014/main" id="{6AD4069F-0090-60B0-5597-01F6CB3DD842}"/>
+                </a:ext>
+              </a:extLst>
+            </p:cNvPr>
+            <p:cNvSpPr txBox="1"/>
+            <p:nvPr/>
+          </p:nvSpPr>
+          <p:spPr>
+            <a:xfrm>
+              <a:off x="7313000" y="2830419"/>
+              <a:ext cx="1017422" cy="369332"/>
+            </a:xfrm>
+            <a:prstGeom prst="rect">
+              <a:avLst/>
+            </a:prstGeom>
+            <a:noFill/>
+          </p:spPr>
+          <p:txBody>
+            <a:bodyPr wrap="square" rtlCol="0">
+              <a:spAutoFit/>
+            </a:bodyPr>
+            <a:lstStyle/>
+            <a:p>
+              <a:r>
+                <a:rPr lang="en-GB" dirty="0"/>
+                <a:t>b</a:t>
+              </a:r>
+            </a:p>
+          </p:txBody>
+        </p:sp>
+        <p:sp>
+          <p:nvSpPr>
+            <p:cNvPr id="5" name="TextBox 4">
+              <a:extLst>
+                <a:ext uri="{FF2B5EF4-FFF2-40B4-BE49-F238E27FC236}">
+                  <a16:creationId xmlns:a16="http://schemas.microsoft.com/office/drawing/2014/main" id="{C05443CF-E076-3960-90BD-57863F45F3B2}"/>
+                </a:ext>
+              </a:extLst>
+            </p:cNvPr>
+            <p:cNvSpPr txBox="1"/>
+            <p:nvPr/>
+          </p:nvSpPr>
+          <p:spPr>
+            <a:xfrm>
+              <a:off x="5443216" y="4177920"/>
+              <a:ext cx="1017422" cy="369332"/>
+            </a:xfrm>
+            <a:prstGeom prst="rect">
+              <a:avLst/>
+            </a:prstGeom>
+            <a:noFill/>
+          </p:spPr>
+          <p:txBody>
+            <a:bodyPr wrap="square" rtlCol="0">
+              <a:spAutoFit/>
+            </a:bodyPr>
+            <a:lstStyle/>
+            <a:p>
+              <a:pPr algn="ctr"/>
+              <a:r>
+                <a:rPr lang="en-GB"/>
+                <a:t>c</a:t>
+              </a:r>
+              <a:endParaRPr lang="en-GB" dirty="0"/>
+            </a:p>
+          </p:txBody>
+        </p:sp>
+      </p:grpSp>
+    </p:spTree>
+    <p:extLst>
+      <p:ext uri="{BB962C8B-B14F-4D97-AF65-F5344CB8AC3E}">
+        <p14:creationId xmlns:p14="http://schemas.microsoft.com/office/powerpoint/2010/main" val="1315734053"/>
       </p:ext>
     </p:extLst>
   </p:cSld>

</xml_diff>